<commit_message>
Add into presentation information about JIT Compiler
</commit_message>
<xml_diff>
--- a/Education/Execution model.pptx
+++ b/Education/Execution model.pptx
@@ -7,7 +7,7 @@
     <p:sldMasterId id="2147483686" r:id="rId3"/>
   </p:sldMasterIdLst>
   <p:handoutMasterIdLst>
-    <p:handoutMasterId r:id="rId29"/>
+    <p:handoutMasterId r:id="rId31"/>
   </p:handoutMasterIdLst>
   <p:sldIdLst>
     <p:sldId id="287" r:id="rId4"/>
@@ -31,10 +31,12 @@
     <p:sldId id="306" r:id="rId22"/>
     <p:sldId id="308" r:id="rId23"/>
     <p:sldId id="309" r:id="rId24"/>
-    <p:sldId id="310" r:id="rId25"/>
-    <p:sldId id="311" r:id="rId26"/>
-    <p:sldId id="312" r:id="rId27"/>
-    <p:sldId id="313" r:id="rId28"/>
+    <p:sldId id="315" r:id="rId25"/>
+    <p:sldId id="316" r:id="rId26"/>
+    <p:sldId id="310" r:id="rId27"/>
+    <p:sldId id="311" r:id="rId28"/>
+    <p:sldId id="312" r:id="rId29"/>
+    <p:sldId id="313" r:id="rId30"/>
   </p:sldIdLst>
   <p:sldSz cx="9144000" cy="6858000" type="screen4x3"/>
   <p:notesSz cx="6858000" cy="9144000"/>
@@ -135,7 +137,7 @@
   </p:defaultTextStyle>
   <p:extLst>
     <p:ext uri="{EFAFB233-063F-42B5-8137-9DF3F51BA10A}">
-      <p15:sldGuideLst xmlns="" xmlns:p15="http://schemas.microsoft.com/office/powerpoint/2012/main">
+      <p15:sldGuideLst xmlns:p15="http://schemas.microsoft.com/office/powerpoint/2012/main" xmlns="">
         <p15:guide id="2" pos="2880" userDrawn="1">
           <p15:clr>
             <a:srgbClr val="A4A3A4"/>
@@ -154,7 +156,7 @@
       </p15:sldGuideLst>
     </p:ext>
     <p:ext uri="{2D200454-40CA-4A62-9FC3-DE9A4176ACB9}">
-      <p15:notesGuideLst xmlns="" xmlns:p15="http://schemas.microsoft.com/office/powerpoint/2012/main"/>
+      <p15:notesGuideLst xmlns:p15="http://schemas.microsoft.com/office/powerpoint/2012/main" xmlns=""/>
     </p:ext>
   </p:extLst>
 </p:presentation>
@@ -561,7 +563,7 @@
   </p:timing>
   <p:extLst mod="1">
     <p:ext uri="{DCECCB84-F9BA-43D5-87BE-67443E8EF086}">
-      <p15:sldGuideLst xmlns="" xmlns:p15="http://schemas.microsoft.com/office/powerpoint/2012/main"/>
+      <p15:sldGuideLst xmlns:p15="http://schemas.microsoft.com/office/powerpoint/2012/main" xmlns=""/>
     </p:ext>
   </p:extLst>
 </p:sldLayout>
@@ -2156,7 +2158,7 @@
   </p:txStyles>
   <p:extLst mod="1">
     <p:ext uri="{27BBF7A9-308A-43DC-89C8-2F10F3537804}">
-      <p15:sldGuideLst xmlns="" xmlns:p15="http://schemas.microsoft.com/office/powerpoint/2012/main">
+      <p15:sldGuideLst xmlns:p15="http://schemas.microsoft.com/office/powerpoint/2012/main" xmlns="">
         <p15:guide id="1" pos="136" userDrawn="1">
           <p15:clr>
             <a:srgbClr val="F26B43"/>
@@ -2672,7 +2674,7 @@
   </p:txStyles>
   <p:extLst mod="1">
     <p:ext uri="{27BBF7A9-308A-43DC-89C8-2F10F3537804}">
-      <p15:sldGuideLst xmlns="" xmlns:p15="http://schemas.microsoft.com/office/powerpoint/2012/main">
+      <p15:sldGuideLst xmlns:p15="http://schemas.microsoft.com/office/powerpoint/2012/main" xmlns="">
         <p15:guide id="1" pos="158" userDrawn="1">
           <p15:clr>
             <a:srgbClr val="F26B43"/>
@@ -3135,7 +3137,7 @@
   </p:txStyles>
   <p:extLst mod="1">
     <p:ext uri="{27BBF7A9-308A-43DC-89C8-2F10F3537804}">
-      <p15:sldGuideLst xmlns="" xmlns:p15="http://schemas.microsoft.com/office/powerpoint/2012/main">
+      <p15:sldGuideLst xmlns:p15="http://schemas.microsoft.com/office/powerpoint/2012/main" xmlns="">
         <p15:guide id="1" pos="125" userDrawn="1">
           <p15:clr>
             <a:srgbClr val="F26B43"/>
@@ -4710,41 +4712,74 @@
           <a:chExt cx="0" cy="0"/>
         </a:xfrm>
       </p:grpSpPr>
-      <p:sp>
-        <p:nvSpPr>
-          <p:cNvPr id="2" name="Місце для тексту 1"/>
-          <p:cNvSpPr>
-            <a:spLocks noGrp="1"/>
-          </p:cNvSpPr>
-          <p:nvPr>
-            <p:ph type="body" sz="quarter" idx="10"/>
-          </p:nvPr>
-        </p:nvSpPr>
-        <p:spPr/>
-        <p:txBody>
-          <a:bodyPr/>
+      <p:pic>
+        <p:nvPicPr>
+          <p:cNvPr id="1026" name="Picture 2" descr="Результат пошуку зображень за запитом &quot;jit compiler&quot;">
+            <a:hlinkClick r:id="rId2"/>
+          </p:cNvPr>
+          <p:cNvPicPr>
+            <a:picLocks noChangeAspect="1" noChangeArrowheads="1"/>
+          </p:cNvPicPr>
+          <p:nvPr/>
+        </p:nvPicPr>
+        <p:blipFill>
+          <a:blip r:embed="rId3">
+            <a:extLst>
+              <a:ext uri="{28A0092B-C50C-407E-A947-70E740481C1C}">
+                <a14:useLocalDpi xmlns:a14="http://schemas.microsoft.com/office/drawing/2010/main" val="0"/>
+              </a:ext>
+            </a:extLst>
+          </a:blip>
+          <a:srcRect/>
+          <a:stretch>
+            <a:fillRect/>
+          </a:stretch>
+        </p:blipFill>
+        <p:spPr bwMode="auto">
+          <a:xfrm>
+            <a:off x="230570" y="787074"/>
+            <a:ext cx="5523845" cy="5972828"/>
+          </a:xfrm>
+          <a:prstGeom prst="rect">
+            <a:avLst/>
+          </a:prstGeom>
+          <a:noFill/>
+          <a:extLst>
+            <a:ext uri="{909E8E84-426E-40DD-AFC4-6F175D3DCCD1}">
+              <a14:hiddenFill xmlns:a14="http://schemas.microsoft.com/office/drawing/2010/main">
+                <a:solidFill>
+                  <a:srgbClr val="FFFFFF"/>
+                </a:solidFill>
+              </a14:hiddenFill>
+            </a:ext>
+          </a:extLst>
+        </p:spPr>
+      </p:pic>
+      <p:sp>
+        <p:nvSpPr>
+          <p:cNvPr id="4" name="Прямокутник 3"/>
+          <p:cNvSpPr/>
+          <p:nvPr/>
+        </p:nvSpPr>
+        <p:spPr>
+          <a:xfrm>
+            <a:off x="5849007" y="4058546"/>
+            <a:ext cx="3294993" cy="1477328"/>
+          </a:xfrm>
+          <a:prstGeom prst="rect">
+            <a:avLst/>
+          </a:prstGeom>
+        </p:spPr>
+        <p:txBody>
+          <a:bodyPr wrap="square">
+            <a:spAutoFit/>
+          </a:bodyPr>
           <a:lstStyle/>
           <a:p>
-            <a:endParaRPr lang="en-US"/>
-          </a:p>
-        </p:txBody>
-      </p:sp>
-      <p:sp>
-        <p:nvSpPr>
-          <p:cNvPr id="3" name="Підзаголовок 2"/>
-          <p:cNvSpPr>
-            <a:spLocks noGrp="1"/>
-          </p:cNvSpPr>
-          <p:nvPr>
-            <p:ph type="subTitle" idx="1"/>
-          </p:nvPr>
-        </p:nvSpPr>
-        <p:spPr/>
-        <p:txBody>
-          <a:bodyPr/>
-          <a:lstStyle/>
-          <a:p>
-            <a:endParaRPr lang="en-US"/>
+            <a:r>
+              <a:rPr lang="en-US" dirty="0"/>
+              <a:t>To execute a method, its IL code must be converted into machine instructions. This is done by the JIT-compiler (Just-In-Time) of the CLR.</a:t>
+            </a:r>
           </a:p>
         </p:txBody>
       </p:sp>
@@ -4778,39 +4813,53 @@
           <a:chExt cx="0" cy="0"/>
         </a:xfrm>
       </p:grpSpPr>
-      <p:sp>
-        <p:nvSpPr>
-          <p:cNvPr id="2" name="Заголовок 1"/>
-          <p:cNvSpPr>
-            <a:spLocks noGrp="1"/>
-          </p:cNvSpPr>
-          <p:nvPr>
-            <p:ph type="ctrTitle"/>
-          </p:nvPr>
-        </p:nvSpPr>
-        <p:spPr>
+      <p:pic>
+        <p:nvPicPr>
+          <p:cNvPr id="2050" name="Picture 2" descr="Результат пошуку зображень за запитом &quot;jit first call of method&quot;">
+            <a:hlinkClick r:id="rId2"/>
+          </p:cNvPr>
+          <p:cNvPicPr>
+            <a:picLocks noChangeAspect="1" noChangeArrowheads="1"/>
+          </p:cNvPicPr>
+          <p:nvPr/>
+        </p:nvPicPr>
+        <p:blipFill>
+          <a:blip r:embed="rId3">
+            <a:extLst>
+              <a:ext uri="{28A0092B-C50C-407E-A947-70E740481C1C}">
+                <a14:useLocalDpi xmlns:a14="http://schemas.microsoft.com/office/drawing/2010/main" val="0"/>
+              </a:ext>
+            </a:extLst>
+          </a:blip>
+          <a:srcRect/>
+          <a:stretch>
+            <a:fillRect/>
+          </a:stretch>
+        </p:blipFill>
+        <p:spPr bwMode="auto">
           <a:xfrm>
-            <a:off x="1853239" y="2664373"/>
-            <a:ext cx="5723313" cy="1058858"/>
+            <a:off x="1665230" y="834369"/>
+            <a:ext cx="6091401" cy="5788150"/>
           </a:xfrm>
+          <a:prstGeom prst="rect">
+            <a:avLst/>
+          </a:prstGeom>
+          <a:noFill/>
+          <a:extLst>
+            <a:ext uri="{909E8E84-426E-40DD-AFC4-6F175D3DCCD1}">
+              <a14:hiddenFill xmlns:a14="http://schemas.microsoft.com/office/drawing/2010/main">
+                <a:solidFill>
+                  <a:srgbClr val="FFFFFF"/>
+                </a:solidFill>
+              </a14:hiddenFill>
+            </a:ext>
+          </a:extLst>
         </p:spPr>
-        <p:txBody>
-          <a:bodyPr/>
-          <a:lstStyle/>
-          <a:p>
-            <a:pPr algn="ctr"/>
-            <a:r>
-              <a:rPr lang="en-US" dirty="0" smtClean="0"/>
-              <a:t>Objects</a:t>
-            </a:r>
-            <a:endParaRPr lang="en-US" dirty="0"/>
-          </a:p>
-        </p:txBody>
-      </p:sp>
+      </p:pic>
     </p:spTree>
     <p:extLst>
       <p:ext uri="{BB962C8B-B14F-4D97-AF65-F5344CB8AC3E}">
-        <p14:creationId xmlns:p14="http://schemas.microsoft.com/office/powerpoint/2010/main" val="1348343671"/>
+        <p14:creationId xmlns:p14="http://schemas.microsoft.com/office/powerpoint/2010/main" val="2840025437"/>
       </p:ext>
     </p:extLst>
   </p:cSld>
@@ -4847,54 +4896,164 @@
             <p:ph type="body" sz="quarter" idx="10"/>
           </p:nvPr>
         </p:nvSpPr>
-        <p:spPr/>
-        <p:txBody>
-          <a:bodyPr/>
+        <p:spPr>
+          <a:xfrm>
+            <a:off x="272144" y="914400"/>
+            <a:ext cx="8675404" cy="5683255"/>
+          </a:xfrm>
+        </p:spPr>
+        <p:txBody>
+          <a:bodyPr>
+            <a:noAutofit/>
+          </a:bodyPr>
           <a:lstStyle/>
           <a:p>
-            <a:endParaRPr lang="en-US"/>
-          </a:p>
-        </p:txBody>
-      </p:sp>
-      <p:sp>
-        <p:nvSpPr>
-          <p:cNvPr id="3" name="Підзаголовок 2"/>
-          <p:cNvSpPr>
-            <a:spLocks noGrp="1"/>
-          </p:cNvSpPr>
-          <p:nvPr>
-            <p:ph type="subTitle" idx="1"/>
-          </p:nvPr>
-        </p:nvSpPr>
-        <p:spPr/>
-        <p:txBody>
-          <a:bodyPr/>
-          <a:lstStyle/>
-          <a:p>
-            <a:r>
-              <a:rPr lang="en-US" dirty="0"/>
-              <a:t>H</a:t>
-            </a:r>
-            <a:r>
-              <a:rPr lang="en-AU" dirty="0" smtClean="0"/>
-              <a:t>ow </a:t>
-            </a:r>
-            <a:r>
-              <a:rPr lang="en-AU" dirty="0"/>
-              <a:t>constructors are </a:t>
-            </a:r>
-            <a:r>
-              <a:rPr lang="en-AU" dirty="0" smtClean="0"/>
-              <a:t>called?</a:t>
-            </a:r>
-            <a:endParaRPr lang="en-US" dirty="0"/>
+            <a:pPr algn="just"/>
+            <a:r>
+              <a:rPr lang="en-US" sz="2300" dirty="0"/>
+              <a:t>B</a:t>
+            </a:r>
+            <a:r>
+              <a:rPr lang="en-US" sz="2300" dirty="0" smtClean="0"/>
+              <a:t>efore </a:t>
+            </a:r>
+            <a:r>
+              <a:rPr lang="en-US" sz="2300" dirty="0"/>
+              <a:t>the execution of the method, the CLR finds </a:t>
+            </a:r>
+            <a:r>
+              <a:rPr lang="en-US" sz="2300" dirty="0" smtClean="0"/>
+              <a:t>all data</a:t>
+            </a:r>
+            <a:r>
+              <a:rPr lang="uk-UA" sz="2300" dirty="0" smtClean="0"/>
+              <a:t> </a:t>
+            </a:r>
+            <a:r>
+              <a:rPr lang="en-US" sz="2300" dirty="0" smtClean="0"/>
+              <a:t>types on which method is referenced. CLR </a:t>
+            </a:r>
+            <a:r>
+              <a:rPr lang="en-US" sz="2300" dirty="0"/>
+              <a:t>allocates internal data structures used to control access to referenced types.</a:t>
+            </a:r>
+            <a:endParaRPr lang="ru-RU" sz="2300" dirty="0" smtClean="0"/>
+          </a:p>
+          <a:p>
+            <a:pPr algn="just"/>
+            <a:r>
+              <a:rPr lang="en-US" sz="2300" dirty="0" smtClean="0"/>
+              <a:t>This structure </a:t>
+            </a:r>
+            <a:r>
+              <a:rPr lang="en-US" sz="2300" dirty="0"/>
+              <a:t>contains one record for each method defined </a:t>
+            </a:r>
+            <a:r>
+              <a:rPr lang="en-US" sz="2300" dirty="0" smtClean="0"/>
+              <a:t>in </a:t>
+            </a:r>
+            <a:r>
+              <a:rPr lang="en-US" sz="2300" dirty="0"/>
+              <a:t>type. R</a:t>
+            </a:r>
+            <a:r>
+              <a:rPr lang="en-US" sz="2300" dirty="0" smtClean="0"/>
+              <a:t>ecord contains address of </a:t>
+            </a:r>
+            <a:r>
+              <a:rPr lang="en-US" sz="2300" dirty="0"/>
+              <a:t>method </a:t>
+            </a:r>
+            <a:r>
+              <a:rPr lang="en-US" sz="2300" dirty="0" smtClean="0"/>
+              <a:t> implementation.</a:t>
+            </a:r>
+            <a:endParaRPr lang="uk-UA" sz="2300" dirty="0" smtClean="0"/>
+          </a:p>
+          <a:p>
+            <a:pPr algn="just"/>
+            <a:r>
+              <a:rPr lang="en-US" sz="2300" dirty="0" smtClean="0"/>
+              <a:t>When </a:t>
+            </a:r>
+            <a:r>
+              <a:rPr lang="en-US" sz="2300" dirty="0"/>
+              <a:t>structure is initialized, the CLR writes to </a:t>
+            </a:r>
+            <a:r>
+              <a:rPr lang="en-US" sz="2300" dirty="0" smtClean="0"/>
+              <a:t>record </a:t>
+            </a:r>
+            <a:r>
+              <a:rPr lang="en-US" sz="2300" dirty="0"/>
+              <a:t>the address of </a:t>
+            </a:r>
+            <a:r>
+              <a:rPr lang="en-US" sz="2300" dirty="0" smtClean="0"/>
+              <a:t>internal </a:t>
+            </a:r>
+            <a:r>
+              <a:rPr lang="en-US" sz="2300" dirty="0"/>
+              <a:t>undocumented function contained in the CLR itself</a:t>
+            </a:r>
+            <a:r>
+              <a:rPr lang="en-US" sz="2300" dirty="0" smtClean="0"/>
+              <a:t>.</a:t>
+            </a:r>
+          </a:p>
+          <a:p>
+            <a:pPr algn="just"/>
+            <a:r>
+              <a:rPr lang="en-US" sz="2300" dirty="0" smtClean="0"/>
+              <a:t>It </a:t>
+            </a:r>
+            <a:r>
+              <a:rPr lang="en-US" sz="2300" dirty="0"/>
+              <a:t>is responsible for compiling the IL-code of the called method into processor instructions, </a:t>
+            </a:r>
+            <a:r>
+              <a:rPr lang="en-US" sz="2300" dirty="0" smtClean="0"/>
+              <a:t>and stores them </a:t>
+            </a:r>
+            <a:r>
+              <a:rPr lang="en-US" sz="2300" dirty="0"/>
+              <a:t>in the dynamic </a:t>
+            </a:r>
+            <a:r>
+              <a:rPr lang="en-US" sz="2300" dirty="0" smtClean="0"/>
+              <a:t>memory. </a:t>
+            </a:r>
+            <a:r>
+              <a:rPr lang="en-US" sz="2300" dirty="0"/>
+              <a:t>Because the IL code is compiled just before execution ("just in time"), this CLR component is often called a JIT compiler</a:t>
+            </a:r>
+            <a:r>
+              <a:rPr lang="en-US" sz="2300" dirty="0" smtClean="0"/>
+              <a:t>.</a:t>
+            </a:r>
+          </a:p>
+          <a:p>
+            <a:pPr algn="just"/>
+            <a:r>
+              <a:rPr lang="en-US" sz="2300" dirty="0"/>
+              <a:t>After that, </a:t>
+            </a:r>
+            <a:r>
+              <a:rPr lang="en-US" sz="2300" dirty="0" err="1"/>
+              <a:t>JITCompiler</a:t>
+            </a:r>
+            <a:r>
+              <a:rPr lang="en-US" sz="2300" dirty="0"/>
+              <a:t> returns to the internal data structure of the type, and replaces the address of the called method with the address of the block of memory containing the ready machine instructions.</a:t>
+            </a:r>
           </a:p>
         </p:txBody>
       </p:sp>
     </p:spTree>
     <p:extLst>
       <p:ext uri="{BB962C8B-B14F-4D97-AF65-F5344CB8AC3E}">
-        <p14:creationId xmlns:p14="http://schemas.microsoft.com/office/powerpoint/2010/main" val="38760883"/>
+        <p14:creationId xmlns:p14="http://schemas.microsoft.com/office/powerpoint/2010/main" val="2346657971"/>
       </p:ext>
     </p:extLst>
   </p:cSld>
@@ -4923,6 +5082,149 @@
       </p:grpSpPr>
       <p:sp>
         <p:nvSpPr>
+          <p:cNvPr id="2" name="Заголовок 1"/>
+          <p:cNvSpPr>
+            <a:spLocks noGrp="1"/>
+          </p:cNvSpPr>
+          <p:nvPr>
+            <p:ph type="ctrTitle"/>
+          </p:nvPr>
+        </p:nvSpPr>
+        <p:spPr>
+          <a:xfrm>
+            <a:off x="1853239" y="2664373"/>
+            <a:ext cx="5723313" cy="1058858"/>
+          </a:xfrm>
+        </p:spPr>
+        <p:txBody>
+          <a:bodyPr/>
+          <a:lstStyle/>
+          <a:p>
+            <a:pPr algn="ctr"/>
+            <a:r>
+              <a:rPr lang="en-US" dirty="0" smtClean="0"/>
+              <a:t>Objects</a:t>
+            </a:r>
+            <a:endParaRPr lang="en-US" dirty="0"/>
+          </a:p>
+        </p:txBody>
+      </p:sp>
+    </p:spTree>
+    <p:extLst>
+      <p:ext uri="{BB962C8B-B14F-4D97-AF65-F5344CB8AC3E}">
+        <p14:creationId xmlns:p14="http://schemas.microsoft.com/office/powerpoint/2010/main" val="1348343671"/>
+      </p:ext>
+    </p:extLst>
+  </p:cSld>
+  <p:clrMapOvr>
+    <a:masterClrMapping/>
+  </p:clrMapOvr>
+</p:sld>
+</file>
+
+<file path=ppt/slides/slide25.xml><?xml version="1.0" encoding="utf-8"?>
+<p:sld xmlns:a="http://schemas.openxmlformats.org/drawingml/2006/main" xmlns:r="http://schemas.openxmlformats.org/officeDocument/2006/relationships" xmlns:p="http://schemas.openxmlformats.org/presentationml/2006/main">
+  <p:cSld>
+    <p:spTree>
+      <p:nvGrpSpPr>
+        <p:cNvPr id="1" name=""/>
+        <p:cNvGrpSpPr/>
+        <p:nvPr/>
+      </p:nvGrpSpPr>
+      <p:grpSpPr>
+        <a:xfrm>
+          <a:off x="0" y="0"/>
+          <a:ext cx="0" cy="0"/>
+          <a:chOff x="0" y="0"/>
+          <a:chExt cx="0" cy="0"/>
+        </a:xfrm>
+      </p:grpSpPr>
+      <p:sp>
+        <p:nvSpPr>
+          <p:cNvPr id="2" name="Місце для тексту 1"/>
+          <p:cNvSpPr>
+            <a:spLocks noGrp="1"/>
+          </p:cNvSpPr>
+          <p:nvPr>
+            <p:ph type="body" sz="quarter" idx="10"/>
+          </p:nvPr>
+        </p:nvSpPr>
+        <p:spPr/>
+        <p:txBody>
+          <a:bodyPr/>
+          <a:lstStyle/>
+          <a:p>
+            <a:endParaRPr lang="en-US"/>
+          </a:p>
+        </p:txBody>
+      </p:sp>
+      <p:sp>
+        <p:nvSpPr>
+          <p:cNvPr id="3" name="Підзаголовок 2"/>
+          <p:cNvSpPr>
+            <a:spLocks noGrp="1"/>
+          </p:cNvSpPr>
+          <p:nvPr>
+            <p:ph type="subTitle" idx="1"/>
+          </p:nvPr>
+        </p:nvSpPr>
+        <p:spPr/>
+        <p:txBody>
+          <a:bodyPr/>
+          <a:lstStyle/>
+          <a:p>
+            <a:r>
+              <a:rPr lang="en-US" dirty="0"/>
+              <a:t>H</a:t>
+            </a:r>
+            <a:r>
+              <a:rPr lang="en-AU" dirty="0" smtClean="0"/>
+              <a:t>ow </a:t>
+            </a:r>
+            <a:r>
+              <a:rPr lang="en-AU" dirty="0"/>
+              <a:t>constructors are </a:t>
+            </a:r>
+            <a:r>
+              <a:rPr lang="en-AU" dirty="0" smtClean="0"/>
+              <a:t>called?</a:t>
+            </a:r>
+            <a:endParaRPr lang="en-US" dirty="0"/>
+          </a:p>
+        </p:txBody>
+      </p:sp>
+    </p:spTree>
+    <p:extLst>
+      <p:ext uri="{BB962C8B-B14F-4D97-AF65-F5344CB8AC3E}">
+        <p14:creationId xmlns:p14="http://schemas.microsoft.com/office/powerpoint/2010/main" val="38760883"/>
+      </p:ext>
+    </p:extLst>
+  </p:cSld>
+  <p:clrMapOvr>
+    <a:masterClrMapping/>
+  </p:clrMapOvr>
+</p:sld>
+</file>
+
+<file path=ppt/slides/slide26.xml><?xml version="1.0" encoding="utf-8"?>
+<p:sld xmlns:a="http://schemas.openxmlformats.org/drawingml/2006/main" xmlns:r="http://schemas.openxmlformats.org/officeDocument/2006/relationships" xmlns:p="http://schemas.openxmlformats.org/presentationml/2006/main">
+  <p:cSld>
+    <p:spTree>
+      <p:nvGrpSpPr>
+        <p:cNvPr id="1" name=""/>
+        <p:cNvGrpSpPr/>
+        <p:nvPr/>
+      </p:nvGrpSpPr>
+      <p:grpSpPr>
+        <a:xfrm>
+          <a:off x="0" y="0"/>
+          <a:ext cx="0" cy="0"/>
+          <a:chOff x="0" y="0"/>
+          <a:chExt cx="0" cy="0"/>
+        </a:xfrm>
+      </p:grpSpPr>
+      <p:sp>
+        <p:nvSpPr>
           <p:cNvPr id="2" name="Місце для тексту 1"/>
           <p:cNvSpPr>
             <a:spLocks noGrp="1"/>
@@ -4988,7 +5290,7 @@
 </p:sld>
 </file>
 
-<file path=ppt/slides/slide25.xml><?xml version="1.0" encoding="utf-8"?>
+<file path=ppt/slides/slide27.xml><?xml version="1.0" encoding="utf-8"?>
 <p:sld xmlns:a="http://schemas.openxmlformats.org/drawingml/2006/main" xmlns:r="http://schemas.openxmlformats.org/officeDocument/2006/relationships" xmlns:p="http://schemas.openxmlformats.org/presentationml/2006/main">
   <p:cSld>
     <p:spTree>
@@ -5855,7 +6157,6 @@
               <a:rPr lang="en-US" dirty="0" smtClean="0"/>
               <a:t>Managed code components</a:t>
             </a:r>
-            <a:endParaRPr lang="en-US" dirty="0" smtClean="0"/>
           </a:p>
         </p:txBody>
       </p:sp>
@@ -6608,7 +6909,7 @@
   <a:extraClrSchemeLst/>
   <a:extLst>
     <a:ext uri="{05A4C25C-085E-4340-85A3-A5531E510DB2}">
-      <thm15:themeFamily xmlns="" xmlns:thm15="http://schemas.microsoft.com/office/thememl/2012/main" name="Office Theme" id="{62F939B6-93AF-4DB8-9C6B-D6C7DFDC589F}" vid="{4A3C46E8-61CC-4603-A589-7422A47A8E4A}"/>
+      <thm15:themeFamily xmlns:thm15="http://schemas.microsoft.com/office/thememl/2012/main" xmlns="" name="Office Theme" id="{62F939B6-93AF-4DB8-9C6B-D6C7DFDC589F}" vid="{4A3C46E8-61CC-4603-A589-7422A47A8E4A}"/>
     </a:ext>
   </a:extLst>
 </a:theme>
@@ -6809,7 +7110,7 @@
   <a:extraClrSchemeLst/>
   <a:extLst>
     <a:ext uri="{05A4C25C-085E-4340-85A3-A5531E510DB2}">
-      <thm15:themeFamily xmlns="" xmlns:thm15="http://schemas.microsoft.com/office/thememl/2012/main" name="Office Theme" id="{62F939B6-93AF-4DB8-9C6B-D6C7DFDC589F}" vid="{4A3C46E8-61CC-4603-A589-7422A47A8E4A}"/>
+      <thm15:themeFamily xmlns:thm15="http://schemas.microsoft.com/office/thememl/2012/main" xmlns="" name="Office Theme" id="{62F939B6-93AF-4DB8-9C6B-D6C7DFDC589F}" vid="{4A3C46E8-61CC-4603-A589-7422A47A8E4A}"/>
     </a:ext>
   </a:extLst>
 </a:theme>
@@ -7010,7 +7311,7 @@
   <a:extraClrSchemeLst/>
   <a:extLst>
     <a:ext uri="{05A4C25C-085E-4340-85A3-A5531E510DB2}">
-      <thm15:themeFamily xmlns="" xmlns:thm15="http://schemas.microsoft.com/office/thememl/2012/main" name="Office Theme" id="{62F939B6-93AF-4DB8-9C6B-D6C7DFDC589F}" vid="{4A3C46E8-61CC-4603-A589-7422A47A8E4A}"/>
+      <thm15:themeFamily xmlns:thm15="http://schemas.microsoft.com/office/thememl/2012/main" xmlns="" name="Office Theme" id="{62F939B6-93AF-4DB8-9C6B-D6C7DFDC589F}" vid="{4A3C46E8-61CC-4603-A589-7422A47A8E4A}"/>
     </a:ext>
   </a:extLst>
 </a:theme>
@@ -7271,7 +7572,7 @@
   <a:extraClrSchemeLst/>
   <a:extLst>
     <a:ext uri="{05A4C25C-085E-4340-85A3-A5531E510DB2}">
-      <thm15:themeFamily xmlns="" xmlns:thm15="http://schemas.microsoft.com/office/thememl/2012/main" name="Office Theme" id="{62F939B6-93AF-4DB8-9C6B-D6C7DFDC589F}" vid="{4A3C46E8-61CC-4603-A589-7422A47A8E4A}"/>
+      <thm15:themeFamily xmlns:thm15="http://schemas.microsoft.com/office/thememl/2012/main" xmlns="" name="Office Theme" id="{62F939B6-93AF-4DB8-9C6B-D6C7DFDC589F}" vid="{4A3C46E8-61CC-4603-A589-7422A47A8E4A}"/>
     </a:ext>
   </a:extLst>
 </a:theme>

</xml_diff>

<commit_message>
Transferred additional information to the notes Add information about manifest and .net security
</commit_message>
<xml_diff>
--- a/Education/Execution model.pptx
+++ b/Education/Execution model.pptx
@@ -6,33 +6,36 @@
     <p:sldMasterId id="2147483676" r:id="rId2"/>
     <p:sldMasterId id="2147483686" r:id="rId3"/>
   </p:sldMasterIdLst>
+  <p:notesMasterIdLst>
+    <p:notesMasterId r:id="rId31"/>
+  </p:notesMasterIdLst>
   <p:handoutMasterIdLst>
-    <p:handoutMasterId r:id="rId31"/>
+    <p:handoutMasterId r:id="rId32"/>
   </p:handoutMasterIdLst>
   <p:sldIdLst>
     <p:sldId id="287" r:id="rId4"/>
     <p:sldId id="268" r:id="rId5"/>
     <p:sldId id="288" r:id="rId6"/>
     <p:sldId id="314" r:id="rId7"/>
-    <p:sldId id="290" r:id="rId8"/>
-    <p:sldId id="289" r:id="rId9"/>
+    <p:sldId id="289" r:id="rId8"/>
+    <p:sldId id="290" r:id="rId9"/>
     <p:sldId id="291" r:id="rId10"/>
     <p:sldId id="292" r:id="rId11"/>
     <p:sldId id="293" r:id="rId12"/>
     <p:sldId id="295" r:id="rId13"/>
     <p:sldId id="303" r:id="rId14"/>
-    <p:sldId id="294" r:id="rId15"/>
+    <p:sldId id="317" r:id="rId15"/>
     <p:sldId id="296" r:id="rId16"/>
-    <p:sldId id="297" r:id="rId17"/>
+    <p:sldId id="318" r:id="rId17"/>
     <p:sldId id="298" r:id="rId18"/>
     <p:sldId id="304" r:id="rId19"/>
     <p:sldId id="307" r:id="rId20"/>
     <p:sldId id="305" r:id="rId21"/>
     <p:sldId id="306" r:id="rId22"/>
-    <p:sldId id="308" r:id="rId23"/>
-    <p:sldId id="309" r:id="rId24"/>
-    <p:sldId id="315" r:id="rId25"/>
-    <p:sldId id="316" r:id="rId26"/>
+    <p:sldId id="316" r:id="rId23"/>
+    <p:sldId id="308" r:id="rId24"/>
+    <p:sldId id="309" r:id="rId25"/>
+    <p:sldId id="315" r:id="rId26"/>
     <p:sldId id="310" r:id="rId27"/>
     <p:sldId id="311" r:id="rId28"/>
     <p:sldId id="312" r:id="rId29"/>
@@ -137,7 +140,7 @@
   </p:defaultTextStyle>
   <p:extLst>
     <p:ext uri="{EFAFB233-063F-42B5-8137-9DF3F51BA10A}">
-      <p15:sldGuideLst xmlns:p15="http://schemas.microsoft.com/office/powerpoint/2012/main" xmlns="">
+      <p15:sldGuideLst xmlns="" xmlns:p15="http://schemas.microsoft.com/office/powerpoint/2012/main">
         <p15:guide id="2" pos="2880" userDrawn="1">
           <p15:clr>
             <a:srgbClr val="A4A3A4"/>
@@ -156,7 +159,7 @@
       </p15:sldGuideLst>
     </p:ext>
     <p:ext uri="{2D200454-40CA-4A62-9FC3-DE9A4176ACB9}">
-      <p15:notesGuideLst xmlns:p15="http://schemas.microsoft.com/office/powerpoint/2012/main" xmlns=""/>
+      <p15:notesGuideLst xmlns="" xmlns:p15="http://schemas.microsoft.com/office/powerpoint/2012/main"/>
     </p:ext>
   </p:extLst>
 </p:presentation>
@@ -244,7 +247,7 @@
           <a:p>
             <a:fld id="{4DF7676A-16FE-41B0-990D-65C7DB39A42C}" type="datetimeFigureOut">
               <a:rPr lang="uk-UA" smtClean="0"/>
-              <a:t>15.10.2017</a:t>
+              <a:t>16.10.2017</a:t>
             </a:fld>
             <a:endParaRPr lang="uk-UA"/>
           </a:p>
@@ -325,6 +328,1209 @@
   </p:cSld>
   <p:clrMap bg1="lt1" tx1="dk1" bg2="lt2" tx2="dk2" accent1="accent1" accent2="accent2" accent3="accent3" accent4="accent4" accent5="accent5" accent6="accent6" hlink="hlink" folHlink="folHlink"/>
 </p:handoutMaster>
+</file>
+
+<file path=ppt/notesMasters/notesMaster1.xml><?xml version="1.0" encoding="utf-8"?>
+<p:notesMaster xmlns:a="http://schemas.openxmlformats.org/drawingml/2006/main" xmlns:r="http://schemas.openxmlformats.org/officeDocument/2006/relationships" xmlns:p="http://schemas.openxmlformats.org/presentationml/2006/main">
+  <p:cSld>
+    <p:bg>
+      <p:bgRef idx="1001">
+        <a:schemeClr val="bg1"/>
+      </p:bgRef>
+    </p:bg>
+    <p:spTree>
+      <p:nvGrpSpPr>
+        <p:cNvPr id="1" name=""/>
+        <p:cNvGrpSpPr/>
+        <p:nvPr/>
+      </p:nvGrpSpPr>
+      <p:grpSpPr>
+        <a:xfrm>
+          <a:off x="0" y="0"/>
+          <a:ext cx="0" cy="0"/>
+          <a:chOff x="0" y="0"/>
+          <a:chExt cx="0" cy="0"/>
+        </a:xfrm>
+      </p:grpSpPr>
+      <p:sp>
+        <p:nvSpPr>
+          <p:cNvPr id="2" name="Місце для верхнього колонтитула 1"/>
+          <p:cNvSpPr>
+            <a:spLocks noGrp="1"/>
+          </p:cNvSpPr>
+          <p:nvPr>
+            <p:ph type="hdr" sz="quarter"/>
+          </p:nvPr>
+        </p:nvSpPr>
+        <p:spPr>
+          <a:xfrm>
+            <a:off x="0" y="0"/>
+            <a:ext cx="2971800" cy="457200"/>
+          </a:xfrm>
+          <a:prstGeom prst="rect">
+            <a:avLst/>
+          </a:prstGeom>
+        </p:spPr>
+        <p:txBody>
+          <a:bodyPr vert="horz" lIns="91440" tIns="45720" rIns="91440" bIns="45720" rtlCol="0"/>
+          <a:lstStyle>
+            <a:lvl1pPr algn="l">
+              <a:defRPr sz="1200"/>
+            </a:lvl1pPr>
+          </a:lstStyle>
+          <a:p>
+            <a:endParaRPr lang="en-US"/>
+          </a:p>
+        </p:txBody>
+      </p:sp>
+      <p:sp>
+        <p:nvSpPr>
+          <p:cNvPr id="3" name="Місце для дати 2"/>
+          <p:cNvSpPr>
+            <a:spLocks noGrp="1"/>
+          </p:cNvSpPr>
+          <p:nvPr>
+            <p:ph type="dt" idx="1"/>
+          </p:nvPr>
+        </p:nvSpPr>
+        <p:spPr>
+          <a:xfrm>
+            <a:off x="3884613" y="0"/>
+            <a:ext cx="2971800" cy="457200"/>
+          </a:xfrm>
+          <a:prstGeom prst="rect">
+            <a:avLst/>
+          </a:prstGeom>
+        </p:spPr>
+        <p:txBody>
+          <a:bodyPr vert="horz" lIns="91440" tIns="45720" rIns="91440" bIns="45720" rtlCol="0"/>
+          <a:lstStyle>
+            <a:lvl1pPr algn="r">
+              <a:defRPr sz="1200"/>
+            </a:lvl1pPr>
+          </a:lstStyle>
+          <a:p>
+            <a:fld id="{7AC0486E-ABFE-43FA-BADE-5C75804AABCB}" type="datetimeFigureOut">
+              <a:rPr lang="en-US" smtClean="0"/>
+              <a:t>10/16/2017</a:t>
+            </a:fld>
+            <a:endParaRPr lang="en-US"/>
+          </a:p>
+        </p:txBody>
+      </p:sp>
+      <p:sp>
+        <p:nvSpPr>
+          <p:cNvPr id="4" name="Місце для зображення 3"/>
+          <p:cNvSpPr>
+            <a:spLocks noGrp="1" noRot="1" noChangeAspect="1"/>
+          </p:cNvSpPr>
+          <p:nvPr>
+            <p:ph type="sldImg" idx="2"/>
+          </p:nvPr>
+        </p:nvSpPr>
+        <p:spPr>
+          <a:xfrm>
+            <a:off x="1143000" y="685800"/>
+            <a:ext cx="4572000" cy="3429000"/>
+          </a:xfrm>
+          <a:prstGeom prst="rect">
+            <a:avLst/>
+          </a:prstGeom>
+          <a:noFill/>
+          <a:ln w="12700">
+            <a:solidFill>
+              <a:prstClr val="black"/>
+            </a:solidFill>
+          </a:ln>
+        </p:spPr>
+        <p:txBody>
+          <a:bodyPr vert="horz" lIns="91440" tIns="45720" rIns="91440" bIns="45720" rtlCol="0" anchor="ctr"/>
+          <a:lstStyle/>
+          <a:p>
+            <a:endParaRPr lang="en-US"/>
+          </a:p>
+        </p:txBody>
+      </p:sp>
+      <p:sp>
+        <p:nvSpPr>
+          <p:cNvPr id="5" name="Місце для нотаток 4"/>
+          <p:cNvSpPr>
+            <a:spLocks noGrp="1"/>
+          </p:cNvSpPr>
+          <p:nvPr>
+            <p:ph type="body" sz="quarter" idx="3"/>
+          </p:nvPr>
+        </p:nvSpPr>
+        <p:spPr>
+          <a:xfrm>
+            <a:off x="685800" y="4343400"/>
+            <a:ext cx="5486400" cy="4114800"/>
+          </a:xfrm>
+          <a:prstGeom prst="rect">
+            <a:avLst/>
+          </a:prstGeom>
+        </p:spPr>
+        <p:txBody>
+          <a:bodyPr vert="horz" lIns="91440" tIns="45720" rIns="91440" bIns="45720" rtlCol="0"/>
+          <a:lstStyle/>
+          <a:p>
+            <a:pPr lvl="0"/>
+            <a:r>
+              <a:rPr lang="uk-UA" smtClean="0"/>
+              <a:t>Зразок тексту</a:t>
+            </a:r>
+          </a:p>
+          <a:p>
+            <a:pPr lvl="1"/>
+            <a:r>
+              <a:rPr lang="uk-UA" smtClean="0"/>
+              <a:t>Другий рівень</a:t>
+            </a:r>
+          </a:p>
+          <a:p>
+            <a:pPr lvl="2"/>
+            <a:r>
+              <a:rPr lang="uk-UA" smtClean="0"/>
+              <a:t>Третій рівень</a:t>
+            </a:r>
+          </a:p>
+          <a:p>
+            <a:pPr lvl="3"/>
+            <a:r>
+              <a:rPr lang="uk-UA" smtClean="0"/>
+              <a:t>Четвертий рівень</a:t>
+            </a:r>
+          </a:p>
+          <a:p>
+            <a:pPr lvl="4"/>
+            <a:r>
+              <a:rPr lang="uk-UA" smtClean="0"/>
+              <a:t>П'ятий рівень</a:t>
+            </a:r>
+            <a:endParaRPr lang="en-US"/>
+          </a:p>
+        </p:txBody>
+      </p:sp>
+      <p:sp>
+        <p:nvSpPr>
+          <p:cNvPr id="6" name="Місце для нижнього колонтитула 5"/>
+          <p:cNvSpPr>
+            <a:spLocks noGrp="1"/>
+          </p:cNvSpPr>
+          <p:nvPr>
+            <p:ph type="ftr" sz="quarter" idx="4"/>
+          </p:nvPr>
+        </p:nvSpPr>
+        <p:spPr>
+          <a:xfrm>
+            <a:off x="0" y="8685213"/>
+            <a:ext cx="2971800" cy="457200"/>
+          </a:xfrm>
+          <a:prstGeom prst="rect">
+            <a:avLst/>
+          </a:prstGeom>
+        </p:spPr>
+        <p:txBody>
+          <a:bodyPr vert="horz" lIns="91440" tIns="45720" rIns="91440" bIns="45720" rtlCol="0" anchor="b"/>
+          <a:lstStyle>
+            <a:lvl1pPr algn="l">
+              <a:defRPr sz="1200"/>
+            </a:lvl1pPr>
+          </a:lstStyle>
+          <a:p>
+            <a:endParaRPr lang="en-US"/>
+          </a:p>
+        </p:txBody>
+      </p:sp>
+      <p:sp>
+        <p:nvSpPr>
+          <p:cNvPr id="7" name="Місце для номера слайда 6"/>
+          <p:cNvSpPr>
+            <a:spLocks noGrp="1"/>
+          </p:cNvSpPr>
+          <p:nvPr>
+            <p:ph type="sldNum" sz="quarter" idx="5"/>
+          </p:nvPr>
+        </p:nvSpPr>
+        <p:spPr>
+          <a:xfrm>
+            <a:off x="3884613" y="8685213"/>
+            <a:ext cx="2971800" cy="457200"/>
+          </a:xfrm>
+          <a:prstGeom prst="rect">
+            <a:avLst/>
+          </a:prstGeom>
+        </p:spPr>
+        <p:txBody>
+          <a:bodyPr vert="horz" lIns="91440" tIns="45720" rIns="91440" bIns="45720" rtlCol="0" anchor="b"/>
+          <a:lstStyle>
+            <a:lvl1pPr algn="r">
+              <a:defRPr sz="1200"/>
+            </a:lvl1pPr>
+          </a:lstStyle>
+          <a:p>
+            <a:fld id="{E82F8FD2-9FCC-4B88-9227-FECD3AD2150F}" type="slidenum">
+              <a:rPr lang="en-US" smtClean="0"/>
+              <a:t>‹№›</a:t>
+            </a:fld>
+            <a:endParaRPr lang="en-US"/>
+          </a:p>
+        </p:txBody>
+      </p:sp>
+    </p:spTree>
+    <p:extLst>
+      <p:ext uri="{BB962C8B-B14F-4D97-AF65-F5344CB8AC3E}">
+        <p14:creationId xmlns:p14="http://schemas.microsoft.com/office/powerpoint/2010/main" val="738362828"/>
+      </p:ext>
+    </p:extLst>
+  </p:cSld>
+  <p:clrMap bg1="lt1" tx1="dk1" bg2="lt2" tx2="dk2" accent1="accent1" accent2="accent2" accent3="accent3" accent4="accent4" accent5="accent5" accent6="accent6" hlink="hlink" folHlink="folHlink"/>
+  <p:notesStyle>
+    <a:lvl1pPr marL="0" algn="l" defTabSz="914400" rtl="0" eaLnBrk="1" latinLnBrk="0" hangingPunct="1">
+      <a:defRPr sz="1200" kern="1200">
+        <a:solidFill>
+          <a:schemeClr val="tx1"/>
+        </a:solidFill>
+        <a:latin typeface="+mn-lt"/>
+        <a:ea typeface="+mn-ea"/>
+        <a:cs typeface="+mn-cs"/>
+      </a:defRPr>
+    </a:lvl1pPr>
+    <a:lvl2pPr marL="457200" algn="l" defTabSz="914400" rtl="0" eaLnBrk="1" latinLnBrk="0" hangingPunct="1">
+      <a:defRPr sz="1200" kern="1200">
+        <a:solidFill>
+          <a:schemeClr val="tx1"/>
+        </a:solidFill>
+        <a:latin typeface="+mn-lt"/>
+        <a:ea typeface="+mn-ea"/>
+        <a:cs typeface="+mn-cs"/>
+      </a:defRPr>
+    </a:lvl2pPr>
+    <a:lvl3pPr marL="914400" algn="l" defTabSz="914400" rtl="0" eaLnBrk="1" latinLnBrk="0" hangingPunct="1">
+      <a:defRPr sz="1200" kern="1200">
+        <a:solidFill>
+          <a:schemeClr val="tx1"/>
+        </a:solidFill>
+        <a:latin typeface="+mn-lt"/>
+        <a:ea typeface="+mn-ea"/>
+        <a:cs typeface="+mn-cs"/>
+      </a:defRPr>
+    </a:lvl3pPr>
+    <a:lvl4pPr marL="1371600" algn="l" defTabSz="914400" rtl="0" eaLnBrk="1" latinLnBrk="0" hangingPunct="1">
+      <a:defRPr sz="1200" kern="1200">
+        <a:solidFill>
+          <a:schemeClr val="tx1"/>
+        </a:solidFill>
+        <a:latin typeface="+mn-lt"/>
+        <a:ea typeface="+mn-ea"/>
+        <a:cs typeface="+mn-cs"/>
+      </a:defRPr>
+    </a:lvl4pPr>
+    <a:lvl5pPr marL="1828800" algn="l" defTabSz="914400" rtl="0" eaLnBrk="1" latinLnBrk="0" hangingPunct="1">
+      <a:defRPr sz="1200" kern="1200">
+        <a:solidFill>
+          <a:schemeClr val="tx1"/>
+        </a:solidFill>
+        <a:latin typeface="+mn-lt"/>
+        <a:ea typeface="+mn-ea"/>
+        <a:cs typeface="+mn-cs"/>
+      </a:defRPr>
+    </a:lvl5pPr>
+    <a:lvl6pPr marL="2286000" algn="l" defTabSz="914400" rtl="0" eaLnBrk="1" latinLnBrk="0" hangingPunct="1">
+      <a:defRPr sz="1200" kern="1200">
+        <a:solidFill>
+          <a:schemeClr val="tx1"/>
+        </a:solidFill>
+        <a:latin typeface="+mn-lt"/>
+        <a:ea typeface="+mn-ea"/>
+        <a:cs typeface="+mn-cs"/>
+      </a:defRPr>
+    </a:lvl6pPr>
+    <a:lvl7pPr marL="2743200" algn="l" defTabSz="914400" rtl="0" eaLnBrk="1" latinLnBrk="0" hangingPunct="1">
+      <a:defRPr sz="1200" kern="1200">
+        <a:solidFill>
+          <a:schemeClr val="tx1"/>
+        </a:solidFill>
+        <a:latin typeface="+mn-lt"/>
+        <a:ea typeface="+mn-ea"/>
+        <a:cs typeface="+mn-cs"/>
+      </a:defRPr>
+    </a:lvl7pPr>
+    <a:lvl8pPr marL="3200400" algn="l" defTabSz="914400" rtl="0" eaLnBrk="1" latinLnBrk="0" hangingPunct="1">
+      <a:defRPr sz="1200" kern="1200">
+        <a:solidFill>
+          <a:schemeClr val="tx1"/>
+        </a:solidFill>
+        <a:latin typeface="+mn-lt"/>
+        <a:ea typeface="+mn-ea"/>
+        <a:cs typeface="+mn-cs"/>
+      </a:defRPr>
+    </a:lvl8pPr>
+    <a:lvl9pPr marL="3657600" algn="l" defTabSz="914400" rtl="0" eaLnBrk="1" latinLnBrk="0" hangingPunct="1">
+      <a:defRPr sz="1200" kern="1200">
+        <a:solidFill>
+          <a:schemeClr val="tx1"/>
+        </a:solidFill>
+        <a:latin typeface="+mn-lt"/>
+        <a:ea typeface="+mn-ea"/>
+        <a:cs typeface="+mn-cs"/>
+      </a:defRPr>
+    </a:lvl9pPr>
+  </p:notesStyle>
+</p:notesMaster>
+</file>
+
+<file path=ppt/notesSlides/notesSlide1.xml><?xml version="1.0" encoding="utf-8"?>
+<p:notes xmlns:a="http://schemas.openxmlformats.org/drawingml/2006/main" xmlns:r="http://schemas.openxmlformats.org/officeDocument/2006/relationships" xmlns:p="http://schemas.openxmlformats.org/presentationml/2006/main">
+  <p:cSld>
+    <p:spTree>
+      <p:nvGrpSpPr>
+        <p:cNvPr id="1" name=""/>
+        <p:cNvGrpSpPr/>
+        <p:nvPr/>
+      </p:nvGrpSpPr>
+      <p:grpSpPr>
+        <a:xfrm>
+          <a:off x="0" y="0"/>
+          <a:ext cx="0" cy="0"/>
+          <a:chOff x="0" y="0"/>
+          <a:chExt cx="0" cy="0"/>
+        </a:xfrm>
+      </p:grpSpPr>
+      <p:sp>
+        <p:nvSpPr>
+          <p:cNvPr id="2" name="Місце для зображення 1"/>
+          <p:cNvSpPr>
+            <a:spLocks noGrp="1" noRot="1" noChangeAspect="1"/>
+          </p:cNvSpPr>
+          <p:nvPr>
+            <p:ph type="sldImg"/>
+          </p:nvPr>
+        </p:nvSpPr>
+        <p:spPr/>
+      </p:sp>
+      <p:sp>
+        <p:nvSpPr>
+          <p:cNvPr id="3" name="Місце для нотаток 2"/>
+          <p:cNvSpPr>
+            <a:spLocks noGrp="1"/>
+          </p:cNvSpPr>
+          <p:nvPr>
+            <p:ph type="body" idx="1"/>
+          </p:nvPr>
+        </p:nvSpPr>
+        <p:spPr/>
+        <p:txBody>
+          <a:bodyPr/>
+          <a:lstStyle/>
+          <a:p>
+            <a:r>
+              <a:rPr lang="uk-UA" dirty="0" smtClean="0"/>
+              <a:t>* </a:t>
+            </a:r>
+            <a:r>
+              <a:rPr lang="en-US" dirty="0" smtClean="0"/>
+              <a:t>Because the code is compiled during the installation phase, the JIT compiler does not have to compile it at run time, which can improve the performance of the application. </a:t>
+            </a:r>
+          </a:p>
+          <a:p>
+            <a:r>
+              <a:rPr lang="en-US" dirty="0" smtClean="0"/>
+              <a:t>The NGen.exe program is useful in two situations.</a:t>
+            </a:r>
+          </a:p>
+          <a:p>
+            <a:r>
+              <a:rPr lang="en-US" dirty="0" smtClean="0"/>
+              <a:t>- accelerate the launch of the application. </a:t>
+            </a:r>
+          </a:p>
+          <a:p>
+            <a:r>
+              <a:rPr lang="en-US" dirty="0" smtClean="0"/>
+              <a:t>- reduce the working set of the application.</a:t>
+            </a:r>
+          </a:p>
+        </p:txBody>
+      </p:sp>
+      <p:sp>
+        <p:nvSpPr>
+          <p:cNvPr id="4" name="Місце для номера слайда 3"/>
+          <p:cNvSpPr>
+            <a:spLocks noGrp="1"/>
+          </p:cNvSpPr>
+          <p:nvPr>
+            <p:ph type="sldNum" sz="quarter" idx="10"/>
+          </p:nvPr>
+        </p:nvSpPr>
+        <p:spPr/>
+        <p:txBody>
+          <a:bodyPr/>
+          <a:lstStyle/>
+          <a:p>
+            <a:fld id="{E82F8FD2-9FCC-4B88-9227-FECD3AD2150F}" type="slidenum">
+              <a:rPr lang="en-US" smtClean="0"/>
+              <a:t>4</a:t>
+            </a:fld>
+            <a:endParaRPr lang="en-US"/>
+          </a:p>
+        </p:txBody>
+      </p:sp>
+    </p:spTree>
+    <p:extLst>
+      <p:ext uri="{BB962C8B-B14F-4D97-AF65-F5344CB8AC3E}">
+        <p14:creationId xmlns:p14="http://schemas.microsoft.com/office/powerpoint/2010/main" val="1705404284"/>
+      </p:ext>
+    </p:extLst>
+  </p:cSld>
+  <p:clrMapOvr>
+    <a:masterClrMapping/>
+  </p:clrMapOvr>
+</p:notes>
+</file>
+
+<file path=ppt/notesSlides/notesSlide2.xml><?xml version="1.0" encoding="utf-8"?>
+<p:notes xmlns:a="http://schemas.openxmlformats.org/drawingml/2006/main" xmlns:r="http://schemas.openxmlformats.org/officeDocument/2006/relationships" xmlns:p="http://schemas.openxmlformats.org/presentationml/2006/main">
+  <p:cSld>
+    <p:spTree>
+      <p:nvGrpSpPr>
+        <p:cNvPr id="1" name=""/>
+        <p:cNvGrpSpPr/>
+        <p:nvPr/>
+      </p:nvGrpSpPr>
+      <p:grpSpPr>
+        <a:xfrm>
+          <a:off x="0" y="0"/>
+          <a:ext cx="0" cy="0"/>
+          <a:chOff x="0" y="0"/>
+          <a:chExt cx="0" cy="0"/>
+        </a:xfrm>
+      </p:grpSpPr>
+      <p:sp>
+        <p:nvSpPr>
+          <p:cNvPr id="2" name="Місце для зображення 1"/>
+          <p:cNvSpPr>
+            <a:spLocks noGrp="1" noRot="1" noChangeAspect="1"/>
+          </p:cNvSpPr>
+          <p:nvPr>
+            <p:ph type="sldImg"/>
+          </p:nvPr>
+        </p:nvSpPr>
+        <p:spPr/>
+      </p:sp>
+      <p:sp>
+        <p:nvSpPr>
+          <p:cNvPr id="3" name="Місце для нотаток 2"/>
+          <p:cNvSpPr>
+            <a:spLocks noGrp="1"/>
+          </p:cNvSpPr>
+          <p:nvPr>
+            <p:ph type="body" idx="1"/>
+          </p:nvPr>
+        </p:nvSpPr>
+        <p:spPr/>
+        <p:txBody>
+          <a:bodyPr/>
+          <a:lstStyle/>
+          <a:p>
+            <a:pPr algn="just"/>
+            <a:r>
+              <a:rPr lang="en-US" sz="1200" dirty="0" smtClean="0"/>
+              <a:t>First, assembly is provides logical grouping of one or more managing modules and file resources. </a:t>
+            </a:r>
+          </a:p>
+          <a:p>
+            <a:pPr algn="just"/>
+            <a:r>
+              <a:rPr lang="en-US" sz="1200" dirty="0" smtClean="0"/>
+              <a:t>Secondly</a:t>
+            </a:r>
+            <a:r>
+              <a:rPr lang="ru-RU" sz="1200" dirty="0" smtClean="0"/>
+              <a:t>,</a:t>
+            </a:r>
+            <a:r>
+              <a:rPr lang="en-US" sz="1200" dirty="0" smtClean="0"/>
+              <a:t> it is the smallest unit of multiple use, security and version control.</a:t>
+            </a:r>
+            <a:r>
+              <a:rPr lang="ru-RU" sz="1200" dirty="0" smtClean="0"/>
+              <a:t> </a:t>
+            </a:r>
+            <a:endParaRPr lang="en-US" sz="1200" dirty="0" smtClean="0"/>
+          </a:p>
+          <a:p>
+            <a:pPr algn="just"/>
+            <a:r>
+              <a:rPr lang="en-US" sz="1200" dirty="0" smtClean="0"/>
+              <a:t>Assembly can consists of one or more files, it depends on selected tools and compilers.</a:t>
+            </a:r>
+          </a:p>
+          <a:p>
+            <a:pPr algn="just"/>
+            <a:r>
+              <a:rPr lang="en-US" sz="1200" dirty="0" smtClean="0"/>
+              <a:t>In the context of CLR, assembly is what we commonly call component.</a:t>
+            </a:r>
+            <a:endParaRPr lang="uk-UA" sz="1200" dirty="0" smtClean="0"/>
+          </a:p>
+        </p:txBody>
+      </p:sp>
+      <p:sp>
+        <p:nvSpPr>
+          <p:cNvPr id="4" name="Місце для номера слайда 3"/>
+          <p:cNvSpPr>
+            <a:spLocks noGrp="1"/>
+          </p:cNvSpPr>
+          <p:nvPr>
+            <p:ph type="sldNum" sz="quarter" idx="10"/>
+          </p:nvPr>
+        </p:nvSpPr>
+        <p:spPr/>
+        <p:txBody>
+          <a:bodyPr/>
+          <a:lstStyle/>
+          <a:p>
+            <a:fld id="{E82F8FD2-9FCC-4B88-9227-FECD3AD2150F}" type="slidenum">
+              <a:rPr lang="en-US" smtClean="0"/>
+              <a:t>11</a:t>
+            </a:fld>
+            <a:endParaRPr lang="en-US"/>
+          </a:p>
+        </p:txBody>
+      </p:sp>
+    </p:spTree>
+    <p:extLst>
+      <p:ext uri="{BB962C8B-B14F-4D97-AF65-F5344CB8AC3E}">
+        <p14:creationId xmlns:p14="http://schemas.microsoft.com/office/powerpoint/2010/main" val="1670745129"/>
+      </p:ext>
+    </p:extLst>
+  </p:cSld>
+  <p:clrMapOvr>
+    <a:masterClrMapping/>
+  </p:clrMapOvr>
+</p:notes>
+</file>
+
+<file path=ppt/notesSlides/notesSlide3.xml><?xml version="1.0" encoding="utf-8"?>
+<p:notes xmlns:a="http://schemas.openxmlformats.org/drawingml/2006/main" xmlns:r="http://schemas.openxmlformats.org/officeDocument/2006/relationships" xmlns:p="http://schemas.openxmlformats.org/presentationml/2006/main">
+  <p:cSld>
+    <p:spTree>
+      <p:nvGrpSpPr>
+        <p:cNvPr id="1" name=""/>
+        <p:cNvGrpSpPr/>
+        <p:nvPr/>
+      </p:nvGrpSpPr>
+      <p:grpSpPr>
+        <a:xfrm>
+          <a:off x="0" y="0"/>
+          <a:ext cx="0" cy="0"/>
+          <a:chOff x="0" y="0"/>
+          <a:chExt cx="0" cy="0"/>
+        </a:xfrm>
+      </p:grpSpPr>
+      <p:sp>
+        <p:nvSpPr>
+          <p:cNvPr id="2" name="Місце для зображення 1"/>
+          <p:cNvSpPr>
+            <a:spLocks noGrp="1" noRot="1" noChangeAspect="1"/>
+          </p:cNvSpPr>
+          <p:nvPr>
+            <p:ph type="sldImg"/>
+          </p:nvPr>
+        </p:nvSpPr>
+        <p:spPr/>
+      </p:sp>
+      <p:sp>
+        <p:nvSpPr>
+          <p:cNvPr id="3" name="Місце для нотаток 2"/>
+          <p:cNvSpPr>
+            <a:spLocks noGrp="1"/>
+          </p:cNvSpPr>
+          <p:nvPr>
+            <p:ph type="body" idx="1"/>
+          </p:nvPr>
+        </p:nvSpPr>
+        <p:spPr/>
+        <p:txBody>
+          <a:bodyPr/>
+          <a:lstStyle/>
+          <a:p>
+            <a:r>
+              <a:rPr lang="en-US" i="1" dirty="0" smtClean="0"/>
+              <a:t>ASP.NET Web Application Security</a:t>
+            </a:r>
+            <a:r>
+              <a:rPr lang="en-US" dirty="0" smtClean="0"/>
+              <a:t> provides a way to help limit </a:t>
+            </a:r>
+            <a:r>
+              <a:rPr lang="en-US" dirty="0" err="1" smtClean="0"/>
+              <a:t>faccess</a:t>
+            </a:r>
+            <a:r>
+              <a:rPr lang="en-US" dirty="0" smtClean="0"/>
+              <a:t> to a site by comparing authenticated credentials (or representations of them) to Microsoft Windows NT file system permissions or to an XML file that lists authorized users, authorized roles, or authorized HTTP verbs.</a:t>
+            </a:r>
+          </a:p>
+          <a:p>
+            <a:r>
+              <a:rPr lang="en-US" dirty="0" smtClean="0"/>
+              <a:t>C</a:t>
+            </a:r>
+            <a:r>
+              <a:rPr lang="en-US" i="1" dirty="0" smtClean="0"/>
+              <a:t>ode access security</a:t>
+            </a:r>
+            <a:r>
+              <a:rPr lang="en-US" dirty="0" smtClean="0"/>
+              <a:t> uses permissions to help limit the access that code has to protected resources and operations. It helps protect computer systems from malicious mobile code and helps provide a way to allow mobile code to run safely. (Code access security, together with the policies that govern it, are referred to as </a:t>
+            </a:r>
+            <a:r>
+              <a:rPr lang="en-US" i="1" dirty="0" smtClean="0"/>
+              <a:t>evidence-based security.</a:t>
+            </a:r>
+            <a:r>
+              <a:rPr lang="en-US" dirty="0" smtClean="0"/>
+              <a:t>)</a:t>
+            </a:r>
+          </a:p>
+          <a:p>
+            <a:r>
+              <a:rPr lang="en-US" i="1" dirty="0" smtClean="0"/>
+              <a:t>Role-based security</a:t>
+            </a:r>
+            <a:r>
+              <a:rPr lang="en-US" dirty="0" smtClean="0"/>
+              <a:t> provides information needed to make decisions about what a user is allowed to do. These decisions can be based on either the user's identity or role membership, or both.</a:t>
+            </a:r>
+          </a:p>
+        </p:txBody>
+      </p:sp>
+      <p:sp>
+        <p:nvSpPr>
+          <p:cNvPr id="4" name="Місце для номера слайда 3"/>
+          <p:cNvSpPr>
+            <a:spLocks noGrp="1"/>
+          </p:cNvSpPr>
+          <p:nvPr>
+            <p:ph type="sldNum" sz="quarter" idx="10"/>
+          </p:nvPr>
+        </p:nvSpPr>
+        <p:spPr/>
+        <p:txBody>
+          <a:bodyPr/>
+          <a:lstStyle/>
+          <a:p>
+            <a:fld id="{E82F8FD2-9FCC-4B88-9227-FECD3AD2150F}" type="slidenum">
+              <a:rPr lang="en-US" smtClean="0"/>
+              <a:t>12</a:t>
+            </a:fld>
+            <a:endParaRPr lang="en-US"/>
+          </a:p>
+        </p:txBody>
+      </p:sp>
+    </p:spTree>
+    <p:extLst>
+      <p:ext uri="{BB962C8B-B14F-4D97-AF65-F5344CB8AC3E}">
+        <p14:creationId xmlns:p14="http://schemas.microsoft.com/office/powerpoint/2010/main" val="3835258904"/>
+      </p:ext>
+    </p:extLst>
+  </p:cSld>
+  <p:clrMapOvr>
+    <a:masterClrMapping/>
+  </p:clrMapOvr>
+</p:notes>
+</file>
+
+<file path=ppt/notesSlides/notesSlide4.xml><?xml version="1.0" encoding="utf-8"?>
+<p:notes xmlns:a="http://schemas.openxmlformats.org/drawingml/2006/main" xmlns:r="http://schemas.openxmlformats.org/officeDocument/2006/relationships" xmlns:p="http://schemas.openxmlformats.org/presentationml/2006/main">
+  <p:cSld>
+    <p:spTree>
+      <p:nvGrpSpPr>
+        <p:cNvPr id="1" name=""/>
+        <p:cNvGrpSpPr/>
+        <p:nvPr/>
+      </p:nvGrpSpPr>
+      <p:grpSpPr>
+        <a:xfrm>
+          <a:off x="0" y="0"/>
+          <a:ext cx="0" cy="0"/>
+          <a:chOff x="0" y="0"/>
+          <a:chExt cx="0" cy="0"/>
+        </a:xfrm>
+      </p:grpSpPr>
+      <p:sp>
+        <p:nvSpPr>
+          <p:cNvPr id="2" name="Місце для зображення 1"/>
+          <p:cNvSpPr>
+            <a:spLocks noGrp="1" noRot="1" noChangeAspect="1"/>
+          </p:cNvSpPr>
+          <p:nvPr>
+            <p:ph type="sldImg"/>
+          </p:nvPr>
+        </p:nvSpPr>
+        <p:spPr/>
+      </p:sp>
+      <p:sp>
+        <p:nvSpPr>
+          <p:cNvPr id="3" name="Місце для нотаток 2"/>
+          <p:cNvSpPr>
+            <a:spLocks noGrp="1"/>
+          </p:cNvSpPr>
+          <p:nvPr>
+            <p:ph type="body" idx="1"/>
+          </p:nvPr>
+        </p:nvSpPr>
+        <p:spPr/>
+        <p:txBody>
+          <a:bodyPr/>
+          <a:lstStyle/>
+          <a:p>
+            <a:pPr algn="just"/>
+            <a:r>
+              <a:rPr lang="en-US" sz="1200" dirty="0" smtClean="0"/>
+              <a:t>By default, the compilers themselves perform the work of converting the created managed module to an assembly. </a:t>
+            </a:r>
+          </a:p>
+          <a:p>
+            <a:pPr algn="just"/>
+            <a:r>
+              <a:rPr lang="en-US" sz="1200" dirty="0" smtClean="0"/>
+              <a:t>C # compiler creates a managed module with a manifest that indicates that the assembly consists of only one file. </a:t>
+            </a:r>
+          </a:p>
+          <a:p>
+            <a:pPr algn="just"/>
+            <a:r>
+              <a:rPr lang="en-US" sz="1200" dirty="0" smtClean="0"/>
+              <a:t>So, in projects where there is only one managed module and there are no resource files (or data files), </a:t>
+            </a:r>
+            <a:r>
+              <a:rPr lang="en-US" sz="1200" u="sng" dirty="0" smtClean="0"/>
+              <a:t>assembly is a managed module</a:t>
+            </a:r>
+            <a:r>
+              <a:rPr lang="en-US" sz="1200" dirty="0" smtClean="0"/>
+              <a:t>, so you do not need to perform additional actions to build the application. </a:t>
+            </a:r>
+          </a:p>
+          <a:p>
+            <a:pPr algn="just"/>
+            <a:r>
+              <a:rPr lang="en-US" sz="1200" dirty="0" smtClean="0"/>
+              <a:t>In case you need to group several files into an assembly, you will need additional tools - for example, assembly linker  AL.exe.</a:t>
+            </a:r>
+            <a:endParaRPr lang="uk-UA" sz="1200" dirty="0" smtClean="0"/>
+          </a:p>
+        </p:txBody>
+      </p:sp>
+      <p:sp>
+        <p:nvSpPr>
+          <p:cNvPr id="4" name="Місце для номера слайда 3"/>
+          <p:cNvSpPr>
+            <a:spLocks noGrp="1"/>
+          </p:cNvSpPr>
+          <p:nvPr>
+            <p:ph type="sldNum" sz="quarter" idx="10"/>
+          </p:nvPr>
+        </p:nvSpPr>
+        <p:spPr/>
+        <p:txBody>
+          <a:bodyPr/>
+          <a:lstStyle/>
+          <a:p>
+            <a:fld id="{E82F8FD2-9FCC-4B88-9227-FECD3AD2150F}" type="slidenum">
+              <a:rPr lang="en-US" smtClean="0"/>
+              <a:t>13</a:t>
+            </a:fld>
+            <a:endParaRPr lang="en-US"/>
+          </a:p>
+        </p:txBody>
+      </p:sp>
+    </p:spTree>
+    <p:extLst>
+      <p:ext uri="{BB962C8B-B14F-4D97-AF65-F5344CB8AC3E}">
+        <p14:creationId xmlns:p14="http://schemas.microsoft.com/office/powerpoint/2010/main" val="1061402888"/>
+      </p:ext>
+    </p:extLst>
+  </p:cSld>
+  <p:clrMapOvr>
+    <a:masterClrMapping/>
+  </p:clrMapOvr>
+</p:notes>
+</file>
+
+<file path=ppt/notesSlides/notesSlide5.xml><?xml version="1.0" encoding="utf-8"?>
+<p:notes xmlns:a="http://schemas.openxmlformats.org/drawingml/2006/main" xmlns:r="http://schemas.openxmlformats.org/officeDocument/2006/relationships" xmlns:p="http://schemas.openxmlformats.org/presentationml/2006/main">
+  <p:cSld>
+    <p:spTree>
+      <p:nvGrpSpPr>
+        <p:cNvPr id="1" name=""/>
+        <p:cNvGrpSpPr/>
+        <p:nvPr/>
+      </p:nvGrpSpPr>
+      <p:grpSpPr>
+        <a:xfrm>
+          <a:off x="0" y="0"/>
+          <a:ext cx="0" cy="0"/>
+          <a:chOff x="0" y="0"/>
+          <a:chExt cx="0" cy="0"/>
+        </a:xfrm>
+      </p:grpSpPr>
+      <p:sp>
+        <p:nvSpPr>
+          <p:cNvPr id="2" name="Місце для зображення 1"/>
+          <p:cNvSpPr>
+            <a:spLocks noGrp="1" noRot="1" noChangeAspect="1"/>
+          </p:cNvSpPr>
+          <p:nvPr>
+            <p:ph type="sldImg"/>
+          </p:nvPr>
+        </p:nvSpPr>
+        <p:spPr/>
+      </p:sp>
+      <p:sp>
+        <p:nvSpPr>
+          <p:cNvPr id="3" name="Місце для нотаток 2"/>
+          <p:cNvSpPr>
+            <a:spLocks noGrp="1"/>
+          </p:cNvSpPr>
+          <p:nvPr>
+            <p:ph type="body" idx="1"/>
+          </p:nvPr>
+        </p:nvSpPr>
+        <p:spPr/>
+        <p:txBody>
+          <a:bodyPr/>
+          <a:lstStyle/>
+          <a:p>
+            <a:r>
+              <a:rPr lang="en-US" dirty="0" smtClean="0"/>
+              <a:t>First the CLR always loads the file with the metadata tables of the manifest, and then receives the names of the remaining assembly files from the manifest. </a:t>
+            </a:r>
+          </a:p>
+          <a:p>
+            <a:r>
+              <a:rPr lang="en-US" dirty="0" smtClean="0"/>
+              <a:t>Some characteristics of the assembly are worth remembering:</a:t>
+            </a:r>
+          </a:p>
+          <a:p>
+            <a:r>
+              <a:rPr lang="en-US" dirty="0" smtClean="0"/>
+              <a:t>in the assembly reusable types are defined;</a:t>
+            </a:r>
+          </a:p>
+          <a:p>
+            <a:r>
+              <a:rPr lang="en-US" dirty="0" smtClean="0"/>
+              <a:t>assembly is assigned a version number;</a:t>
+            </a:r>
+          </a:p>
+          <a:p>
+            <a:r>
+              <a:rPr lang="en-US" dirty="0" smtClean="0"/>
+              <a:t>Security information may be associated with the assembly. </a:t>
+            </a:r>
+          </a:p>
+          <a:p>
+            <a:r>
+              <a:rPr lang="en-US" dirty="0" smtClean="0"/>
+              <a:t>In other assembly files, except for the file with manifest, there are no such attributes.</a:t>
+            </a:r>
+          </a:p>
+        </p:txBody>
+      </p:sp>
+      <p:sp>
+        <p:nvSpPr>
+          <p:cNvPr id="4" name="Місце для номера слайда 3"/>
+          <p:cNvSpPr>
+            <a:spLocks noGrp="1"/>
+          </p:cNvSpPr>
+          <p:nvPr>
+            <p:ph type="sldNum" sz="quarter" idx="10"/>
+          </p:nvPr>
+        </p:nvSpPr>
+        <p:spPr/>
+        <p:txBody>
+          <a:bodyPr/>
+          <a:lstStyle/>
+          <a:p>
+            <a:fld id="{E82F8FD2-9FCC-4B88-9227-FECD3AD2150F}" type="slidenum">
+              <a:rPr lang="en-US" smtClean="0"/>
+              <a:t>14</a:t>
+            </a:fld>
+            <a:endParaRPr lang="en-US"/>
+          </a:p>
+        </p:txBody>
+      </p:sp>
+    </p:spTree>
+    <p:extLst>
+      <p:ext uri="{BB962C8B-B14F-4D97-AF65-F5344CB8AC3E}">
+        <p14:creationId xmlns:p14="http://schemas.microsoft.com/office/powerpoint/2010/main" val="667588762"/>
+      </p:ext>
+    </p:extLst>
+  </p:cSld>
+  <p:clrMapOvr>
+    <a:masterClrMapping/>
+  </p:clrMapOvr>
+</p:notes>
+</file>
+
+<file path=ppt/notesSlides/notesSlide6.xml><?xml version="1.0" encoding="utf-8"?>
+<p:notes xmlns:a="http://schemas.openxmlformats.org/drawingml/2006/main" xmlns:r="http://schemas.openxmlformats.org/officeDocument/2006/relationships" xmlns:p="http://schemas.openxmlformats.org/presentationml/2006/main">
+  <p:cSld>
+    <p:spTree>
+      <p:nvGrpSpPr>
+        <p:cNvPr id="1" name=""/>
+        <p:cNvGrpSpPr/>
+        <p:nvPr/>
+      </p:nvGrpSpPr>
+      <p:grpSpPr>
+        <a:xfrm>
+          <a:off x="0" y="0"/>
+          <a:ext cx="0" cy="0"/>
+          <a:chOff x="0" y="0"/>
+          <a:chExt cx="0" cy="0"/>
+        </a:xfrm>
+      </p:grpSpPr>
+      <p:sp>
+        <p:nvSpPr>
+          <p:cNvPr id="2" name="Місце для зображення 1"/>
+          <p:cNvSpPr>
+            <a:spLocks noGrp="1" noRot="1" noChangeAspect="1"/>
+          </p:cNvSpPr>
+          <p:nvPr>
+            <p:ph type="sldImg"/>
+          </p:nvPr>
+        </p:nvSpPr>
+        <p:spPr/>
+      </p:sp>
+      <p:sp>
+        <p:nvSpPr>
+          <p:cNvPr id="3" name="Місце для нотаток 2"/>
+          <p:cNvSpPr>
+            <a:spLocks noGrp="1"/>
+          </p:cNvSpPr>
+          <p:nvPr>
+            <p:ph type="body" idx="1"/>
+          </p:nvPr>
+        </p:nvSpPr>
+        <p:spPr/>
+        <p:txBody>
+          <a:bodyPr/>
+          <a:lstStyle/>
+          <a:p>
+            <a:r>
+              <a:rPr lang="uk-UA" dirty="0" smtClean="0"/>
+              <a:t>*</a:t>
+            </a:r>
+            <a:r>
+              <a:rPr lang="en-US" dirty="0" smtClean="0"/>
+              <a:t>However, multiple versions of the .NET Framework can be installed on the same computer at the same time. To determine which versions are installed, check the contents of the following subdirectories:</a:t>
+            </a:r>
+            <a:endParaRPr lang="uk-UA" dirty="0" smtClean="0"/>
+          </a:p>
+          <a:p>
+            <a:r>
+              <a:rPr lang="en-US" dirty="0" smtClean="0"/>
+              <a:t>% </a:t>
+            </a:r>
+            <a:r>
+              <a:rPr lang="en-US" dirty="0" err="1" smtClean="0"/>
+              <a:t>SystemRoot</a:t>
+            </a:r>
+            <a:r>
+              <a:rPr lang="en-US" dirty="0" smtClean="0"/>
+              <a:t>% \ Microsoft.NET \ Framework</a:t>
+            </a:r>
+            <a:endParaRPr lang="uk-UA" dirty="0" smtClean="0"/>
+          </a:p>
+          <a:p>
+            <a:r>
+              <a:rPr lang="en-US" dirty="0" smtClean="0"/>
+              <a:t>% </a:t>
+            </a:r>
+            <a:r>
+              <a:rPr lang="en-US" dirty="0" err="1" smtClean="0"/>
+              <a:t>SystemRoot</a:t>
+            </a:r>
+            <a:r>
+              <a:rPr lang="en-US" dirty="0" smtClean="0"/>
+              <a:t>% \ Microsoft.NET \ Framework64</a:t>
+            </a:r>
+          </a:p>
+        </p:txBody>
+      </p:sp>
+      <p:sp>
+        <p:nvSpPr>
+          <p:cNvPr id="4" name="Місце для номера слайда 3"/>
+          <p:cNvSpPr>
+            <a:spLocks noGrp="1"/>
+          </p:cNvSpPr>
+          <p:nvPr>
+            <p:ph type="sldNum" sz="quarter" idx="10"/>
+          </p:nvPr>
+        </p:nvSpPr>
+        <p:spPr/>
+        <p:txBody>
+          <a:bodyPr/>
+          <a:lstStyle/>
+          <a:p>
+            <a:fld id="{E82F8FD2-9FCC-4B88-9227-FECD3AD2150F}" type="slidenum">
+              <a:rPr lang="en-US" smtClean="0"/>
+              <a:t>20</a:t>
+            </a:fld>
+            <a:endParaRPr lang="en-US"/>
+          </a:p>
+        </p:txBody>
+      </p:sp>
+    </p:spTree>
+    <p:extLst>
+      <p:ext uri="{BB962C8B-B14F-4D97-AF65-F5344CB8AC3E}">
+        <p14:creationId xmlns:p14="http://schemas.microsoft.com/office/powerpoint/2010/main" val="945567610"/>
+      </p:ext>
+    </p:extLst>
+  </p:cSld>
+  <p:clrMapOvr>
+    <a:masterClrMapping/>
+  </p:clrMapOvr>
+</p:notes>
+</file>
+
+<file path=ppt/notesSlides/notesSlide7.xml><?xml version="1.0" encoding="utf-8"?>
+<p:notes xmlns:a="http://schemas.openxmlformats.org/drawingml/2006/main" xmlns:r="http://schemas.openxmlformats.org/officeDocument/2006/relationships" xmlns:p="http://schemas.openxmlformats.org/presentationml/2006/main">
+  <p:cSld>
+    <p:spTree>
+      <p:nvGrpSpPr>
+        <p:cNvPr id="1" name=""/>
+        <p:cNvGrpSpPr/>
+        <p:nvPr/>
+      </p:nvGrpSpPr>
+      <p:grpSpPr>
+        <a:xfrm>
+          <a:off x="0" y="0"/>
+          <a:ext cx="0" cy="0"/>
+          <a:chOff x="0" y="0"/>
+          <a:chExt cx="0" cy="0"/>
+        </a:xfrm>
+      </p:grpSpPr>
+      <p:sp>
+        <p:nvSpPr>
+          <p:cNvPr id="2" name="Місце для зображення 1"/>
+          <p:cNvSpPr>
+            <a:spLocks noGrp="1" noRot="1" noChangeAspect="1"/>
+          </p:cNvSpPr>
+          <p:nvPr>
+            <p:ph type="sldImg"/>
+          </p:nvPr>
+        </p:nvSpPr>
+        <p:spPr/>
+      </p:sp>
+      <p:sp>
+        <p:nvSpPr>
+          <p:cNvPr id="3" name="Місце для нотаток 2"/>
+          <p:cNvSpPr>
+            <a:spLocks noGrp="1"/>
+          </p:cNvSpPr>
+          <p:nvPr>
+            <p:ph type="body" idx="1"/>
+          </p:nvPr>
+        </p:nvSpPr>
+        <p:spPr/>
+        <p:txBody>
+          <a:bodyPr/>
+          <a:lstStyle/>
+          <a:p>
+            <a:pPr algn="just"/>
+            <a:r>
+              <a:rPr lang="en-US" sz="1200" dirty="0" smtClean="0"/>
+              <a:t>Before the execution of the method, the CLR finds all data</a:t>
+            </a:r>
+            <a:r>
+              <a:rPr lang="uk-UA" sz="1200" dirty="0" smtClean="0"/>
+              <a:t> </a:t>
+            </a:r>
+            <a:r>
+              <a:rPr lang="en-US" sz="1200" dirty="0" smtClean="0"/>
+              <a:t>types on which method is referenced. CLR allocates internal data structures used to control access to referenced types.</a:t>
+            </a:r>
+            <a:endParaRPr lang="ru-RU" sz="1200" dirty="0" smtClean="0"/>
+          </a:p>
+          <a:p>
+            <a:pPr algn="just"/>
+            <a:r>
+              <a:rPr lang="en-US" sz="1200" dirty="0" smtClean="0"/>
+              <a:t>This structure contains one record for each method defined in type. Record contains address of method  implementation.</a:t>
+            </a:r>
+            <a:endParaRPr lang="uk-UA" sz="1200" dirty="0" smtClean="0"/>
+          </a:p>
+          <a:p>
+            <a:pPr algn="just"/>
+            <a:r>
+              <a:rPr lang="en-US" sz="1200" dirty="0" smtClean="0"/>
+              <a:t>When structure is initialized, the CLR writes to record the address of internal undocumented function contained in the CLR itself.</a:t>
+            </a:r>
+          </a:p>
+          <a:p>
+            <a:pPr algn="just"/>
+            <a:r>
+              <a:rPr lang="en-US" sz="1200" dirty="0" smtClean="0"/>
+              <a:t>It is responsible for compiling the IL-code of the called method into processor instructions, and stores them in the dynamic memory. Because the IL code is compiled just before execution ("just in time"), this CLR component is often called a JIT compiler.</a:t>
+            </a:r>
+          </a:p>
+          <a:p>
+            <a:pPr algn="just"/>
+            <a:r>
+              <a:rPr lang="en-US" sz="1200" dirty="0" smtClean="0"/>
+              <a:t>After that, </a:t>
+            </a:r>
+            <a:r>
+              <a:rPr lang="en-US" sz="1200" dirty="0" err="1" smtClean="0"/>
+              <a:t>JITCompiler</a:t>
+            </a:r>
+            <a:r>
+              <a:rPr lang="en-US" sz="1200" dirty="0" smtClean="0"/>
+              <a:t> returns to the internal data structure of the type, and replaces the address of the called method with the address of the block of memory containing the ready machine instructions.</a:t>
+            </a:r>
+          </a:p>
+        </p:txBody>
+      </p:sp>
+      <p:sp>
+        <p:nvSpPr>
+          <p:cNvPr id="4" name="Місце для номера слайда 3"/>
+          <p:cNvSpPr>
+            <a:spLocks noGrp="1"/>
+          </p:cNvSpPr>
+          <p:nvPr>
+            <p:ph type="sldNum" sz="quarter" idx="10"/>
+          </p:nvPr>
+        </p:nvSpPr>
+        <p:spPr/>
+        <p:txBody>
+          <a:bodyPr/>
+          <a:lstStyle/>
+          <a:p>
+            <a:fld id="{E82F8FD2-9FCC-4B88-9227-FECD3AD2150F}" type="slidenum">
+              <a:rPr lang="en-US" smtClean="0"/>
+              <a:t>23</a:t>
+            </a:fld>
+            <a:endParaRPr lang="en-US"/>
+          </a:p>
+        </p:txBody>
+      </p:sp>
+    </p:spTree>
+    <p:extLst>
+      <p:ext uri="{BB962C8B-B14F-4D97-AF65-F5344CB8AC3E}">
+        <p14:creationId xmlns:p14="http://schemas.microsoft.com/office/powerpoint/2010/main" val="2437098758"/>
+      </p:ext>
+    </p:extLst>
+  </p:cSld>
+  <p:clrMapOvr>
+    <a:masterClrMapping/>
+  </p:clrMapOvr>
+</p:notes>
 </file>
 
 <file path=ppt/slideLayouts/slideLayout1.xml><?xml version="1.0" encoding="utf-8"?>
@@ -563,7 +1769,7 @@
   </p:timing>
   <p:extLst mod="1">
     <p:ext uri="{DCECCB84-F9BA-43D5-87BE-67443E8EF086}">
-      <p15:sldGuideLst xmlns:p15="http://schemas.microsoft.com/office/powerpoint/2012/main" xmlns=""/>
+      <p15:sldGuideLst xmlns="" xmlns:p15="http://schemas.microsoft.com/office/powerpoint/2012/main"/>
     </p:ext>
   </p:extLst>
 </p:sldLayout>
@@ -2158,7 +3364,7 @@
   </p:txStyles>
   <p:extLst mod="1">
     <p:ext uri="{27BBF7A9-308A-43DC-89C8-2F10F3537804}">
-      <p15:sldGuideLst xmlns:p15="http://schemas.microsoft.com/office/powerpoint/2012/main" xmlns="">
+      <p15:sldGuideLst xmlns="" xmlns:p15="http://schemas.microsoft.com/office/powerpoint/2012/main">
         <p15:guide id="1" pos="136" userDrawn="1">
           <p15:clr>
             <a:srgbClr val="F26B43"/>
@@ -2674,7 +3880,7 @@
   </p:txStyles>
   <p:extLst mod="1">
     <p:ext uri="{27BBF7A9-308A-43DC-89C8-2F10F3537804}">
-      <p15:sldGuideLst xmlns:p15="http://schemas.microsoft.com/office/powerpoint/2012/main" xmlns="">
+      <p15:sldGuideLst xmlns="" xmlns:p15="http://schemas.microsoft.com/office/powerpoint/2012/main">
         <p15:guide id="1" pos="158" userDrawn="1">
           <p15:clr>
             <a:srgbClr val="F26B43"/>
@@ -3137,7 +4343,7 @@
   </p:txStyles>
   <p:extLst mod="1">
     <p:ext uri="{27BBF7A9-308A-43DC-89C8-2F10F3537804}">
-      <p15:sldGuideLst xmlns:p15="http://schemas.microsoft.com/office/powerpoint/2012/main" xmlns="">
+      <p15:sldGuideLst xmlns="" xmlns:p15="http://schemas.microsoft.com/office/powerpoint/2012/main">
         <p15:guide id="1" pos="125" userDrawn="1">
           <p15:clr>
             <a:srgbClr val="F26B43"/>
@@ -3413,7 +4619,7 @@
       </p:grpSpPr>
       <p:sp>
         <p:nvSpPr>
-          <p:cNvPr id="3" name="Text Placeholder 2"/>
+          <p:cNvPr id="2" name="Місце для тексту 1"/>
           <p:cNvSpPr>
             <a:spLocks noGrp="1"/>
           </p:cNvSpPr>
@@ -3423,106 +4629,85 @@
         </p:nvSpPr>
         <p:spPr>
           <a:xfrm>
-            <a:off x="272144" y="1923422"/>
-            <a:ext cx="8675404" cy="3342290"/>
+            <a:off x="272144" y="2017986"/>
+            <a:ext cx="8675404" cy="2443655"/>
           </a:xfrm>
         </p:spPr>
         <p:txBody>
           <a:bodyPr>
-            <a:noAutofit/>
+            <a:normAutofit/>
           </a:bodyPr>
           <a:lstStyle/>
           <a:p>
             <a:pPr algn="just"/>
             <a:r>
-              <a:rPr lang="en-US" sz="2400" dirty="0" smtClean="0"/>
-              <a:t>First, assembly is provides logical grouping of one or more managing modules and file resources. </a:t>
+              <a:rPr lang="en-US" dirty="0"/>
+              <a:t>The .NET Framework provides several mechanisms for protecting resources and code from unauthorized code and users: </a:t>
             </a:r>
           </a:p>
           <a:p>
             <a:pPr algn="just"/>
             <a:r>
-              <a:rPr lang="en-US" sz="2400" dirty="0" smtClean="0"/>
-              <a:t>Secondly</a:t>
-            </a:r>
-            <a:r>
-              <a:rPr lang="ru-RU" sz="2400" dirty="0" smtClean="0"/>
-              <a:t>,</a:t>
-            </a:r>
-            <a:r>
-              <a:rPr lang="en-US" sz="2400" dirty="0" smtClean="0"/>
-              <a:t> it is the smallest unit of multiple use, security and version control.</a:t>
-            </a:r>
-            <a:r>
-              <a:rPr lang="ru-RU" sz="2400" dirty="0" smtClean="0"/>
-              <a:t> </a:t>
-            </a:r>
-            <a:endParaRPr lang="en-US" sz="2400" dirty="0" smtClean="0"/>
+              <a:rPr lang="en-US" dirty="0"/>
+              <a:t>ASP.NET Web Application Security </a:t>
+            </a:r>
+            <a:endParaRPr lang="en-US" dirty="0" smtClean="0"/>
           </a:p>
           <a:p>
             <a:pPr algn="just"/>
             <a:r>
-              <a:rPr lang="en-US" sz="2400" dirty="0" smtClean="0"/>
-              <a:t>Assembly can consists of one or more files, it depends on selected tools and compilers.</a:t>
-            </a:r>
+              <a:rPr lang="en-US" dirty="0" smtClean="0"/>
+              <a:t>Code </a:t>
+            </a:r>
+            <a:r>
+              <a:rPr lang="en-US" dirty="0"/>
+              <a:t>access security </a:t>
+            </a:r>
+            <a:endParaRPr lang="en-US" dirty="0" smtClean="0"/>
           </a:p>
           <a:p>
             <a:pPr algn="just"/>
             <a:r>
-              <a:rPr lang="en-US" sz="2400" dirty="0" smtClean="0"/>
-              <a:t>In the context of CLR, assembly is what we commonly call component.</a:t>
-            </a:r>
-            <a:endParaRPr lang="uk-UA" sz="2400" dirty="0"/>
-          </a:p>
-        </p:txBody>
-      </p:sp>
-      <p:sp>
-        <p:nvSpPr>
-          <p:cNvPr id="4" name="TextBox 3"/>
-          <p:cNvSpPr txBox="1"/>
-          <p:nvPr/>
-        </p:nvSpPr>
-        <p:spPr>
-          <a:xfrm>
-            <a:off x="8120417" y="182081"/>
-            <a:ext cx="184731" cy="523220"/>
-          </a:xfrm>
-          <a:prstGeom prst="rect">
-            <a:avLst/>
-          </a:prstGeom>
-          <a:noFill/>
-        </p:spPr>
-        <p:txBody>
-          <a:bodyPr wrap="none" rtlCol="0">
-            <a:spAutoFit/>
-          </a:bodyPr>
+              <a:rPr lang="en-US" dirty="0" smtClean="0"/>
+              <a:t>Role-based security</a:t>
+            </a:r>
+            <a:endParaRPr lang="en-US" dirty="0"/>
+          </a:p>
+        </p:txBody>
+      </p:sp>
+      <p:sp>
+        <p:nvSpPr>
+          <p:cNvPr id="3" name="Підзаголовок 2"/>
+          <p:cNvSpPr>
+            <a:spLocks noGrp="1"/>
+          </p:cNvSpPr>
+          <p:nvPr>
+            <p:ph type="subTitle" idx="1"/>
+          </p:nvPr>
+        </p:nvSpPr>
+        <p:spPr/>
+        <p:txBody>
+          <a:bodyPr/>
           <a:lstStyle/>
           <a:p>
-            <a:endParaRPr lang="en-US" sz="2800" b="1" dirty="0">
-              <a:solidFill>
-                <a:schemeClr val="bg1"/>
-              </a:solidFill>
-            </a:endParaRPr>
+            <a:r>
+              <a:rPr lang="en-US" dirty="0" smtClean="0"/>
+              <a:t>.NET security</a:t>
+            </a:r>
+            <a:endParaRPr lang="en-US" dirty="0"/>
           </a:p>
         </p:txBody>
       </p:sp>
     </p:spTree>
     <p:extLst>
       <p:ext uri="{BB962C8B-B14F-4D97-AF65-F5344CB8AC3E}">
-        <p14:creationId xmlns:p14="http://schemas.microsoft.com/office/powerpoint/2010/main" val="2673565052"/>
+        <p14:creationId xmlns:p14="http://schemas.microsoft.com/office/powerpoint/2010/main" val="2964629394"/>
       </p:ext>
     </p:extLst>
   </p:cSld>
   <p:clrMapOvr>
     <a:masterClrMapping/>
   </p:clrMapOvr>
-  <p:timing>
-    <p:tnLst>
-      <p:par>
-        <p:cTn id="1" dur="indefinite" restart="never" nodeType="tmRoot"/>
-      </p:par>
-    </p:tnLst>
-  </p:timing>
 </p:sld>
 </file>
 
@@ -3576,7 +4761,7 @@
       <p:pic>
         <p:nvPicPr>
           <p:cNvPr id="5122" name="Picture 2" descr="Результат пошуку зображень за запитом &quot;assembly manifest&quot;">
-            <a:hlinkClick r:id="rId2"/>
+            <a:hlinkClick r:id="rId3"/>
           </p:cNvPr>
           <p:cNvPicPr>
             <a:picLocks noChangeAspect="1" noChangeArrowheads="1"/>
@@ -3584,7 +4769,7 @@
           <p:nvPr/>
         </p:nvPicPr>
         <p:blipFill>
-          <a:blip r:embed="rId3">
+          <a:blip r:embed="rId4">
             <a:extLst>
               <a:ext uri="{28A0092B-C50C-407E-A947-70E740481C1C}">
                 <a14:useLocalDpi xmlns:a14="http://schemas.microsoft.com/office/drawing/2010/main" val="0"/>
@@ -3655,7 +4840,7 @@
       </p:grpSpPr>
       <p:sp>
         <p:nvSpPr>
-          <p:cNvPr id="3" name="Text Placeholder 2"/>
+          <p:cNvPr id="2" name="Місце для тексту 1"/>
           <p:cNvSpPr>
             <a:spLocks noGrp="1"/>
           </p:cNvSpPr>
@@ -3665,139 +4850,111 @@
         </p:nvSpPr>
         <p:spPr>
           <a:xfrm>
-            <a:off x="272144" y="1529265"/>
-            <a:ext cx="8675404" cy="4288221"/>
+            <a:off x="272144" y="1592495"/>
+            <a:ext cx="8675404" cy="1402954"/>
           </a:xfrm>
         </p:spPr>
         <p:txBody>
-          <a:bodyPr>
-            <a:noAutofit/>
-          </a:bodyPr>
+          <a:bodyPr/>
           <a:lstStyle/>
           <a:p>
-            <a:pPr algn="just"/>
-            <a:r>
-              <a:rPr lang="en-US" sz="2400" dirty="0"/>
-              <a:t>By default, the compilers themselves perform the work of converting the created managed module to an </a:t>
-            </a:r>
-            <a:r>
-              <a:rPr lang="en-US" sz="2400" dirty="0" smtClean="0"/>
-              <a:t>assembly. </a:t>
-            </a:r>
-          </a:p>
-          <a:p>
-            <a:pPr algn="just"/>
-            <a:r>
-              <a:rPr lang="en-US" sz="2400" dirty="0" smtClean="0"/>
-              <a:t>C </a:t>
-            </a:r>
-            <a:r>
-              <a:rPr lang="en-US" sz="2400" dirty="0"/>
-              <a:t># compiler creates a managed module with a manifest that indicates that the assembly consists of only one file. </a:t>
-            </a:r>
-            <a:endParaRPr lang="en-US" sz="2400" dirty="0" smtClean="0"/>
-          </a:p>
-          <a:p>
-            <a:pPr algn="just"/>
-            <a:r>
-              <a:rPr lang="en-US" sz="2400" dirty="0" smtClean="0"/>
-              <a:t>So, </a:t>
-            </a:r>
-            <a:r>
-              <a:rPr lang="en-US" sz="2400" dirty="0"/>
-              <a:t>in projects where there is only one managed module and there are no resource files (or data files</a:t>
-            </a:r>
-            <a:r>
-              <a:rPr lang="en-US" sz="2400" dirty="0" smtClean="0"/>
-              <a:t>), </a:t>
-            </a:r>
-            <a:r>
-              <a:rPr lang="en-US" sz="2400" u="sng" dirty="0"/>
-              <a:t>assembly is a managed module</a:t>
-            </a:r>
-            <a:r>
-              <a:rPr lang="en-US" sz="2400" dirty="0"/>
-              <a:t>, so you do not need to perform additional actions to build the application. </a:t>
-            </a:r>
-            <a:endParaRPr lang="en-US" sz="2400" dirty="0" smtClean="0"/>
-          </a:p>
-          <a:p>
-            <a:pPr algn="just"/>
-            <a:r>
-              <a:rPr lang="en-US" sz="2400" dirty="0" smtClean="0"/>
-              <a:t>In </a:t>
-            </a:r>
-            <a:r>
-              <a:rPr lang="en-US" sz="2400" dirty="0"/>
-              <a:t>case you need to group several files into an assembly, you will need additional tools </a:t>
-            </a:r>
-            <a:r>
-              <a:rPr lang="en-US" sz="2400" dirty="0" smtClean="0"/>
-              <a:t>- for </a:t>
-            </a:r>
-            <a:r>
-              <a:rPr lang="en-US" sz="2400" dirty="0"/>
-              <a:t>example, assembly linker  </a:t>
-            </a:r>
-            <a:r>
-              <a:rPr lang="en-US" sz="2400" dirty="0" smtClean="0"/>
-              <a:t>AL.exe</a:t>
-            </a:r>
-            <a:r>
-              <a:rPr lang="en-US" sz="2400" dirty="0"/>
+            <a:r>
+              <a:rPr lang="en-US" dirty="0" smtClean="0"/>
+              <a:t>It is </a:t>
+            </a:r>
+            <a:r>
+              <a:rPr lang="en-US" dirty="0"/>
+              <a:t>another set of metadata tables that basically contain the names of the files that </a:t>
+            </a:r>
+            <a:r>
+              <a:rPr lang="en-US" dirty="0" smtClean="0"/>
+              <a:t>are components of assembly</a:t>
+            </a:r>
+            <a:r>
+              <a:rPr lang="en-US" dirty="0"/>
+              <a:t>. In addition, these tables describe the version and regional standards of the assembly, its publisher, publicly exported types, and all the assembly files</a:t>
+            </a:r>
+            <a:r>
+              <a:rPr lang="en-US" dirty="0" smtClean="0"/>
               <a:t>.</a:t>
             </a:r>
-            <a:endParaRPr lang="uk-UA" sz="2400" dirty="0"/>
-          </a:p>
-        </p:txBody>
-      </p:sp>
-      <p:sp>
-        <p:nvSpPr>
-          <p:cNvPr id="4" name="TextBox 3"/>
-          <p:cNvSpPr txBox="1"/>
+          </a:p>
+        </p:txBody>
+      </p:sp>
+      <p:sp>
+        <p:nvSpPr>
+          <p:cNvPr id="3" name="Підзаголовок 2"/>
+          <p:cNvSpPr>
+            <a:spLocks noGrp="1"/>
+          </p:cNvSpPr>
+          <p:nvPr>
+            <p:ph type="subTitle" idx="1"/>
+          </p:nvPr>
+        </p:nvSpPr>
+        <p:spPr/>
+        <p:txBody>
+          <a:bodyPr/>
+          <a:lstStyle/>
+          <a:p>
+            <a:r>
+              <a:rPr lang="en-US" dirty="0" smtClean="0"/>
+              <a:t>Manifest</a:t>
+            </a:r>
+            <a:endParaRPr lang="en-US" dirty="0"/>
+          </a:p>
+        </p:txBody>
+      </p:sp>
+      <p:pic>
+        <p:nvPicPr>
+          <p:cNvPr id="1026" name="Picture 2" descr="Результат пошуку зображень за запитом &quot;assembly of module and manifest&quot;">
+            <a:hlinkClick r:id="rId3"/>
+          </p:cNvPr>
+          <p:cNvPicPr>
+            <a:picLocks noChangeAspect="1" noChangeArrowheads="1"/>
+          </p:cNvPicPr>
           <p:nvPr/>
-        </p:nvSpPr>
-        <p:spPr>
+        </p:nvPicPr>
+        <p:blipFill rotWithShape="1">
+          <a:blip r:embed="rId4">
+            <a:extLst>
+              <a:ext uri="{28A0092B-C50C-407E-A947-70E740481C1C}">
+                <a14:useLocalDpi xmlns:a14="http://schemas.microsoft.com/office/drawing/2010/main" val="0"/>
+              </a:ext>
+            </a:extLst>
+          </a:blip>
+          <a:srcRect t="6218" b="7546"/>
+          <a:stretch/>
+        </p:blipFill>
+        <p:spPr bwMode="auto">
           <a:xfrm>
-            <a:off x="8120417" y="182081"/>
-            <a:ext cx="184731" cy="523220"/>
+            <a:off x="1460287" y="2995447"/>
+            <a:ext cx="7463004" cy="3682012"/>
           </a:xfrm>
           <a:prstGeom prst="rect">
             <a:avLst/>
           </a:prstGeom>
           <a:noFill/>
+          <a:extLst>
+            <a:ext uri="{909E8E84-426E-40DD-AFC4-6F175D3DCCD1}">
+              <a14:hiddenFill xmlns:a14="http://schemas.microsoft.com/office/drawing/2010/main">
+                <a:solidFill>
+                  <a:srgbClr val="FFFFFF"/>
+                </a:solidFill>
+              </a14:hiddenFill>
+            </a:ext>
+          </a:extLst>
         </p:spPr>
-        <p:txBody>
-          <a:bodyPr wrap="none" rtlCol="0">
-            <a:spAutoFit/>
-          </a:bodyPr>
-          <a:lstStyle/>
-          <a:p>
-            <a:endParaRPr lang="en-US" sz="2800" b="1" dirty="0">
-              <a:solidFill>
-                <a:schemeClr val="bg1"/>
-              </a:solidFill>
-            </a:endParaRPr>
-          </a:p>
-        </p:txBody>
-      </p:sp>
+      </p:pic>
     </p:spTree>
     <p:extLst>
       <p:ext uri="{BB962C8B-B14F-4D97-AF65-F5344CB8AC3E}">
-        <p14:creationId xmlns:p14="http://schemas.microsoft.com/office/powerpoint/2010/main" val="2420616462"/>
+        <p14:creationId xmlns:p14="http://schemas.microsoft.com/office/powerpoint/2010/main" val="476505998"/>
       </p:ext>
     </p:extLst>
   </p:cSld>
   <p:clrMapOvr>
     <a:masterClrMapping/>
   </p:clrMapOvr>
-  <p:timing>
-    <p:tnLst>
-      <p:par>
-        <p:cTn id="1" dur="indefinite" restart="never" nodeType="tmRoot"/>
-      </p:par>
-    </p:tnLst>
-  </p:timing>
 </p:sld>
 </file>
 
@@ -4656,6 +5813,135 @@
       </p:grpSpPr>
       <p:sp>
         <p:nvSpPr>
+          <p:cNvPr id="2" name="Місце для тексту 1"/>
+          <p:cNvSpPr>
+            <a:spLocks noGrp="1"/>
+          </p:cNvSpPr>
+          <p:nvPr>
+            <p:ph type="body" sz="quarter" idx="10"/>
+          </p:nvPr>
+        </p:nvSpPr>
+        <p:spPr>
+          <a:xfrm>
+            <a:off x="272144" y="1970704"/>
+            <a:ext cx="8675404" cy="3058510"/>
+          </a:xfrm>
+        </p:spPr>
+        <p:txBody>
+          <a:bodyPr/>
+          <a:lstStyle/>
+          <a:p>
+            <a:r>
+              <a:rPr lang="en-US" dirty="0"/>
+              <a:t>In order to understand if the .NET Framework is installed on the computer, try to find the </a:t>
+            </a:r>
+            <a:r>
+              <a:rPr lang="en-US" dirty="0" err="1"/>
+              <a:t>MSCorEE</a:t>
+            </a:r>
+            <a:r>
+              <a:rPr lang="en-US" dirty="0"/>
+              <a:t> </a:t>
+            </a:r>
+            <a:r>
+              <a:rPr lang="en-US" dirty="0" err="1"/>
+              <a:t>dll</a:t>
+            </a:r>
+            <a:r>
+              <a:rPr lang="en-US" dirty="0"/>
+              <a:t> file in </a:t>
+            </a:r>
+            <a:r>
+              <a:rPr lang="en-US" dirty="0" smtClean="0"/>
+              <a:t>the</a:t>
+            </a:r>
+            <a:r>
+              <a:rPr lang="uk-UA" dirty="0" smtClean="0"/>
+              <a:t> </a:t>
+            </a:r>
+          </a:p>
+          <a:p>
+            <a:r>
+              <a:rPr lang="en-US" dirty="0" smtClean="0"/>
+              <a:t>% </a:t>
+            </a:r>
+            <a:r>
+              <a:rPr lang="en-US" dirty="0" err="1"/>
+              <a:t>SystemRoot</a:t>
+            </a:r>
+            <a:r>
+              <a:rPr lang="en-US" dirty="0"/>
+              <a:t>% \ system32 directory. </a:t>
+            </a:r>
+            <a:endParaRPr lang="uk-UA" dirty="0" smtClean="0"/>
+          </a:p>
+          <a:p>
+            <a:r>
+              <a:rPr lang="en-US" dirty="0" smtClean="0"/>
+              <a:t>If </a:t>
+            </a:r>
+            <a:r>
+              <a:rPr lang="en-US" dirty="0"/>
+              <a:t>it is, the .NET Framework is </a:t>
+            </a:r>
+            <a:r>
+              <a:rPr lang="en-US" dirty="0" smtClean="0"/>
+              <a:t>installed</a:t>
+            </a:r>
+            <a:r>
+              <a:rPr lang="uk-UA" dirty="0" smtClean="0"/>
+              <a:t>*</a:t>
+            </a:r>
+            <a:r>
+              <a:rPr lang="en-US" dirty="0" smtClean="0"/>
+              <a:t>.</a:t>
+            </a:r>
+            <a:endParaRPr lang="uk-UA" dirty="0" smtClean="0"/>
+          </a:p>
+          <a:p>
+            <a:r>
+              <a:rPr lang="en-US" dirty="0" smtClean="0"/>
+              <a:t>CLRVer.exe command-line - to display </a:t>
+            </a:r>
+            <a:r>
+              <a:rPr lang="en-US" dirty="0"/>
+              <a:t>a list of all versions of the CLR installed on the machine, and also tells you which version of the CLR environment is used by the current processes.</a:t>
+            </a:r>
+          </a:p>
+        </p:txBody>
+      </p:sp>
+    </p:spTree>
+    <p:extLst>
+      <p:ext uri="{BB962C8B-B14F-4D97-AF65-F5344CB8AC3E}">
+        <p14:creationId xmlns:p14="http://schemas.microsoft.com/office/powerpoint/2010/main" val="1129749893"/>
+      </p:ext>
+    </p:extLst>
+  </p:cSld>
+  <p:clrMapOvr>
+    <a:masterClrMapping/>
+  </p:clrMapOvr>
+</p:sld>
+</file>
+
+<file path=ppt/slides/slide21.xml><?xml version="1.0" encoding="utf-8"?>
+<p:sld xmlns:a="http://schemas.openxmlformats.org/drawingml/2006/main" xmlns:r="http://schemas.openxmlformats.org/officeDocument/2006/relationships" xmlns:p="http://schemas.openxmlformats.org/presentationml/2006/main">
+  <p:cSld>
+    <p:spTree>
+      <p:nvGrpSpPr>
+        <p:cNvPr id="1" name=""/>
+        <p:cNvGrpSpPr/>
+        <p:nvPr/>
+      </p:nvGrpSpPr>
+      <p:grpSpPr>
+        <a:xfrm>
+          <a:off x="0" y="0"/>
+          <a:ext cx="0" cy="0"/>
+          <a:chOff x="0" y="0"/>
+          <a:chExt cx="0" cy="0"/>
+        </a:xfrm>
+      </p:grpSpPr>
+      <p:sp>
+        <p:nvSpPr>
           <p:cNvPr id="2" name="Заголовок 1"/>
           <p:cNvSpPr>
             <a:spLocks noGrp="1"/>
@@ -4695,7 +5981,7 @@
 </p:sld>
 </file>
 
-<file path=ppt/slides/slide21.xml><?xml version="1.0" encoding="utf-8"?>
+<file path=ppt/slides/slide22.xml><?xml version="1.0" encoding="utf-8"?>
 <p:sld xmlns:a="http://schemas.openxmlformats.org/drawingml/2006/main" xmlns:r="http://schemas.openxmlformats.org/officeDocument/2006/relationships" xmlns:p="http://schemas.openxmlformats.org/presentationml/2006/main">
   <p:cSld>
     <p:spTree>
@@ -4796,7 +6082,7 @@
 </p:sld>
 </file>
 
-<file path=ppt/slides/slide22.xml><?xml version="1.0" encoding="utf-8"?>
+<file path=ppt/slides/slide23.xml><?xml version="1.0" encoding="utf-8"?>
 <p:sld xmlns:a="http://schemas.openxmlformats.org/drawingml/2006/main" xmlns:r="http://schemas.openxmlformats.org/officeDocument/2006/relationships" xmlns:p="http://schemas.openxmlformats.org/presentationml/2006/main">
   <p:cSld>
     <p:spTree>
@@ -4816,7 +6102,7 @@
       <p:pic>
         <p:nvPicPr>
           <p:cNvPr id="2050" name="Picture 2" descr="Результат пошуку зображень за запитом &quot;jit first call of method&quot;">
-            <a:hlinkClick r:id="rId2"/>
+            <a:hlinkClick r:id="rId3"/>
           </p:cNvPr>
           <p:cNvPicPr>
             <a:picLocks noChangeAspect="1" noChangeArrowheads="1"/>
@@ -4824,7 +6110,7 @@
           <p:nvPr/>
         </p:nvPicPr>
         <p:blipFill>
-          <a:blip r:embed="rId3">
+          <a:blip r:embed="rId4">
             <a:extLst>
               <a:ext uri="{28A0092B-C50C-407E-A947-70E740481C1C}">
                 <a14:useLocalDpi xmlns:a14="http://schemas.microsoft.com/office/drawing/2010/main" val="0"/>
@@ -4860,200 +6146,6 @@
     <p:extLst>
       <p:ext uri="{BB962C8B-B14F-4D97-AF65-F5344CB8AC3E}">
         <p14:creationId xmlns:p14="http://schemas.microsoft.com/office/powerpoint/2010/main" val="2840025437"/>
-      </p:ext>
-    </p:extLst>
-  </p:cSld>
-  <p:clrMapOvr>
-    <a:masterClrMapping/>
-  </p:clrMapOvr>
-</p:sld>
-</file>
-
-<file path=ppt/slides/slide23.xml><?xml version="1.0" encoding="utf-8"?>
-<p:sld xmlns:a="http://schemas.openxmlformats.org/drawingml/2006/main" xmlns:r="http://schemas.openxmlformats.org/officeDocument/2006/relationships" xmlns:p="http://schemas.openxmlformats.org/presentationml/2006/main">
-  <p:cSld>
-    <p:spTree>
-      <p:nvGrpSpPr>
-        <p:cNvPr id="1" name=""/>
-        <p:cNvGrpSpPr/>
-        <p:nvPr/>
-      </p:nvGrpSpPr>
-      <p:grpSpPr>
-        <a:xfrm>
-          <a:off x="0" y="0"/>
-          <a:ext cx="0" cy="0"/>
-          <a:chOff x="0" y="0"/>
-          <a:chExt cx="0" cy="0"/>
-        </a:xfrm>
-      </p:grpSpPr>
-      <p:sp>
-        <p:nvSpPr>
-          <p:cNvPr id="2" name="Місце для тексту 1"/>
-          <p:cNvSpPr>
-            <a:spLocks noGrp="1"/>
-          </p:cNvSpPr>
-          <p:nvPr>
-            <p:ph type="body" sz="quarter" idx="10"/>
-          </p:nvPr>
-        </p:nvSpPr>
-        <p:spPr>
-          <a:xfrm>
-            <a:off x="272144" y="914400"/>
-            <a:ext cx="8675404" cy="5683255"/>
-          </a:xfrm>
-        </p:spPr>
-        <p:txBody>
-          <a:bodyPr>
-            <a:noAutofit/>
-          </a:bodyPr>
-          <a:lstStyle/>
-          <a:p>
-            <a:pPr algn="just"/>
-            <a:r>
-              <a:rPr lang="en-US" sz="2300" dirty="0"/>
-              <a:t>B</a:t>
-            </a:r>
-            <a:r>
-              <a:rPr lang="en-US" sz="2300" dirty="0" smtClean="0"/>
-              <a:t>efore </a:t>
-            </a:r>
-            <a:r>
-              <a:rPr lang="en-US" sz="2300" dirty="0"/>
-              <a:t>the execution of the method, the CLR finds </a:t>
-            </a:r>
-            <a:r>
-              <a:rPr lang="en-US" sz="2300" dirty="0" smtClean="0"/>
-              <a:t>all data</a:t>
-            </a:r>
-            <a:r>
-              <a:rPr lang="uk-UA" sz="2300" dirty="0" smtClean="0"/>
-              <a:t> </a:t>
-            </a:r>
-            <a:r>
-              <a:rPr lang="en-US" sz="2300" dirty="0" smtClean="0"/>
-              <a:t>types on which method is referenced. CLR </a:t>
-            </a:r>
-            <a:r>
-              <a:rPr lang="en-US" sz="2300" dirty="0"/>
-              <a:t>allocates internal data structures used to control access to referenced types.</a:t>
-            </a:r>
-            <a:endParaRPr lang="ru-RU" sz="2300" dirty="0" smtClean="0"/>
-          </a:p>
-          <a:p>
-            <a:pPr algn="just"/>
-            <a:r>
-              <a:rPr lang="en-US" sz="2300" dirty="0" smtClean="0"/>
-              <a:t>This structure </a:t>
-            </a:r>
-            <a:r>
-              <a:rPr lang="en-US" sz="2300" dirty="0"/>
-              <a:t>contains one record for each method defined </a:t>
-            </a:r>
-            <a:r>
-              <a:rPr lang="en-US" sz="2300" dirty="0" smtClean="0"/>
-              <a:t>in </a:t>
-            </a:r>
-            <a:r>
-              <a:rPr lang="en-US" sz="2300" dirty="0"/>
-              <a:t>type. R</a:t>
-            </a:r>
-            <a:r>
-              <a:rPr lang="en-US" sz="2300" dirty="0" smtClean="0"/>
-              <a:t>ecord contains address of </a:t>
-            </a:r>
-            <a:r>
-              <a:rPr lang="en-US" sz="2300" dirty="0"/>
-              <a:t>method </a:t>
-            </a:r>
-            <a:r>
-              <a:rPr lang="en-US" sz="2300" dirty="0" smtClean="0"/>
-              <a:t> implementation.</a:t>
-            </a:r>
-            <a:endParaRPr lang="uk-UA" sz="2300" dirty="0" smtClean="0"/>
-          </a:p>
-          <a:p>
-            <a:pPr algn="just"/>
-            <a:r>
-              <a:rPr lang="en-US" sz="2300" dirty="0" smtClean="0"/>
-              <a:t>When </a:t>
-            </a:r>
-            <a:r>
-              <a:rPr lang="en-US" sz="2300" dirty="0"/>
-              <a:t>structure is initialized, the CLR writes to </a:t>
-            </a:r>
-            <a:r>
-              <a:rPr lang="en-US" sz="2300" dirty="0" smtClean="0"/>
-              <a:t>record </a:t>
-            </a:r>
-            <a:r>
-              <a:rPr lang="en-US" sz="2300" dirty="0"/>
-              <a:t>the address of </a:t>
-            </a:r>
-            <a:r>
-              <a:rPr lang="en-US" sz="2300" dirty="0" smtClean="0"/>
-              <a:t>internal </a:t>
-            </a:r>
-            <a:r>
-              <a:rPr lang="en-US" sz="2300" dirty="0"/>
-              <a:t>undocumented function contained in the CLR itself</a:t>
-            </a:r>
-            <a:r>
-              <a:rPr lang="en-US" sz="2300" dirty="0" smtClean="0"/>
-              <a:t>.</a:t>
-            </a:r>
-          </a:p>
-          <a:p>
-            <a:pPr algn="just"/>
-            <a:r>
-              <a:rPr lang="en-US" sz="2300" dirty="0" smtClean="0"/>
-              <a:t>It </a:t>
-            </a:r>
-            <a:r>
-              <a:rPr lang="en-US" sz="2300" dirty="0"/>
-              <a:t>is responsible for compiling the IL-code of the called method into processor instructions, </a:t>
-            </a:r>
-            <a:r>
-              <a:rPr lang="en-US" sz="2300" dirty="0" smtClean="0"/>
-              <a:t>and stores them </a:t>
-            </a:r>
-            <a:r>
-              <a:rPr lang="en-US" sz="2300" dirty="0"/>
-              <a:t>in the dynamic </a:t>
-            </a:r>
-            <a:r>
-              <a:rPr lang="en-US" sz="2300" dirty="0" smtClean="0"/>
-              <a:t>memory. </a:t>
-            </a:r>
-            <a:r>
-              <a:rPr lang="en-US" sz="2300" dirty="0"/>
-              <a:t>Because the IL code is compiled just before execution ("just in time"), this CLR component is often called a JIT compiler</a:t>
-            </a:r>
-            <a:r>
-              <a:rPr lang="en-US" sz="2300" dirty="0" smtClean="0"/>
-              <a:t>.</a:t>
-            </a:r>
-          </a:p>
-          <a:p>
-            <a:pPr algn="just"/>
-            <a:r>
-              <a:rPr lang="en-US" sz="2300" dirty="0"/>
-              <a:t>After that, </a:t>
-            </a:r>
-            <a:r>
-              <a:rPr lang="en-US" sz="2300" dirty="0" err="1"/>
-              <a:t>JITCompiler</a:t>
-            </a:r>
-            <a:r>
-              <a:rPr lang="en-US" sz="2300" dirty="0"/>
-              <a:t> returns to the internal data structure of the type, and replaces the address of the called method with the address of the block of memory containing the ready machine instructions.</a:t>
-            </a:r>
-          </a:p>
-        </p:txBody>
-      </p:sp>
-    </p:spTree>
-    <p:extLst>
-      <p:ext uri="{BB962C8B-B14F-4D97-AF65-F5344CB8AC3E}">
-        <p14:creationId xmlns:p14="http://schemas.microsoft.com/office/powerpoint/2010/main" val="2346657971"/>
       </p:ext>
     </p:extLst>
   </p:cSld>
@@ -5545,8 +6637,8 @@
         </p:nvSpPr>
         <p:spPr>
           <a:xfrm>
-            <a:off x="272144" y="914400"/>
-            <a:ext cx="8675404" cy="5683255"/>
+            <a:off x="272144" y="1466193"/>
+            <a:ext cx="8675404" cy="4272455"/>
           </a:xfrm>
         </p:spPr>
         <p:txBody>
@@ -5628,48 +6720,25 @@
             </a:r>
             <a:r>
               <a:rPr lang="en-US" dirty="0" smtClean="0"/>
-              <a:t>exe </a:t>
+              <a:t>exe</a:t>
+            </a:r>
+            <a:r>
+              <a:rPr lang="uk-UA" dirty="0" smtClean="0"/>
+              <a:t>*</a:t>
+            </a:r>
+            <a:r>
+              <a:rPr lang="en-US" dirty="0" smtClean="0"/>
+              <a:t> </a:t>
             </a:r>
             <a:r>
               <a:rPr lang="en-US" dirty="0"/>
-              <a:t>program, included in the .NET Framework package, can be used to compile IL code into machine code when the application is installed on the user's machine. Because the code is compiled during the installation phase, the JIT compiler CLR does not have to compile it at run time, which can improve the performance of the application. </a:t>
-            </a:r>
-            <a:endParaRPr lang="en-US" dirty="0" smtClean="0"/>
-          </a:p>
-          <a:p>
-            <a:r>
-              <a:rPr lang="en-US" dirty="0" smtClean="0"/>
-              <a:t>The </a:t>
-            </a:r>
-            <a:r>
-              <a:rPr lang="en-US" dirty="0"/>
-              <a:t>NGen.exe program is useful in two </a:t>
-            </a:r>
-            <a:r>
-              <a:rPr lang="en-US" dirty="0" smtClean="0"/>
-              <a:t>situations.</a:t>
-            </a:r>
-          </a:p>
-          <a:p>
-            <a:r>
-              <a:rPr lang="en-US" dirty="0" smtClean="0"/>
-              <a:t>- accelerate </a:t>
-            </a:r>
-            <a:r>
-              <a:rPr lang="en-US" dirty="0"/>
-              <a:t>the launch of the application. </a:t>
-            </a:r>
-            <a:endParaRPr lang="en-US" dirty="0" smtClean="0"/>
-          </a:p>
-          <a:p>
-            <a:r>
-              <a:rPr lang="en-US" dirty="0" smtClean="0"/>
-              <a:t>- reduce </a:t>
-            </a:r>
-            <a:r>
-              <a:rPr lang="en-US" dirty="0"/>
-              <a:t>the working set of the application.</a:t>
-            </a:r>
+              <a:t>program, included in the .NET Framework package, can be used to compile IL code into machine code when the application is installed on the user's machine</a:t>
+            </a:r>
+            <a:r>
+              <a:rPr lang="en-US" dirty="0" smtClean="0"/>
+              <a:t>.</a:t>
+            </a:r>
+            <a:endParaRPr lang="en-US" dirty="0"/>
           </a:p>
         </p:txBody>
       </p:sp>
@@ -5687,284 +6756,6 @@
 </file>
 
 <file path=ppt/slides/slide5.xml><?xml version="1.0" encoding="utf-8"?>
-<p:sld xmlns:a="http://schemas.openxmlformats.org/drawingml/2006/main" xmlns:r="http://schemas.openxmlformats.org/officeDocument/2006/relationships" xmlns:p="http://schemas.openxmlformats.org/presentationml/2006/main">
-  <p:cSld>
-    <p:spTree>
-      <p:nvGrpSpPr>
-        <p:cNvPr id="1" name=""/>
-        <p:cNvGrpSpPr/>
-        <p:nvPr/>
-      </p:nvGrpSpPr>
-      <p:grpSpPr>
-        <a:xfrm>
-          <a:off x="0" y="0"/>
-          <a:ext cx="0" cy="0"/>
-          <a:chOff x="0" y="0"/>
-          <a:chExt cx="0" cy="0"/>
-        </a:xfrm>
-      </p:grpSpPr>
-      <p:sp>
-        <p:nvSpPr>
-          <p:cNvPr id="3" name="Text Placeholder 2"/>
-          <p:cNvSpPr>
-            <a:spLocks noGrp="1"/>
-          </p:cNvSpPr>
-          <p:nvPr>
-            <p:ph type="body" sz="quarter" idx="10"/>
-          </p:nvPr>
-        </p:nvSpPr>
-        <p:spPr>
-          <a:xfrm>
-            <a:off x="272144" y="1592494"/>
-            <a:ext cx="8675404" cy="4161920"/>
-          </a:xfrm>
-        </p:spPr>
-        <p:txBody>
-          <a:bodyPr>
-            <a:noAutofit/>
-          </a:bodyPr>
-          <a:lstStyle/>
-          <a:p>
-            <a:pPr algn="just"/>
-            <a:r>
-              <a:rPr lang="en-US" sz="2400" dirty="0"/>
-              <a:t>Managed </a:t>
-            </a:r>
-            <a:r>
-              <a:rPr lang="en-US" sz="2400" dirty="0" smtClean="0"/>
-              <a:t>Code:</a:t>
-            </a:r>
-          </a:p>
-          <a:p>
-            <a:pPr marL="457200" indent="-457200" algn="just">
-              <a:buFont typeface="+mj-lt"/>
-              <a:buAutoNum type="arabicPeriod"/>
-            </a:pPr>
-            <a:r>
-              <a:rPr lang="en-US" sz="2400" dirty="0" smtClean="0"/>
-              <a:t>It </a:t>
-            </a:r>
-            <a:r>
-              <a:rPr lang="en-US" sz="2400" dirty="0"/>
-              <a:t>compiles to Intermediate Language (</a:t>
-            </a:r>
-            <a:r>
-              <a:rPr lang="en-US" sz="2400" dirty="0" smtClean="0"/>
-              <a:t>IL).</a:t>
-            </a:r>
-          </a:p>
-          <a:p>
-            <a:pPr marL="457200" indent="-457200" algn="just">
-              <a:buFont typeface="+mj-lt"/>
-              <a:buAutoNum type="arabicPeriod"/>
-            </a:pPr>
-            <a:r>
-              <a:rPr lang="en-US" sz="2400" dirty="0" smtClean="0"/>
-              <a:t>It </a:t>
-            </a:r>
-            <a:r>
-              <a:rPr lang="en-US" sz="2400" dirty="0"/>
-              <a:t>runs and is managed by the </a:t>
-            </a:r>
-            <a:r>
-              <a:rPr lang="en-US" sz="2400" dirty="0" smtClean="0"/>
-              <a:t>CLR.</a:t>
-            </a:r>
-          </a:p>
-          <a:p>
-            <a:pPr marL="457200" indent="-457200" algn="just">
-              <a:buFont typeface="+mj-lt"/>
-              <a:buAutoNum type="arabicPeriod"/>
-            </a:pPr>
-            <a:r>
-              <a:rPr lang="en-US" sz="2400" dirty="0" smtClean="0"/>
-              <a:t>The </a:t>
-            </a:r>
-            <a:r>
-              <a:rPr lang="en-US" sz="2400" dirty="0"/>
-              <a:t>runtime provides services such as security, memory management, threading, </a:t>
-            </a:r>
-            <a:r>
-              <a:rPr lang="en-US" sz="2400" dirty="0" smtClean="0"/>
-              <a:t>etc.</a:t>
-            </a:r>
-          </a:p>
-          <a:p>
-            <a:pPr algn="just"/>
-            <a:r>
-              <a:rPr lang="en-US" sz="2400" dirty="0" smtClean="0"/>
-              <a:t>Unmanaged Code:</a:t>
-            </a:r>
-          </a:p>
-          <a:p>
-            <a:pPr marL="457200" indent="-457200" algn="just">
-              <a:buFont typeface="+mj-lt"/>
-              <a:buAutoNum type="arabicPeriod"/>
-            </a:pPr>
-            <a:r>
-              <a:rPr lang="en-US" sz="2400" dirty="0" smtClean="0"/>
-              <a:t>It </a:t>
-            </a:r>
-            <a:r>
-              <a:rPr lang="en-US" sz="2400" dirty="0"/>
-              <a:t>compiles directly to machine </a:t>
-            </a:r>
-            <a:r>
-              <a:rPr lang="en-US" sz="2400" dirty="0" smtClean="0"/>
-              <a:t>code.</a:t>
-            </a:r>
-          </a:p>
-          <a:p>
-            <a:pPr marL="457200" indent="-457200" algn="just">
-              <a:buFont typeface="+mj-lt"/>
-              <a:buAutoNum type="arabicPeriod"/>
-            </a:pPr>
-            <a:r>
-              <a:rPr lang="en-US" sz="2400" dirty="0" smtClean="0"/>
-              <a:t>It </a:t>
-            </a:r>
-            <a:r>
-              <a:rPr lang="en-US" sz="2400" dirty="0"/>
-              <a:t>does not run and is not managed by the </a:t>
-            </a:r>
-            <a:r>
-              <a:rPr lang="en-US" sz="2400" dirty="0" smtClean="0"/>
-              <a:t>CLR.</a:t>
-            </a:r>
-          </a:p>
-          <a:p>
-            <a:pPr marL="457200" indent="-457200" algn="just">
-              <a:buFont typeface="+mj-lt"/>
-              <a:buAutoNum type="arabicPeriod"/>
-            </a:pPr>
-            <a:r>
-              <a:rPr lang="en-US" sz="2400" dirty="0" smtClean="0"/>
-              <a:t>It </a:t>
-            </a:r>
-            <a:r>
-              <a:rPr lang="en-US" sz="2400" dirty="0"/>
-              <a:t>doesn't get the services of the </a:t>
-            </a:r>
-            <a:r>
-              <a:rPr lang="en-US" sz="2400" dirty="0" smtClean="0"/>
-              <a:t>runtime.</a:t>
-            </a:r>
-            <a:endParaRPr lang="uk-UA" sz="2400" dirty="0"/>
-          </a:p>
-        </p:txBody>
-      </p:sp>
-      <p:sp>
-        <p:nvSpPr>
-          <p:cNvPr id="2" name="Subtitle 1"/>
-          <p:cNvSpPr>
-            <a:spLocks noGrp="1"/>
-          </p:cNvSpPr>
-          <p:nvPr>
-            <p:ph type="subTitle" idx="1"/>
-          </p:nvPr>
-        </p:nvSpPr>
-        <p:spPr/>
-        <p:txBody>
-          <a:bodyPr/>
-          <a:lstStyle/>
-          <a:p>
-            <a:r>
-              <a:rPr lang="en-US" dirty="0" smtClean="0"/>
-              <a:t>Managed vs unmanaged code</a:t>
-            </a:r>
-            <a:endParaRPr lang="uk-UA" dirty="0"/>
-          </a:p>
-        </p:txBody>
-      </p:sp>
-      <p:sp>
-        <p:nvSpPr>
-          <p:cNvPr id="4" name="TextBox 3"/>
-          <p:cNvSpPr txBox="1"/>
-          <p:nvPr/>
-        </p:nvSpPr>
-        <p:spPr>
-          <a:xfrm>
-            <a:off x="8120417" y="182081"/>
-            <a:ext cx="184731" cy="523220"/>
-          </a:xfrm>
-          <a:prstGeom prst="rect">
-            <a:avLst/>
-          </a:prstGeom>
-          <a:noFill/>
-        </p:spPr>
-        <p:txBody>
-          <a:bodyPr wrap="none" rtlCol="0">
-            <a:spAutoFit/>
-          </a:bodyPr>
-          <a:lstStyle/>
-          <a:p>
-            <a:endParaRPr lang="en-US" sz="2800" b="1" dirty="0">
-              <a:solidFill>
-                <a:schemeClr val="bg1"/>
-              </a:solidFill>
-            </a:endParaRPr>
-          </a:p>
-        </p:txBody>
-      </p:sp>
-      <p:sp>
-        <p:nvSpPr>
-          <p:cNvPr id="5" name="TextBox 4"/>
-          <p:cNvSpPr txBox="1"/>
-          <p:nvPr/>
-        </p:nvSpPr>
-        <p:spPr>
-          <a:xfrm>
-            <a:off x="8024881" y="182081"/>
-            <a:ext cx="891591" cy="523220"/>
-          </a:xfrm>
-          <a:prstGeom prst="rect">
-            <a:avLst/>
-          </a:prstGeom>
-          <a:noFill/>
-        </p:spPr>
-        <p:txBody>
-          <a:bodyPr wrap="none" rtlCol="0">
-            <a:spAutoFit/>
-          </a:bodyPr>
-          <a:lstStyle/>
-          <a:p>
-            <a:r>
-              <a:rPr lang="en-US" sz="2800" b="1" dirty="0" smtClean="0">
-                <a:solidFill>
-                  <a:schemeClr val="bg1"/>
-                </a:solidFill>
-              </a:rPr>
-              <a:t>CLR</a:t>
-            </a:r>
-            <a:endParaRPr lang="en-US" sz="2800" b="1" dirty="0">
-              <a:solidFill>
-                <a:schemeClr val="bg1"/>
-              </a:solidFill>
-            </a:endParaRPr>
-          </a:p>
-        </p:txBody>
-      </p:sp>
-    </p:spTree>
-    <p:extLst>
-      <p:ext uri="{BB962C8B-B14F-4D97-AF65-F5344CB8AC3E}">
-        <p14:creationId xmlns:p14="http://schemas.microsoft.com/office/powerpoint/2010/main" val="3287889801"/>
-      </p:ext>
-    </p:extLst>
-  </p:cSld>
-  <p:clrMapOvr>
-    <a:masterClrMapping/>
-  </p:clrMapOvr>
-  <p:timing>
-    <p:tnLst>
-      <p:par>
-        <p:cTn id="1" dur="indefinite" restart="never" nodeType="tmRoot"/>
-      </p:par>
-    </p:tnLst>
-  </p:timing>
-</p:sld>
-</file>
-
-<file path=ppt/slides/slide6.xml><?xml version="1.0" encoding="utf-8"?>
 <p:sld xmlns:a="http://schemas.openxmlformats.org/drawingml/2006/main" xmlns:r="http://schemas.openxmlformats.org/officeDocument/2006/relationships" xmlns:p="http://schemas.openxmlformats.org/presentationml/2006/main">
   <p:cSld>
     <p:spTree>
@@ -6105,6 +6896,284 @@
     <p:extLst>
       <p:ext uri="{BB962C8B-B14F-4D97-AF65-F5344CB8AC3E}">
         <p14:creationId xmlns:p14="http://schemas.microsoft.com/office/powerpoint/2010/main" val="2089649935"/>
+      </p:ext>
+    </p:extLst>
+  </p:cSld>
+  <p:clrMapOvr>
+    <a:masterClrMapping/>
+  </p:clrMapOvr>
+  <p:timing>
+    <p:tnLst>
+      <p:par>
+        <p:cTn id="1" dur="indefinite" restart="never" nodeType="tmRoot"/>
+      </p:par>
+    </p:tnLst>
+  </p:timing>
+</p:sld>
+</file>
+
+<file path=ppt/slides/slide6.xml><?xml version="1.0" encoding="utf-8"?>
+<p:sld xmlns:a="http://schemas.openxmlformats.org/drawingml/2006/main" xmlns:r="http://schemas.openxmlformats.org/officeDocument/2006/relationships" xmlns:p="http://schemas.openxmlformats.org/presentationml/2006/main">
+  <p:cSld>
+    <p:spTree>
+      <p:nvGrpSpPr>
+        <p:cNvPr id="1" name=""/>
+        <p:cNvGrpSpPr/>
+        <p:nvPr/>
+      </p:nvGrpSpPr>
+      <p:grpSpPr>
+        <a:xfrm>
+          <a:off x="0" y="0"/>
+          <a:ext cx="0" cy="0"/>
+          <a:chOff x="0" y="0"/>
+          <a:chExt cx="0" cy="0"/>
+        </a:xfrm>
+      </p:grpSpPr>
+      <p:sp>
+        <p:nvSpPr>
+          <p:cNvPr id="3" name="Text Placeholder 2"/>
+          <p:cNvSpPr>
+            <a:spLocks noGrp="1"/>
+          </p:cNvSpPr>
+          <p:nvPr>
+            <p:ph type="body" sz="quarter" idx="10"/>
+          </p:nvPr>
+        </p:nvSpPr>
+        <p:spPr>
+          <a:xfrm>
+            <a:off x="272144" y="1592494"/>
+            <a:ext cx="8675404" cy="4161920"/>
+          </a:xfrm>
+        </p:spPr>
+        <p:txBody>
+          <a:bodyPr>
+            <a:noAutofit/>
+          </a:bodyPr>
+          <a:lstStyle/>
+          <a:p>
+            <a:pPr algn="just"/>
+            <a:r>
+              <a:rPr lang="en-US" sz="2400" dirty="0"/>
+              <a:t>Managed </a:t>
+            </a:r>
+            <a:r>
+              <a:rPr lang="en-US" sz="2400" dirty="0" smtClean="0"/>
+              <a:t>Code:</a:t>
+            </a:r>
+          </a:p>
+          <a:p>
+            <a:pPr marL="457200" indent="-457200" algn="just">
+              <a:buFont typeface="+mj-lt"/>
+              <a:buAutoNum type="arabicPeriod"/>
+            </a:pPr>
+            <a:r>
+              <a:rPr lang="en-US" sz="2400" dirty="0" smtClean="0"/>
+              <a:t>It </a:t>
+            </a:r>
+            <a:r>
+              <a:rPr lang="en-US" sz="2400" dirty="0"/>
+              <a:t>compiles to Intermediate Language (</a:t>
+            </a:r>
+            <a:r>
+              <a:rPr lang="en-US" sz="2400" dirty="0" smtClean="0"/>
+              <a:t>IL).</a:t>
+            </a:r>
+          </a:p>
+          <a:p>
+            <a:pPr marL="457200" indent="-457200" algn="just">
+              <a:buFont typeface="+mj-lt"/>
+              <a:buAutoNum type="arabicPeriod"/>
+            </a:pPr>
+            <a:r>
+              <a:rPr lang="en-US" sz="2400" dirty="0" smtClean="0"/>
+              <a:t>It </a:t>
+            </a:r>
+            <a:r>
+              <a:rPr lang="en-US" sz="2400" dirty="0"/>
+              <a:t>runs and is managed by the </a:t>
+            </a:r>
+            <a:r>
+              <a:rPr lang="en-US" sz="2400" dirty="0" smtClean="0"/>
+              <a:t>CLR.</a:t>
+            </a:r>
+          </a:p>
+          <a:p>
+            <a:pPr marL="457200" indent="-457200" algn="just">
+              <a:buFont typeface="+mj-lt"/>
+              <a:buAutoNum type="arabicPeriod"/>
+            </a:pPr>
+            <a:r>
+              <a:rPr lang="en-US" sz="2400" dirty="0" smtClean="0"/>
+              <a:t>The </a:t>
+            </a:r>
+            <a:r>
+              <a:rPr lang="en-US" sz="2400" dirty="0"/>
+              <a:t>runtime provides services such as security, memory management, threading, </a:t>
+            </a:r>
+            <a:r>
+              <a:rPr lang="en-US" sz="2400" dirty="0" smtClean="0"/>
+              <a:t>etc.</a:t>
+            </a:r>
+          </a:p>
+          <a:p>
+            <a:pPr algn="just"/>
+            <a:r>
+              <a:rPr lang="en-US" sz="2400" dirty="0" smtClean="0"/>
+              <a:t>Unmanaged Code:</a:t>
+            </a:r>
+          </a:p>
+          <a:p>
+            <a:pPr marL="457200" indent="-457200" algn="just">
+              <a:buFont typeface="+mj-lt"/>
+              <a:buAutoNum type="arabicPeriod"/>
+            </a:pPr>
+            <a:r>
+              <a:rPr lang="en-US" sz="2400" dirty="0" smtClean="0"/>
+              <a:t>It </a:t>
+            </a:r>
+            <a:r>
+              <a:rPr lang="en-US" sz="2400" dirty="0"/>
+              <a:t>compiles directly to machine </a:t>
+            </a:r>
+            <a:r>
+              <a:rPr lang="en-US" sz="2400" dirty="0" smtClean="0"/>
+              <a:t>code.</a:t>
+            </a:r>
+          </a:p>
+          <a:p>
+            <a:pPr marL="457200" indent="-457200" algn="just">
+              <a:buFont typeface="+mj-lt"/>
+              <a:buAutoNum type="arabicPeriod"/>
+            </a:pPr>
+            <a:r>
+              <a:rPr lang="en-US" sz="2400" dirty="0" smtClean="0"/>
+              <a:t>It </a:t>
+            </a:r>
+            <a:r>
+              <a:rPr lang="en-US" sz="2400" dirty="0"/>
+              <a:t>does not run and is not managed by the </a:t>
+            </a:r>
+            <a:r>
+              <a:rPr lang="en-US" sz="2400" dirty="0" smtClean="0"/>
+              <a:t>CLR.</a:t>
+            </a:r>
+          </a:p>
+          <a:p>
+            <a:pPr marL="457200" indent="-457200" algn="just">
+              <a:buFont typeface="+mj-lt"/>
+              <a:buAutoNum type="arabicPeriod"/>
+            </a:pPr>
+            <a:r>
+              <a:rPr lang="en-US" sz="2400" dirty="0" smtClean="0"/>
+              <a:t>It </a:t>
+            </a:r>
+            <a:r>
+              <a:rPr lang="en-US" sz="2400" dirty="0"/>
+              <a:t>doesn't get the services of the </a:t>
+            </a:r>
+            <a:r>
+              <a:rPr lang="en-US" sz="2400" dirty="0" smtClean="0"/>
+              <a:t>runtime.</a:t>
+            </a:r>
+            <a:endParaRPr lang="uk-UA" sz="2400" dirty="0"/>
+          </a:p>
+        </p:txBody>
+      </p:sp>
+      <p:sp>
+        <p:nvSpPr>
+          <p:cNvPr id="2" name="Subtitle 1"/>
+          <p:cNvSpPr>
+            <a:spLocks noGrp="1"/>
+          </p:cNvSpPr>
+          <p:nvPr>
+            <p:ph type="subTitle" idx="1"/>
+          </p:nvPr>
+        </p:nvSpPr>
+        <p:spPr/>
+        <p:txBody>
+          <a:bodyPr/>
+          <a:lstStyle/>
+          <a:p>
+            <a:r>
+              <a:rPr lang="en-US" dirty="0" smtClean="0"/>
+              <a:t>Managed vs unmanaged code</a:t>
+            </a:r>
+            <a:endParaRPr lang="uk-UA" dirty="0"/>
+          </a:p>
+        </p:txBody>
+      </p:sp>
+      <p:sp>
+        <p:nvSpPr>
+          <p:cNvPr id="4" name="TextBox 3"/>
+          <p:cNvSpPr txBox="1"/>
+          <p:nvPr/>
+        </p:nvSpPr>
+        <p:spPr>
+          <a:xfrm>
+            <a:off x="8120417" y="182081"/>
+            <a:ext cx="184731" cy="523220"/>
+          </a:xfrm>
+          <a:prstGeom prst="rect">
+            <a:avLst/>
+          </a:prstGeom>
+          <a:noFill/>
+        </p:spPr>
+        <p:txBody>
+          <a:bodyPr wrap="none" rtlCol="0">
+            <a:spAutoFit/>
+          </a:bodyPr>
+          <a:lstStyle/>
+          <a:p>
+            <a:endParaRPr lang="en-US" sz="2800" b="1" dirty="0">
+              <a:solidFill>
+                <a:schemeClr val="bg1"/>
+              </a:solidFill>
+            </a:endParaRPr>
+          </a:p>
+        </p:txBody>
+      </p:sp>
+      <p:sp>
+        <p:nvSpPr>
+          <p:cNvPr id="5" name="TextBox 4"/>
+          <p:cNvSpPr txBox="1"/>
+          <p:nvPr/>
+        </p:nvSpPr>
+        <p:spPr>
+          <a:xfrm>
+            <a:off x="8024881" y="182081"/>
+            <a:ext cx="891591" cy="523220"/>
+          </a:xfrm>
+          <a:prstGeom prst="rect">
+            <a:avLst/>
+          </a:prstGeom>
+          <a:noFill/>
+        </p:spPr>
+        <p:txBody>
+          <a:bodyPr wrap="none" rtlCol="0">
+            <a:spAutoFit/>
+          </a:bodyPr>
+          <a:lstStyle/>
+          <a:p>
+            <a:r>
+              <a:rPr lang="en-US" sz="2800" b="1" dirty="0" smtClean="0">
+                <a:solidFill>
+                  <a:schemeClr val="bg1"/>
+                </a:solidFill>
+              </a:rPr>
+              <a:t>CLR</a:t>
+            </a:r>
+            <a:endParaRPr lang="en-US" sz="2800" b="1" dirty="0">
+              <a:solidFill>
+                <a:schemeClr val="bg1"/>
+              </a:solidFill>
+            </a:endParaRPr>
+          </a:p>
+        </p:txBody>
+      </p:sp>
+    </p:spTree>
+    <p:extLst>
+      <p:ext uri="{BB962C8B-B14F-4D97-AF65-F5344CB8AC3E}">
+        <p14:creationId xmlns:p14="http://schemas.microsoft.com/office/powerpoint/2010/main" val="3287889801"/>
       </p:ext>
     </p:extLst>
   </p:cSld>
@@ -6909,7 +7978,7 @@
   <a:extraClrSchemeLst/>
   <a:extLst>
     <a:ext uri="{05A4C25C-085E-4340-85A3-A5531E510DB2}">
-      <thm15:themeFamily xmlns:thm15="http://schemas.microsoft.com/office/thememl/2012/main" xmlns="" name="Office Theme" id="{62F939B6-93AF-4DB8-9C6B-D6C7DFDC589F}" vid="{4A3C46E8-61CC-4603-A589-7422A47A8E4A}"/>
+      <thm15:themeFamily xmlns="" xmlns:thm15="http://schemas.microsoft.com/office/thememl/2012/main" name="Office Theme" id="{62F939B6-93AF-4DB8-9C6B-D6C7DFDC589F}" vid="{4A3C46E8-61CC-4603-A589-7422A47A8E4A}"/>
     </a:ext>
   </a:extLst>
 </a:theme>
@@ -7110,7 +8179,7 @@
   <a:extraClrSchemeLst/>
   <a:extLst>
     <a:ext uri="{05A4C25C-085E-4340-85A3-A5531E510DB2}">
-      <thm15:themeFamily xmlns:thm15="http://schemas.microsoft.com/office/thememl/2012/main" xmlns="" name="Office Theme" id="{62F939B6-93AF-4DB8-9C6B-D6C7DFDC589F}" vid="{4A3C46E8-61CC-4603-A589-7422A47A8E4A}"/>
+      <thm15:themeFamily xmlns="" xmlns:thm15="http://schemas.microsoft.com/office/thememl/2012/main" name="Office Theme" id="{62F939B6-93AF-4DB8-9C6B-D6C7DFDC589F}" vid="{4A3C46E8-61CC-4603-A589-7422A47A8E4A}"/>
     </a:ext>
   </a:extLst>
 </a:theme>
@@ -7311,13 +8380,298 @@
   <a:extraClrSchemeLst/>
   <a:extLst>
     <a:ext uri="{05A4C25C-085E-4340-85A3-A5531E510DB2}">
-      <thm15:themeFamily xmlns:thm15="http://schemas.microsoft.com/office/thememl/2012/main" xmlns="" name="Office Theme" id="{62F939B6-93AF-4DB8-9C6B-D6C7DFDC589F}" vid="{4A3C46E8-61CC-4603-A589-7422A47A8E4A}"/>
+      <thm15:themeFamily xmlns="" xmlns:thm15="http://schemas.microsoft.com/office/thememl/2012/main" name="Office Theme" id="{62F939B6-93AF-4DB8-9C6B-D6C7DFDC589F}" vid="{4A3C46E8-61CC-4603-A589-7422A47A8E4A}"/>
     </a:ext>
   </a:extLst>
 </a:theme>
 </file>
 
 <file path=ppt/theme/theme4.xml><?xml version="1.0" encoding="utf-8"?>
+<a:theme xmlns:a="http://schemas.openxmlformats.org/drawingml/2006/main" name="Тема Office">
+  <a:themeElements>
+    <a:clrScheme name="Стандартна">
+      <a:dk1>
+        <a:sysClr val="windowText" lastClr="000000"/>
+      </a:dk1>
+      <a:lt1>
+        <a:sysClr val="window" lastClr="FFFFFF"/>
+      </a:lt1>
+      <a:dk2>
+        <a:srgbClr val="1F497D"/>
+      </a:dk2>
+      <a:lt2>
+        <a:srgbClr val="EEECE1"/>
+      </a:lt2>
+      <a:accent1>
+        <a:srgbClr val="4F81BD"/>
+      </a:accent1>
+      <a:accent2>
+        <a:srgbClr val="C0504D"/>
+      </a:accent2>
+      <a:accent3>
+        <a:srgbClr val="9BBB59"/>
+      </a:accent3>
+      <a:accent4>
+        <a:srgbClr val="8064A2"/>
+      </a:accent4>
+      <a:accent5>
+        <a:srgbClr val="4BACC6"/>
+      </a:accent5>
+      <a:accent6>
+        <a:srgbClr val="F79646"/>
+      </a:accent6>
+      <a:hlink>
+        <a:srgbClr val="0000FF"/>
+      </a:hlink>
+      <a:folHlink>
+        <a:srgbClr val="800080"/>
+      </a:folHlink>
+    </a:clrScheme>
+    <a:fontScheme name="Стандартна">
+      <a:majorFont>
+        <a:latin typeface="Calibri"/>
+        <a:ea typeface=""/>
+        <a:cs typeface=""/>
+        <a:font script="Jpan" typeface="ＭＳ Ｐゴシック"/>
+        <a:font script="Hang" typeface="맑은 고딕"/>
+        <a:font script="Hans" typeface="宋体"/>
+        <a:font script="Hant" typeface="新細明體"/>
+        <a:font script="Arab" typeface="Times New Roman"/>
+        <a:font script="Hebr" typeface="Times New Roman"/>
+        <a:font script="Thai" typeface="Angsana New"/>
+        <a:font script="Ethi" typeface="Nyala"/>
+        <a:font script="Beng" typeface="Vrinda"/>
+        <a:font script="Gujr" typeface="Shruti"/>
+        <a:font script="Khmr" typeface="MoolBoran"/>
+        <a:font script="Knda" typeface="Tunga"/>
+        <a:font script="Guru" typeface="Raavi"/>
+        <a:font script="Cans" typeface="Euphemia"/>
+        <a:font script="Cher" typeface="Plantagenet Cherokee"/>
+        <a:font script="Yiii" typeface="Microsoft Yi Baiti"/>
+        <a:font script="Tibt" typeface="Microsoft Himalaya"/>
+        <a:font script="Thaa" typeface="MV Boli"/>
+        <a:font script="Deva" typeface="Mangal"/>
+        <a:font script="Telu" typeface="Gautami"/>
+        <a:font script="Taml" typeface="Latha"/>
+        <a:font script="Syrc" typeface="Estrangelo Edessa"/>
+        <a:font script="Orya" typeface="Kalinga"/>
+        <a:font script="Mlym" typeface="Kartika"/>
+        <a:font script="Laoo" typeface="DokChampa"/>
+        <a:font script="Sinh" typeface="Iskoola Pota"/>
+        <a:font script="Mong" typeface="Mongolian Baiti"/>
+        <a:font script="Viet" typeface="Times New Roman"/>
+        <a:font script="Uigh" typeface="Microsoft Uighur"/>
+        <a:font script="Geor" typeface="Sylfaen"/>
+      </a:majorFont>
+      <a:minorFont>
+        <a:latin typeface="Calibri"/>
+        <a:ea typeface=""/>
+        <a:cs typeface=""/>
+        <a:font script="Jpan" typeface="ＭＳ Ｐゴシック"/>
+        <a:font script="Hang" typeface="맑은 고딕"/>
+        <a:font script="Hans" typeface="宋体"/>
+        <a:font script="Hant" typeface="新細明體"/>
+        <a:font script="Arab" typeface="Arial"/>
+        <a:font script="Hebr" typeface="Arial"/>
+        <a:font script="Thai" typeface="Cordia New"/>
+        <a:font script="Ethi" typeface="Nyala"/>
+        <a:font script="Beng" typeface="Vrinda"/>
+        <a:font script="Gujr" typeface="Shruti"/>
+        <a:font script="Khmr" typeface="DaunPenh"/>
+        <a:font script="Knda" typeface="Tunga"/>
+        <a:font script="Guru" typeface="Raavi"/>
+        <a:font script="Cans" typeface="Euphemia"/>
+        <a:font script="Cher" typeface="Plantagenet Cherokee"/>
+        <a:font script="Yiii" typeface="Microsoft Yi Baiti"/>
+        <a:font script="Tibt" typeface="Microsoft Himalaya"/>
+        <a:font script="Thaa" typeface="MV Boli"/>
+        <a:font script="Deva" typeface="Mangal"/>
+        <a:font script="Telu" typeface="Gautami"/>
+        <a:font script="Taml" typeface="Latha"/>
+        <a:font script="Syrc" typeface="Estrangelo Edessa"/>
+        <a:font script="Orya" typeface="Kalinga"/>
+        <a:font script="Mlym" typeface="Kartika"/>
+        <a:font script="Laoo" typeface="DokChampa"/>
+        <a:font script="Sinh" typeface="Iskoola Pota"/>
+        <a:font script="Mong" typeface="Mongolian Baiti"/>
+        <a:font script="Viet" typeface="Arial"/>
+        <a:font script="Uigh" typeface="Microsoft Uighur"/>
+        <a:font script="Geor" typeface="Sylfaen"/>
+      </a:minorFont>
+    </a:fontScheme>
+    <a:fmtScheme name="Стандартна">
+      <a:fillStyleLst>
+        <a:solidFill>
+          <a:schemeClr val="phClr"/>
+        </a:solidFill>
+        <a:gradFill rotWithShape="1">
+          <a:gsLst>
+            <a:gs pos="0">
+              <a:schemeClr val="phClr">
+                <a:tint val="50000"/>
+                <a:satMod val="300000"/>
+              </a:schemeClr>
+            </a:gs>
+            <a:gs pos="35000">
+              <a:schemeClr val="phClr">
+                <a:tint val="37000"/>
+                <a:satMod val="300000"/>
+              </a:schemeClr>
+            </a:gs>
+            <a:gs pos="100000">
+              <a:schemeClr val="phClr">
+                <a:tint val="15000"/>
+                <a:satMod val="350000"/>
+              </a:schemeClr>
+            </a:gs>
+          </a:gsLst>
+          <a:lin ang="16200000" scaled="1"/>
+        </a:gradFill>
+        <a:gradFill rotWithShape="1">
+          <a:gsLst>
+            <a:gs pos="0">
+              <a:schemeClr val="phClr">
+                <a:shade val="51000"/>
+                <a:satMod val="130000"/>
+              </a:schemeClr>
+            </a:gs>
+            <a:gs pos="80000">
+              <a:schemeClr val="phClr">
+                <a:shade val="93000"/>
+                <a:satMod val="130000"/>
+              </a:schemeClr>
+            </a:gs>
+            <a:gs pos="100000">
+              <a:schemeClr val="phClr">
+                <a:shade val="94000"/>
+                <a:satMod val="135000"/>
+              </a:schemeClr>
+            </a:gs>
+          </a:gsLst>
+          <a:lin ang="16200000" scaled="0"/>
+        </a:gradFill>
+      </a:fillStyleLst>
+      <a:lnStyleLst>
+        <a:ln w="9525" cap="flat" cmpd="sng" algn="ctr">
+          <a:solidFill>
+            <a:schemeClr val="phClr">
+              <a:shade val="95000"/>
+              <a:satMod val="105000"/>
+            </a:schemeClr>
+          </a:solidFill>
+          <a:prstDash val="solid"/>
+        </a:ln>
+        <a:ln w="25400" cap="flat" cmpd="sng" algn="ctr">
+          <a:solidFill>
+            <a:schemeClr val="phClr"/>
+          </a:solidFill>
+          <a:prstDash val="solid"/>
+        </a:ln>
+        <a:ln w="38100" cap="flat" cmpd="sng" algn="ctr">
+          <a:solidFill>
+            <a:schemeClr val="phClr"/>
+          </a:solidFill>
+          <a:prstDash val="solid"/>
+        </a:ln>
+      </a:lnStyleLst>
+      <a:effectStyleLst>
+        <a:effectStyle>
+          <a:effectLst>
+            <a:outerShdw blurRad="40000" dist="20000" dir="5400000" rotWithShape="0">
+              <a:srgbClr val="000000">
+                <a:alpha val="38000"/>
+              </a:srgbClr>
+            </a:outerShdw>
+          </a:effectLst>
+        </a:effectStyle>
+        <a:effectStyle>
+          <a:effectLst>
+            <a:outerShdw blurRad="40000" dist="23000" dir="5400000" rotWithShape="0">
+              <a:srgbClr val="000000">
+                <a:alpha val="35000"/>
+              </a:srgbClr>
+            </a:outerShdw>
+          </a:effectLst>
+        </a:effectStyle>
+        <a:effectStyle>
+          <a:effectLst>
+            <a:outerShdw blurRad="40000" dist="23000" dir="5400000" rotWithShape="0">
+              <a:srgbClr val="000000">
+                <a:alpha val="35000"/>
+              </a:srgbClr>
+            </a:outerShdw>
+          </a:effectLst>
+          <a:scene3d>
+            <a:camera prst="orthographicFront">
+              <a:rot lat="0" lon="0" rev="0"/>
+            </a:camera>
+            <a:lightRig rig="threePt" dir="t">
+              <a:rot lat="0" lon="0" rev="1200000"/>
+            </a:lightRig>
+          </a:scene3d>
+          <a:sp3d>
+            <a:bevelT w="63500" h="25400"/>
+          </a:sp3d>
+        </a:effectStyle>
+      </a:effectStyleLst>
+      <a:bgFillStyleLst>
+        <a:solidFill>
+          <a:schemeClr val="phClr"/>
+        </a:solidFill>
+        <a:gradFill rotWithShape="1">
+          <a:gsLst>
+            <a:gs pos="0">
+              <a:schemeClr val="phClr">
+                <a:tint val="40000"/>
+                <a:satMod val="350000"/>
+              </a:schemeClr>
+            </a:gs>
+            <a:gs pos="40000">
+              <a:schemeClr val="phClr">
+                <a:tint val="45000"/>
+                <a:shade val="99000"/>
+                <a:satMod val="350000"/>
+              </a:schemeClr>
+            </a:gs>
+            <a:gs pos="100000">
+              <a:schemeClr val="phClr">
+                <a:shade val="20000"/>
+                <a:satMod val="255000"/>
+              </a:schemeClr>
+            </a:gs>
+          </a:gsLst>
+          <a:path path="circle">
+            <a:fillToRect l="50000" t="-80000" r="50000" b="180000"/>
+          </a:path>
+        </a:gradFill>
+        <a:gradFill rotWithShape="1">
+          <a:gsLst>
+            <a:gs pos="0">
+              <a:schemeClr val="phClr">
+                <a:tint val="80000"/>
+                <a:satMod val="300000"/>
+              </a:schemeClr>
+            </a:gs>
+            <a:gs pos="100000">
+              <a:schemeClr val="phClr">
+                <a:shade val="30000"/>
+                <a:satMod val="200000"/>
+              </a:schemeClr>
+            </a:gs>
+          </a:gsLst>
+          <a:path path="circle">
+            <a:fillToRect l="50000" t="50000" r="50000" b="50000"/>
+          </a:path>
+        </a:gradFill>
+      </a:bgFillStyleLst>
+    </a:fmtScheme>
+  </a:themeElements>
+  <a:objectDefaults/>
+  <a:extraClrSchemeLst/>
+</a:theme>
+</file>
+
+<file path=ppt/theme/theme5.xml><?xml version="1.0" encoding="utf-8"?>
 <a:theme xmlns:a="http://schemas.openxmlformats.org/drawingml/2006/main" name="Office Theme">
   <a:themeElements>
     <a:clrScheme name="Office">
@@ -7572,7 +8926,7 @@
   <a:extraClrSchemeLst/>
   <a:extLst>
     <a:ext uri="{05A4C25C-085E-4340-85A3-A5531E510DB2}">
-      <thm15:themeFamily xmlns:thm15="http://schemas.microsoft.com/office/thememl/2012/main" xmlns="" name="Office Theme" id="{62F939B6-93AF-4DB8-9C6B-D6C7DFDC589F}" vid="{4A3C46E8-61CC-4603-A589-7422A47A8E4A}"/>
+      <thm15:themeFamily xmlns="" xmlns:thm15="http://schemas.microsoft.com/office/thememl/2012/main" name="Office Theme" id="{62F939B6-93AF-4DB8-9C6B-D6C7DFDC589F}" vid="{4A3C46E8-61CC-4603-A589-7422A47A8E4A}"/>
     </a:ext>
   </a:extLst>
 </a:theme>

</xml_diff>

<commit_message>
execution model presentation version 2(add information about memory storage and how clr creates and uses objects)
</commit_message>
<xml_diff>
--- a/Education/Execution model.pptx
+++ b/Education/Execution model.pptx
@@ -7,10 +7,10 @@
     <p:sldMasterId id="2147483686" r:id="rId3"/>
   </p:sldMasterIdLst>
   <p:notesMasterIdLst>
-    <p:notesMasterId r:id="rId31"/>
+    <p:notesMasterId r:id="rId39"/>
   </p:notesMasterIdLst>
   <p:handoutMasterIdLst>
-    <p:handoutMasterId r:id="rId32"/>
+    <p:handoutMasterId r:id="rId40"/>
   </p:handoutMasterIdLst>
   <p:sldIdLst>
     <p:sldId id="287" r:id="rId4"/>
@@ -37,9 +37,17 @@
     <p:sldId id="309" r:id="rId25"/>
     <p:sldId id="315" r:id="rId26"/>
     <p:sldId id="310" r:id="rId27"/>
-    <p:sldId id="311" r:id="rId28"/>
-    <p:sldId id="312" r:id="rId29"/>
-    <p:sldId id="313" r:id="rId30"/>
+    <p:sldId id="319" r:id="rId28"/>
+    <p:sldId id="320" r:id="rId29"/>
+    <p:sldId id="321" r:id="rId30"/>
+    <p:sldId id="322" r:id="rId31"/>
+    <p:sldId id="323" r:id="rId32"/>
+    <p:sldId id="324" r:id="rId33"/>
+    <p:sldId id="325" r:id="rId34"/>
+    <p:sldId id="327" r:id="rId35"/>
+    <p:sldId id="328" r:id="rId36"/>
+    <p:sldId id="329" r:id="rId37"/>
+    <p:sldId id="326" r:id="rId38"/>
   </p:sldIdLst>
   <p:sldSz cx="9144000" cy="6858000" type="screen4x3"/>
   <p:notesSz cx="6858000" cy="9144000"/>
@@ -140,7 +148,7 @@
   </p:defaultTextStyle>
   <p:extLst>
     <p:ext uri="{EFAFB233-063F-42B5-8137-9DF3F51BA10A}">
-      <p15:sldGuideLst xmlns="" xmlns:p15="http://schemas.microsoft.com/office/powerpoint/2012/main">
+      <p15:sldGuideLst xmlns:p15="http://schemas.microsoft.com/office/powerpoint/2012/main" xmlns="">
         <p15:guide id="2" pos="2880" userDrawn="1">
           <p15:clr>
             <a:srgbClr val="A4A3A4"/>
@@ -159,7 +167,7 @@
       </p15:sldGuideLst>
     </p:ext>
     <p:ext uri="{2D200454-40CA-4A62-9FC3-DE9A4176ACB9}">
-      <p15:notesGuideLst xmlns="" xmlns:p15="http://schemas.microsoft.com/office/powerpoint/2012/main"/>
+      <p15:notesGuideLst xmlns:p15="http://schemas.microsoft.com/office/powerpoint/2012/main" xmlns=""/>
     </p:ext>
   </p:extLst>
 </p:presentation>
@@ -247,7 +255,7 @@
           <a:p>
             <a:fld id="{4DF7676A-16FE-41B0-990D-65C7DB39A42C}" type="datetimeFigureOut">
               <a:rPr lang="uk-UA" smtClean="0"/>
-              <a:t>16.10.2017</a:t>
+              <a:t>17.10.2017</a:t>
             </a:fld>
             <a:endParaRPr lang="uk-UA"/>
           </a:p>
@@ -412,7 +420,7 @@
           <a:p>
             <a:fld id="{7AC0486E-ABFE-43FA-BADE-5C75804AABCB}" type="datetimeFigureOut">
               <a:rPr lang="en-US" smtClean="0"/>
-              <a:t>10/16/2017</a:t>
+              <a:t>10/17/2017</a:t>
             </a:fld>
             <a:endParaRPr lang="en-US"/>
           </a:p>
@@ -1533,6 +1541,163 @@
 </p:notes>
 </file>
 
+<file path=ppt/notesSlides/notesSlide8.xml><?xml version="1.0" encoding="utf-8"?>
+<p:notes xmlns:a="http://schemas.openxmlformats.org/drawingml/2006/main" xmlns:r="http://schemas.openxmlformats.org/officeDocument/2006/relationships" xmlns:p="http://schemas.openxmlformats.org/presentationml/2006/main">
+  <p:cSld>
+    <p:spTree>
+      <p:nvGrpSpPr>
+        <p:cNvPr id="1" name=""/>
+        <p:cNvGrpSpPr/>
+        <p:nvPr/>
+      </p:nvGrpSpPr>
+      <p:grpSpPr>
+        <a:xfrm>
+          <a:off x="0" y="0"/>
+          <a:ext cx="0" cy="0"/>
+          <a:chOff x="0" y="0"/>
+          <a:chExt cx="0" cy="0"/>
+        </a:xfrm>
+      </p:grpSpPr>
+      <p:sp>
+        <p:nvSpPr>
+          <p:cNvPr id="2" name="Місце для зображення 1"/>
+          <p:cNvSpPr>
+            <a:spLocks noGrp="1" noRot="1" noChangeAspect="1"/>
+          </p:cNvSpPr>
+          <p:nvPr>
+            <p:ph type="sldImg"/>
+          </p:nvPr>
+        </p:nvSpPr>
+        <p:spPr/>
+      </p:sp>
+      <p:sp>
+        <p:nvSpPr>
+          <p:cNvPr id="3" name="Місце для нотаток 2"/>
+          <p:cNvSpPr>
+            <a:spLocks noGrp="1"/>
+          </p:cNvSpPr>
+          <p:nvPr>
+            <p:ph type="body" idx="1"/>
+          </p:nvPr>
+        </p:nvSpPr>
+        <p:spPr/>
+        <p:txBody>
+          <a:bodyPr/>
+          <a:lstStyle/>
+          <a:p>
+            <a:r>
+              <a:rPr lang="en-US" dirty="0" smtClean="0"/>
+              <a:t>The Windows process started, the CLR was loaded into it, the managed heap was initialized, and a thread was created (with its 1 MB of memory on the stack). In the process of converting the IL-code of the M3 method to machine instructions, the JIT compiler identifies all the types referenced in M3-these are the Employee, Int32, Manager, and String types (because of the "Joe" string). At this point, the CLR provides loading into the application domain of all assemblies in which all these types are defined. Then, using assembly metadata, the CLR gets information about types and creates data structures that actually represent these types. The data structures for the Employee and Manager object types are shown on the</a:t>
+            </a:r>
+            <a:r>
+              <a:rPr lang="uk-UA" dirty="0" smtClean="0"/>
+              <a:t> </a:t>
+            </a:r>
+            <a:r>
+              <a:rPr lang="en-US" dirty="0" smtClean="0"/>
+              <a:t>picture.</a:t>
+            </a:r>
+          </a:p>
+          <a:p>
+            <a:r>
+              <a:rPr lang="en-US" dirty="0" smtClean="0"/>
+              <a:t>Finally, each type object has a method table with input points of all methods defined in the type. Since there are three methods defined in the Employee type (</a:t>
+            </a:r>
+            <a:r>
+              <a:rPr lang="en-US" dirty="0" err="1" smtClean="0"/>
+              <a:t>GetYearsEmployed</a:t>
+            </a:r>
+            <a:r>
+              <a:rPr lang="en-US" dirty="0" smtClean="0"/>
+              <a:t>, </a:t>
+            </a:r>
+            <a:r>
+              <a:rPr lang="en-US" dirty="0" err="1" smtClean="0"/>
+              <a:t>GenProgressReport</a:t>
+            </a:r>
+            <a:r>
+              <a:rPr lang="en-US" dirty="0" smtClean="0"/>
+              <a:t>, and Lookup), there are three entries in the corresponding method table.</a:t>
+            </a:r>
+          </a:p>
+          <a:p>
+            <a:r>
+              <a:rPr lang="en-US" dirty="0" smtClean="0"/>
+              <a:t>Next, M3 executes the code to create the Manager object. In this case, an instance of Manager type is created in the managed heap, that is, the Manager object. The Manager object - as well as all other objects - has a pointer to the object-type and the index of the synchronization block.</a:t>
+            </a:r>
+          </a:p>
+          <a:p>
+            <a:r>
+              <a:rPr lang="en-US" dirty="0" smtClean="0"/>
+              <a:t>Whenever a new object is created on the heap, the CLR automatically initializes the internal pointer to the type object so that it points to the corresponding type object (in this case, to the Manager object).</a:t>
+            </a:r>
+          </a:p>
+          <a:p>
+            <a:r>
+              <a:rPr lang="en-US" dirty="0" smtClean="0"/>
+              <a:t>The new operator returns the address in the memory of the Manager object, which is stored in the variable e (in the thread stack).</a:t>
+            </a:r>
+            <a:br>
+              <a:rPr lang="en-US" dirty="0" smtClean="0"/>
+            </a:br>
+            <a:r>
+              <a:rPr lang="en-US" dirty="0" smtClean="0"/>
+              <a:t>The next line of the M3 method calls the static Lookup method of the Employee object. When this method is called, the CLR locates the type object corresponding to the type in which the static method is defined. Then, based on the object-type method table, the CLR locates the entry point to the called method, processes the code with the JIT compiler (if necessary), and passes control to the received machine code.</a:t>
+            </a:r>
+          </a:p>
+          <a:p>
+            <a:r>
+              <a:rPr lang="en-US" dirty="0" smtClean="0"/>
+              <a:t>The next line of the M3 method calls the </a:t>
+            </a:r>
+            <a:r>
+              <a:rPr lang="en-US" dirty="0" err="1" smtClean="0"/>
+              <a:t>GenProgressReport</a:t>
+            </a:r>
+            <a:r>
+              <a:rPr lang="en-US" dirty="0" smtClean="0"/>
+              <a:t> virtual instance method in Employee. When you call the virtual instance CLR, you have to do some extra work. First, the CLR refers to the variable used for the call, and then follows the address of the calling object. In this case, the variable e indicates a Joe object of type Manager. Secondly, the CLR checks the object's internal pointer to the object-type. CLR then finds the record of the called method in the method table of the object-type, processes the code with the JIT compiler (if necessary), and calls the received machine code.</a:t>
+            </a:r>
+            <a:endParaRPr lang="en-US" dirty="0"/>
+          </a:p>
+        </p:txBody>
+      </p:sp>
+      <p:sp>
+        <p:nvSpPr>
+          <p:cNvPr id="4" name="Місце для номера слайда 3"/>
+          <p:cNvSpPr>
+            <a:spLocks noGrp="1"/>
+          </p:cNvSpPr>
+          <p:nvPr>
+            <p:ph type="sldNum" sz="quarter" idx="10"/>
+          </p:nvPr>
+        </p:nvSpPr>
+        <p:spPr/>
+        <p:txBody>
+          <a:bodyPr/>
+          <a:lstStyle/>
+          <a:p>
+            <a:fld id="{E82F8FD2-9FCC-4B88-9227-FECD3AD2150F}" type="slidenum">
+              <a:rPr lang="en-US" smtClean="0"/>
+              <a:t>33</a:t>
+            </a:fld>
+            <a:endParaRPr lang="en-US"/>
+          </a:p>
+        </p:txBody>
+      </p:sp>
+    </p:spTree>
+    <p:extLst>
+      <p:ext uri="{BB962C8B-B14F-4D97-AF65-F5344CB8AC3E}">
+        <p14:creationId xmlns:p14="http://schemas.microsoft.com/office/powerpoint/2010/main" val="807164275"/>
+      </p:ext>
+    </p:extLst>
+  </p:cSld>
+  <p:clrMapOvr>
+    <a:masterClrMapping/>
+  </p:clrMapOvr>
+</p:notes>
+</file>
+
 <file path=ppt/slideLayouts/slideLayout1.xml><?xml version="1.0" encoding="utf-8"?>
 <p:sldLayout xmlns:a="http://schemas.openxmlformats.org/drawingml/2006/main" xmlns:r="http://schemas.openxmlformats.org/officeDocument/2006/relationships" xmlns:p="http://schemas.openxmlformats.org/presentationml/2006/main" preserve="1" userDrawn="1">
   <p:cSld name="Title Slide 2">
@@ -1769,7 +1934,7 @@
   </p:timing>
   <p:extLst mod="1">
     <p:ext uri="{DCECCB84-F9BA-43D5-87BE-67443E8EF086}">
-      <p15:sldGuideLst xmlns="" xmlns:p15="http://schemas.microsoft.com/office/powerpoint/2012/main"/>
+      <p15:sldGuideLst xmlns:p15="http://schemas.microsoft.com/office/powerpoint/2012/main" xmlns=""/>
     </p:ext>
   </p:extLst>
 </p:sldLayout>
@@ -3364,7 +3529,7 @@
   </p:txStyles>
   <p:extLst mod="1">
     <p:ext uri="{27BBF7A9-308A-43DC-89C8-2F10F3537804}">
-      <p15:sldGuideLst xmlns="" xmlns:p15="http://schemas.microsoft.com/office/powerpoint/2012/main">
+      <p15:sldGuideLst xmlns:p15="http://schemas.microsoft.com/office/powerpoint/2012/main" xmlns="">
         <p15:guide id="1" pos="136" userDrawn="1">
           <p15:clr>
             <a:srgbClr val="F26B43"/>
@@ -3880,7 +4045,7 @@
   </p:txStyles>
   <p:extLst mod="1">
     <p:ext uri="{27BBF7A9-308A-43DC-89C8-2F10F3537804}">
-      <p15:sldGuideLst xmlns="" xmlns:p15="http://schemas.microsoft.com/office/powerpoint/2012/main">
+      <p15:sldGuideLst xmlns:p15="http://schemas.microsoft.com/office/powerpoint/2012/main" xmlns="">
         <p15:guide id="1" pos="158" userDrawn="1">
           <p15:clr>
             <a:srgbClr val="F26B43"/>
@@ -4343,7 +4508,7 @@
   </p:txStyles>
   <p:extLst mod="1">
     <p:ext uri="{27BBF7A9-308A-43DC-89C8-2F10F3537804}">
-      <p15:sldGuideLst xmlns="" xmlns:p15="http://schemas.microsoft.com/office/powerpoint/2012/main">
+      <p15:sldGuideLst xmlns:p15="http://schemas.microsoft.com/office/powerpoint/2012/main" xmlns="">
         <p15:guide id="1" pos="125" userDrawn="1">
           <p15:clr>
             <a:srgbClr val="F26B43"/>
@@ -6194,8 +6359,8 @@
           <a:p>
             <a:pPr algn="ctr"/>
             <a:r>
-              <a:rPr lang="en-US" dirty="0" smtClean="0"/>
-              <a:t>Objects</a:t>
+              <a:rPr lang="en-AU" dirty="0"/>
+              <a:t>Storage Model</a:t>
             </a:r>
             <a:endParaRPr lang="en-US" dirty="0"/>
           </a:p>
@@ -6246,40 +6411,80 @@
           <a:bodyPr/>
           <a:lstStyle/>
           <a:p>
-            <a:endParaRPr lang="en-US"/>
-          </a:p>
-        </p:txBody>
-      </p:sp>
-      <p:sp>
-        <p:nvSpPr>
-          <p:cNvPr id="3" name="Підзаголовок 2"/>
-          <p:cNvSpPr>
-            <a:spLocks noGrp="1"/>
-          </p:cNvSpPr>
-          <p:nvPr>
-            <p:ph type="subTitle" idx="1"/>
-          </p:nvPr>
-        </p:nvSpPr>
-        <p:spPr/>
-        <p:txBody>
-          <a:bodyPr/>
-          <a:lstStyle/>
-          <a:p>
+            <a:pPr marL="342900" indent="-342900">
+              <a:buClr>
+                <a:schemeClr val="tx2"/>
+              </a:buClr>
+              <a:buFont typeface="Arial" panose="020B0604020202020204" pitchFamily="34" charset="0"/>
+              <a:buChar char="•"/>
+            </a:pPr>
             <a:r>
               <a:rPr lang="en-US" dirty="0"/>
-              <a:t>H</a:t>
-            </a:r>
-            <a:r>
-              <a:rPr lang="en-AU" dirty="0" smtClean="0"/>
-              <a:t>ow </a:t>
-            </a:r>
-            <a:r>
-              <a:rPr lang="en-AU" dirty="0"/>
-              <a:t>constructors are </a:t>
-            </a:r>
-            <a:r>
-              <a:rPr lang="en-AU" dirty="0" smtClean="0"/>
-              <a:t>called?</a:t>
+              <a:t>birth - when allocated </a:t>
+            </a:r>
+          </a:p>
+          <a:p>
+            <a:pPr marL="342900" indent="-342900">
+              <a:buClr>
+                <a:schemeClr val="tx2"/>
+              </a:buClr>
+              <a:buFont typeface="Arial" panose="020B0604020202020204" pitchFamily="34" charset="0"/>
+              <a:buChar char="•"/>
+            </a:pPr>
+            <a:r>
+              <a:rPr lang="en-US" dirty="0"/>
+              <a:t>death - when deallocated </a:t>
+            </a:r>
+          </a:p>
+          <a:p>
+            <a:pPr marL="342900" indent="-342900">
+              <a:buClr>
+                <a:schemeClr val="tx2"/>
+              </a:buClr>
+              <a:buFont typeface="Arial" panose="020B0604020202020204" pitchFamily="34" charset="0"/>
+              <a:buChar char="•"/>
+            </a:pPr>
+            <a:r>
+              <a:rPr lang="en-US" dirty="0"/>
+              <a:t>lifetime - time between birth and death </a:t>
+            </a:r>
+          </a:p>
+          <a:p>
+            <a:pPr marL="342900" indent="-342900">
+              <a:buClr>
+                <a:schemeClr val="tx2"/>
+              </a:buClr>
+              <a:buFont typeface="Arial" panose="020B0604020202020204" pitchFamily="34" charset="0"/>
+              <a:buChar char="•"/>
+            </a:pPr>
+            <a:r>
+              <a:rPr lang="en-US" dirty="0"/>
+              <a:t>run-time storage manager/memory manager </a:t>
+            </a:r>
+          </a:p>
+          <a:p>
+            <a:pPr lvl="1"/>
+            <a:r>
+              <a:rPr lang="en-US" dirty="0"/>
+              <a:t>allocates objects </a:t>
+            </a:r>
+          </a:p>
+          <a:p>
+            <a:pPr lvl="1"/>
+            <a:r>
+              <a:rPr lang="en-US" dirty="0"/>
+              <a:t>deallocates objects </a:t>
+            </a:r>
+          </a:p>
+          <a:p>
+            <a:pPr lvl="1"/>
+            <a:r>
+              <a:rPr lang="en-US" dirty="0"/>
+              <a:t>garbage collects when memory becomes </a:t>
+            </a:r>
+            <a:r>
+              <a:rPr lang="en-US" dirty="0" smtClean="0"/>
+              <a:t>fragmented</a:t>
             </a:r>
             <a:endParaRPr lang="en-US" dirty="0"/>
           </a:p>
@@ -6288,7 +6493,7 @@
     </p:spTree>
     <p:extLst>
       <p:ext uri="{BB962C8B-B14F-4D97-AF65-F5344CB8AC3E}">
-        <p14:creationId xmlns:p14="http://schemas.microsoft.com/office/powerpoint/2010/main" val="38760883"/>
+        <p14:creationId xmlns:p14="http://schemas.microsoft.com/office/powerpoint/2010/main" val="768432717"/>
       </p:ext>
     </p:extLst>
   </p:cSld>
@@ -6330,7 +6535,83 @@
           <a:bodyPr/>
           <a:lstStyle/>
           <a:p>
-            <a:endParaRPr lang="en-US"/>
+            <a:r>
+              <a:rPr lang="en-US" dirty="0"/>
+              <a:t>S</a:t>
+            </a:r>
+            <a:r>
+              <a:rPr lang="en-US" dirty="0" smtClean="0"/>
+              <a:t>tatic </a:t>
+            </a:r>
+            <a:endParaRPr lang="en-US" dirty="0"/>
+          </a:p>
+          <a:p>
+            <a:pPr lvl="1"/>
+            <a:r>
+              <a:rPr lang="en-US" dirty="0"/>
+              <a:t>allocated once </a:t>
+            </a:r>
+          </a:p>
+          <a:p>
+            <a:pPr lvl="1"/>
+            <a:r>
+              <a:rPr lang="en-US" dirty="0"/>
+              <a:t>lifetime is entire program </a:t>
+            </a:r>
+          </a:p>
+          <a:p>
+            <a:pPr lvl="1"/>
+            <a:r>
+              <a:rPr lang="en-US" dirty="0"/>
+              <a:t>immortal, never deallocated </a:t>
+            </a:r>
+          </a:p>
+          <a:p>
+            <a:pPr lvl="1"/>
+            <a:r>
+              <a:rPr lang="en-US" dirty="0"/>
+              <a:t>canonical example, global variables </a:t>
+            </a:r>
+          </a:p>
+          <a:p>
+            <a:r>
+              <a:rPr lang="en-US" dirty="0" smtClean="0"/>
+              <a:t>Dynamic </a:t>
+            </a:r>
+            <a:endParaRPr lang="en-US" dirty="0"/>
+          </a:p>
+          <a:p>
+            <a:pPr lvl="1"/>
+            <a:r>
+              <a:rPr lang="en-US" dirty="0"/>
+              <a:t>allocated at run-time </a:t>
+            </a:r>
+          </a:p>
+          <a:p>
+            <a:pPr lvl="1"/>
+            <a:r>
+              <a:rPr lang="en-US" dirty="0"/>
+              <a:t>lifetime is (possibly) brief </a:t>
+            </a:r>
+          </a:p>
+          <a:p>
+            <a:pPr lvl="1"/>
+            <a:r>
+              <a:rPr lang="en-US" dirty="0"/>
+              <a:t>deallocated explicitly or implicitly </a:t>
+            </a:r>
+          </a:p>
+          <a:p>
+            <a:pPr lvl="1"/>
+            <a:r>
+              <a:rPr lang="en-US" dirty="0"/>
+              <a:t>canonical example, local variables in </a:t>
+            </a:r>
+            <a:r>
+              <a:rPr lang="en-US" dirty="0" smtClean="0"/>
+              <a:t>subroutine</a:t>
+            </a:r>
+            <a:endParaRPr lang="en-US" dirty="0"/>
           </a:p>
         </p:txBody>
       </p:sp>
@@ -6350,20 +6631,8 @@
           <a:lstStyle/>
           <a:p>
             <a:r>
-              <a:rPr lang="en-US" dirty="0"/>
-              <a:t>H</a:t>
-            </a:r>
-            <a:r>
-              <a:rPr lang="en-US" dirty="0" smtClean="0"/>
-              <a:t>ow </a:t>
-            </a:r>
-            <a:r>
-              <a:rPr lang="en-US" dirty="0"/>
-              <a:t>data is displayed in </a:t>
-            </a:r>
-            <a:r>
-              <a:rPr lang="en-US" dirty="0" smtClean="0"/>
-              <a:t>memory?</a:t>
+              <a:rPr lang="en-US" dirty="0" smtClean="0"/>
+              <a:t>Static vs Dynamic</a:t>
             </a:r>
             <a:endParaRPr lang="en-US" dirty="0"/>
           </a:p>
@@ -6372,7 +6641,7 @@
     </p:spTree>
     <p:extLst>
       <p:ext uri="{BB962C8B-B14F-4D97-AF65-F5344CB8AC3E}">
-        <p14:creationId xmlns:p14="http://schemas.microsoft.com/office/powerpoint/2010/main" val="144800306"/>
+        <p14:creationId xmlns:p14="http://schemas.microsoft.com/office/powerpoint/2010/main" val="2527843074"/>
       </p:ext>
     </p:extLst>
   </p:cSld>
@@ -6409,12 +6678,77 @@
             <p:ph type="body" sz="quarter" idx="10"/>
           </p:nvPr>
         </p:nvSpPr>
-        <p:spPr/>
+        <p:spPr>
+          <a:xfrm>
+            <a:off x="0" y="1592494"/>
+            <a:ext cx="8947547" cy="5005161"/>
+          </a:xfrm>
+        </p:spPr>
         <p:txBody>
           <a:bodyPr/>
           <a:lstStyle/>
           <a:p>
-            <a:endParaRPr lang="en-US"/>
+            <a:pPr lvl="1"/>
+            <a:r>
+              <a:rPr lang="en-US" dirty="0" err="1" smtClean="0"/>
+              <a:t>freelist</a:t>
+            </a:r>
+            <a:r>
+              <a:rPr lang="en-US" dirty="0" smtClean="0"/>
+              <a:t> </a:t>
+            </a:r>
+            <a:r>
+              <a:rPr lang="en-US" dirty="0"/>
+              <a:t>-- list of free space </a:t>
+            </a:r>
+          </a:p>
+          <a:p>
+            <a:pPr lvl="1"/>
+            <a:r>
+              <a:rPr lang="en-US" dirty="0"/>
+              <a:t>on allocation -- memory manager finds space and marks it as used changing </a:t>
+            </a:r>
+            <a:r>
+              <a:rPr lang="en-US" dirty="0" err="1"/>
+              <a:t>freelist</a:t>
+            </a:r>
+            <a:r>
+              <a:rPr lang="en-US" dirty="0"/>
+              <a:t> </a:t>
+            </a:r>
+          </a:p>
+          <a:p>
+            <a:pPr lvl="1"/>
+            <a:r>
+              <a:rPr lang="en-US" dirty="0" smtClean="0"/>
+              <a:t>on </a:t>
+            </a:r>
+            <a:r>
+              <a:rPr lang="en-US" dirty="0"/>
+              <a:t>deallocation -- memory manager marks space as free changing </a:t>
+            </a:r>
+            <a:r>
+              <a:rPr lang="en-US" dirty="0" err="1"/>
+              <a:t>freelist</a:t>
+            </a:r>
+            <a:r>
+              <a:rPr lang="en-US" dirty="0"/>
+              <a:t> </a:t>
+            </a:r>
+          </a:p>
+          <a:p>
+            <a:pPr lvl="1"/>
+            <a:r>
+              <a:rPr lang="en-US" dirty="0"/>
+              <a:t>memory fragmentation -- memory fragments into small blocks over lifetime of program </a:t>
+            </a:r>
+          </a:p>
+          <a:p>
+            <a:pPr lvl="1"/>
+            <a:r>
+              <a:rPr lang="en-US" dirty="0"/>
+              <a:t>garbage collection -- coalesce fragments, possibly moving objects (must be careful of pointers when moving!) </a:t>
+            </a:r>
           </a:p>
         </p:txBody>
       </p:sp>
@@ -6435,15 +6769,7 @@
           <a:p>
             <a:r>
               <a:rPr lang="en-US" dirty="0" smtClean="0"/>
-              <a:t>How memory is </a:t>
-            </a:r>
-            <a:r>
-              <a:rPr lang="en-AU" dirty="0" smtClean="0"/>
-              <a:t>freed</a:t>
-            </a:r>
-            <a:r>
-              <a:rPr lang="uk-UA" dirty="0" smtClean="0"/>
-              <a:t>?</a:t>
+              <a:t>Heap</a:t>
             </a:r>
             <a:endParaRPr lang="en-US" dirty="0"/>
           </a:p>
@@ -6452,7 +6778,341 @@
     </p:spTree>
     <p:extLst>
       <p:ext uri="{BB962C8B-B14F-4D97-AF65-F5344CB8AC3E}">
-        <p14:creationId xmlns:p14="http://schemas.microsoft.com/office/powerpoint/2010/main" val="4118189032"/>
+        <p14:creationId xmlns:p14="http://schemas.microsoft.com/office/powerpoint/2010/main" val="2111563451"/>
+      </p:ext>
+    </p:extLst>
+  </p:cSld>
+  <p:clrMapOvr>
+    <a:masterClrMapping/>
+  </p:clrMapOvr>
+</p:sld>
+</file>
+
+<file path=ppt/slides/slide28.xml><?xml version="1.0" encoding="utf-8"?>
+<p:sld xmlns:a="http://schemas.openxmlformats.org/drawingml/2006/main" xmlns:r="http://schemas.openxmlformats.org/officeDocument/2006/relationships" xmlns:p="http://schemas.openxmlformats.org/presentationml/2006/main">
+  <p:cSld>
+    <p:spTree>
+      <p:nvGrpSpPr>
+        <p:cNvPr id="1" name=""/>
+        <p:cNvGrpSpPr/>
+        <p:nvPr/>
+      </p:nvGrpSpPr>
+      <p:grpSpPr>
+        <a:xfrm>
+          <a:off x="0" y="0"/>
+          <a:ext cx="0" cy="0"/>
+          <a:chOff x="0" y="0"/>
+          <a:chExt cx="0" cy="0"/>
+        </a:xfrm>
+      </p:grpSpPr>
+      <p:sp>
+        <p:nvSpPr>
+          <p:cNvPr id="2" name="Місце для тексту 1"/>
+          <p:cNvSpPr>
+            <a:spLocks noGrp="1"/>
+          </p:cNvSpPr>
+          <p:nvPr>
+            <p:ph type="body" sz="quarter" idx="10"/>
+          </p:nvPr>
+        </p:nvSpPr>
+        <p:spPr>
+          <a:xfrm>
+            <a:off x="0" y="1592494"/>
+            <a:ext cx="5171088" cy="5005161"/>
+          </a:xfrm>
+        </p:spPr>
+        <p:txBody>
+          <a:bodyPr/>
+          <a:lstStyle/>
+          <a:p>
+            <a:pPr lvl="1"/>
+            <a:r>
+              <a:rPr lang="en-US" dirty="0" smtClean="0"/>
+              <a:t>clean </a:t>
+            </a:r>
+            <a:r>
+              <a:rPr lang="en-US" dirty="0"/>
+              <a:t>and efficient support for nested functions and recursion </a:t>
+            </a:r>
+          </a:p>
+          <a:p>
+            <a:pPr lvl="1"/>
+            <a:r>
+              <a:rPr lang="en-US" dirty="0"/>
+              <a:t>central concept is stack frame (also called activation record), </a:t>
+            </a:r>
+            <a:r>
+              <a:rPr lang="en-US" dirty="0" smtClean="0"/>
+              <a:t>includes</a:t>
+            </a:r>
+          </a:p>
+          <a:p>
+            <a:pPr lvl="1"/>
+            <a:r>
+              <a:rPr lang="en-US" dirty="0"/>
+              <a:t>function call -- push stack frame </a:t>
+            </a:r>
+          </a:p>
+          <a:p>
+            <a:pPr lvl="1"/>
+            <a:r>
+              <a:rPr lang="en-US" dirty="0"/>
+              <a:t>function exit -- pop stack </a:t>
+            </a:r>
+            <a:r>
+              <a:rPr lang="en-US" dirty="0" smtClean="0"/>
+              <a:t>frame</a:t>
+            </a:r>
+            <a:endParaRPr lang="en-US" dirty="0"/>
+          </a:p>
+          <a:p>
+            <a:endParaRPr lang="en-US" dirty="0"/>
+          </a:p>
+        </p:txBody>
+      </p:sp>
+      <p:sp>
+        <p:nvSpPr>
+          <p:cNvPr id="3" name="Підзаголовок 2"/>
+          <p:cNvSpPr>
+            <a:spLocks noGrp="1"/>
+          </p:cNvSpPr>
+          <p:nvPr>
+            <p:ph type="subTitle" idx="1"/>
+          </p:nvPr>
+        </p:nvSpPr>
+        <p:spPr/>
+        <p:txBody>
+          <a:bodyPr/>
+          <a:lstStyle/>
+          <a:p>
+            <a:r>
+              <a:rPr lang="en-US" dirty="0" smtClean="0"/>
+              <a:t>Stack</a:t>
+            </a:r>
+            <a:endParaRPr lang="en-US" dirty="0"/>
+          </a:p>
+        </p:txBody>
+      </p:sp>
+      <p:pic>
+        <p:nvPicPr>
+          <p:cNvPr id="4" name="Picture 2"/>
+          <p:cNvPicPr>
+            <a:picLocks noChangeAspect="1" noChangeArrowheads="1"/>
+          </p:cNvPicPr>
+          <p:nvPr/>
+        </p:nvPicPr>
+        <p:blipFill rotWithShape="1">
+          <a:blip r:embed="rId2">
+            <a:extLst>
+              <a:ext uri="{28A0092B-C50C-407E-A947-70E740481C1C}">
+                <a14:useLocalDpi xmlns:a14="http://schemas.microsoft.com/office/drawing/2010/main" val="0"/>
+              </a:ext>
+            </a:extLst>
+          </a:blip>
+          <a:srcRect l="9827" t="19655" r="64181" b="33974"/>
+          <a:stretch/>
+        </p:blipFill>
+        <p:spPr bwMode="auto">
+          <a:xfrm>
+            <a:off x="4934606" y="930170"/>
+            <a:ext cx="3972912" cy="4429973"/>
+          </a:xfrm>
+          <a:prstGeom prst="rect">
+            <a:avLst/>
+          </a:prstGeom>
+          <a:noFill/>
+          <a:ln>
+            <a:noFill/>
+          </a:ln>
+          <a:extLst>
+            <a:ext uri="{909E8E84-426E-40DD-AFC4-6F175D3DCCD1}">
+              <a14:hiddenFill xmlns:a14="http://schemas.microsoft.com/office/drawing/2010/main">
+                <a:solidFill>
+                  <a:schemeClr val="accent1"/>
+                </a:solidFill>
+              </a14:hiddenFill>
+            </a:ext>
+            <a:ext uri="{91240B29-F687-4F45-9708-019B960494DF}">
+              <a14:hiddenLine xmlns:a14="http://schemas.microsoft.com/office/drawing/2010/main" w="9525">
+                <a:solidFill>
+                  <a:schemeClr val="tx1"/>
+                </a:solidFill>
+                <a:miter lim="800000"/>
+                <a:headEnd/>
+                <a:tailEnd/>
+              </a14:hiddenLine>
+            </a:ext>
+          </a:extLst>
+        </p:spPr>
+      </p:pic>
+      <p:pic>
+        <p:nvPicPr>
+          <p:cNvPr id="5" name="Picture 2"/>
+          <p:cNvPicPr>
+            <a:picLocks noChangeAspect="1" noChangeArrowheads="1"/>
+          </p:cNvPicPr>
+          <p:nvPr/>
+        </p:nvPicPr>
+        <p:blipFill rotWithShape="1">
+          <a:blip r:embed="rId2">
+            <a:extLst>
+              <a:ext uri="{28A0092B-C50C-407E-A947-70E740481C1C}">
+                <a14:useLocalDpi xmlns:a14="http://schemas.microsoft.com/office/drawing/2010/main" val="0"/>
+              </a:ext>
+            </a:extLst>
+          </a:blip>
+          <a:srcRect l="9827" t="80637" r="64181" b="8138"/>
+          <a:stretch/>
+        </p:blipFill>
+        <p:spPr bwMode="auto">
+          <a:xfrm>
+            <a:off x="4934606" y="5360143"/>
+            <a:ext cx="3972390" cy="1072194"/>
+          </a:xfrm>
+          <a:prstGeom prst="rect">
+            <a:avLst/>
+          </a:prstGeom>
+          <a:noFill/>
+          <a:ln>
+            <a:noFill/>
+          </a:ln>
+          <a:extLst>
+            <a:ext uri="{909E8E84-426E-40DD-AFC4-6F175D3DCCD1}">
+              <a14:hiddenFill xmlns:a14="http://schemas.microsoft.com/office/drawing/2010/main">
+                <a:solidFill>
+                  <a:schemeClr val="accent1"/>
+                </a:solidFill>
+              </a14:hiddenFill>
+            </a:ext>
+            <a:ext uri="{91240B29-F687-4F45-9708-019B960494DF}">
+              <a14:hiddenLine xmlns:a14="http://schemas.microsoft.com/office/drawing/2010/main" w="9525">
+                <a:solidFill>
+                  <a:schemeClr val="tx1"/>
+                </a:solidFill>
+                <a:miter lim="800000"/>
+                <a:headEnd/>
+                <a:tailEnd/>
+              </a14:hiddenLine>
+            </a:ext>
+          </a:extLst>
+        </p:spPr>
+      </p:pic>
+    </p:spTree>
+    <p:extLst>
+      <p:ext uri="{BB962C8B-B14F-4D97-AF65-F5344CB8AC3E}">
+        <p14:creationId xmlns:p14="http://schemas.microsoft.com/office/powerpoint/2010/main" val="2154520074"/>
+      </p:ext>
+    </p:extLst>
+  </p:cSld>
+  <p:clrMapOvr>
+    <a:masterClrMapping/>
+  </p:clrMapOvr>
+</p:sld>
+</file>
+
+<file path=ppt/slides/slide29.xml><?xml version="1.0" encoding="utf-8"?>
+<p:sld xmlns:a="http://schemas.openxmlformats.org/drawingml/2006/main" xmlns:r="http://schemas.openxmlformats.org/officeDocument/2006/relationships" xmlns:p="http://schemas.openxmlformats.org/presentationml/2006/main">
+  <p:cSld>
+    <p:spTree>
+      <p:nvGrpSpPr>
+        <p:cNvPr id="1" name=""/>
+        <p:cNvGrpSpPr/>
+        <p:nvPr/>
+      </p:nvGrpSpPr>
+      <p:grpSpPr>
+        <a:xfrm>
+          <a:off x="0" y="0"/>
+          <a:ext cx="0" cy="0"/>
+          <a:chOff x="0" y="0"/>
+          <a:chExt cx="0" cy="0"/>
+        </a:xfrm>
+      </p:grpSpPr>
+      <p:pic>
+        <p:nvPicPr>
+          <p:cNvPr id="1027" name="Picture 3"/>
+          <p:cNvPicPr>
+            <a:picLocks noChangeAspect="1" noChangeArrowheads="1"/>
+          </p:cNvPicPr>
+          <p:nvPr/>
+        </p:nvPicPr>
+        <p:blipFill rotWithShape="1">
+          <a:blip r:embed="rId2">
+            <a:extLst>
+              <a:ext uri="{28A0092B-C50C-407E-A947-70E740481C1C}">
+                <a14:useLocalDpi xmlns:a14="http://schemas.microsoft.com/office/drawing/2010/main" val="0"/>
+              </a:ext>
+            </a:extLst>
+          </a:blip>
+          <a:srcRect l="2845" t="18000" r="55776" b="5241"/>
+          <a:stretch/>
+        </p:blipFill>
+        <p:spPr bwMode="auto">
+          <a:xfrm>
+            <a:off x="441434" y="938048"/>
+            <a:ext cx="5044967" cy="5849007"/>
+          </a:xfrm>
+          <a:prstGeom prst="rect">
+            <a:avLst/>
+          </a:prstGeom>
+          <a:noFill/>
+          <a:ln>
+            <a:noFill/>
+          </a:ln>
+          <a:extLst>
+            <a:ext uri="{909E8E84-426E-40DD-AFC4-6F175D3DCCD1}">
+              <a14:hiddenFill xmlns:a14="http://schemas.microsoft.com/office/drawing/2010/main">
+                <a:solidFill>
+                  <a:schemeClr val="accent1"/>
+                </a:solidFill>
+              </a14:hiddenFill>
+            </a:ext>
+            <a:ext uri="{91240B29-F687-4F45-9708-019B960494DF}">
+              <a14:hiddenLine xmlns:a14="http://schemas.microsoft.com/office/drawing/2010/main" w="9525">
+                <a:solidFill>
+                  <a:schemeClr val="tx1"/>
+                </a:solidFill>
+                <a:miter lim="800000"/>
+                <a:headEnd/>
+                <a:tailEnd/>
+              </a14:hiddenLine>
+            </a:ext>
+          </a:extLst>
+        </p:spPr>
+      </p:pic>
+      <p:sp>
+        <p:nvSpPr>
+          <p:cNvPr id="6" name="TextBox 5"/>
+          <p:cNvSpPr txBox="1"/>
+          <p:nvPr/>
+        </p:nvSpPr>
+        <p:spPr>
+          <a:xfrm>
+            <a:off x="5486401" y="1087820"/>
+            <a:ext cx="3311291" cy="461665"/>
+          </a:xfrm>
+          <a:prstGeom prst="rect">
+            <a:avLst/>
+          </a:prstGeom>
+          <a:noFill/>
+        </p:spPr>
+        <p:txBody>
+          <a:bodyPr wrap="none" rtlCol="0">
+            <a:spAutoFit/>
+          </a:bodyPr>
+          <a:lstStyle/>
+          <a:p>
+            <a:r>
+              <a:rPr lang="en-US" sz="2400" dirty="0" smtClean="0"/>
+              <a:t>At the start of program</a:t>
+            </a:r>
+            <a:endParaRPr lang="en-US" sz="2400" dirty="0"/>
+          </a:p>
+        </p:txBody>
+      </p:sp>
+    </p:spTree>
+    <p:extLst>
+      <p:ext uri="{BB962C8B-B14F-4D97-AF65-F5344CB8AC3E}">
+        <p14:creationId xmlns:p14="http://schemas.microsoft.com/office/powerpoint/2010/main" val="972560972"/>
       </p:ext>
     </p:extLst>
   </p:cSld>
@@ -6605,6 +7265,744 @@
       </p:par>
     </p:tnLst>
   </p:timing>
+</p:sld>
+</file>
+
+<file path=ppt/slides/slide30.xml><?xml version="1.0" encoding="utf-8"?>
+<p:sld xmlns:a="http://schemas.openxmlformats.org/drawingml/2006/main" xmlns:r="http://schemas.openxmlformats.org/officeDocument/2006/relationships" xmlns:p="http://schemas.openxmlformats.org/presentationml/2006/main">
+  <p:cSld>
+    <p:spTree>
+      <p:nvGrpSpPr>
+        <p:cNvPr id="1" name=""/>
+        <p:cNvGrpSpPr/>
+        <p:nvPr/>
+      </p:nvGrpSpPr>
+      <p:grpSpPr>
+        <a:xfrm>
+          <a:off x="0" y="0"/>
+          <a:ext cx="0" cy="0"/>
+          <a:chOff x="0" y="0"/>
+          <a:chExt cx="0" cy="0"/>
+        </a:xfrm>
+      </p:grpSpPr>
+      <p:pic>
+        <p:nvPicPr>
+          <p:cNvPr id="2050" name="Picture 2"/>
+          <p:cNvPicPr>
+            <a:picLocks noChangeAspect="1" noChangeArrowheads="1"/>
+          </p:cNvPicPr>
+          <p:nvPr/>
+        </p:nvPicPr>
+        <p:blipFill rotWithShape="1">
+          <a:blip r:embed="rId2">
+            <a:extLst>
+              <a:ext uri="{28A0092B-C50C-407E-A947-70E740481C1C}">
+                <a14:useLocalDpi xmlns:a14="http://schemas.microsoft.com/office/drawing/2010/main" val="0"/>
+              </a:ext>
+            </a:extLst>
+          </a:blip>
+          <a:srcRect l="2457" t="14897" r="51509" b="7311"/>
+          <a:stretch/>
+        </p:blipFill>
+        <p:spPr bwMode="auto">
+          <a:xfrm>
+            <a:off x="299544" y="740978"/>
+            <a:ext cx="5791647" cy="6117021"/>
+          </a:xfrm>
+          <a:prstGeom prst="rect">
+            <a:avLst/>
+          </a:prstGeom>
+          <a:noFill/>
+          <a:ln>
+            <a:noFill/>
+          </a:ln>
+          <a:extLst>
+            <a:ext uri="{909E8E84-426E-40DD-AFC4-6F175D3DCCD1}">
+              <a14:hiddenFill xmlns:a14="http://schemas.microsoft.com/office/drawing/2010/main">
+                <a:solidFill>
+                  <a:schemeClr val="accent1"/>
+                </a:solidFill>
+              </a14:hiddenFill>
+            </a:ext>
+            <a:ext uri="{91240B29-F687-4F45-9708-019B960494DF}">
+              <a14:hiddenLine xmlns:a14="http://schemas.microsoft.com/office/drawing/2010/main" w="9525">
+                <a:solidFill>
+                  <a:schemeClr val="tx1"/>
+                </a:solidFill>
+                <a:miter lim="800000"/>
+                <a:headEnd/>
+                <a:tailEnd/>
+              </a14:hiddenLine>
+            </a:ext>
+          </a:extLst>
+        </p:spPr>
+      </p:pic>
+      <p:sp>
+        <p:nvSpPr>
+          <p:cNvPr id="5" name="TextBox 4"/>
+          <p:cNvSpPr txBox="1"/>
+          <p:nvPr/>
+        </p:nvSpPr>
+        <p:spPr>
+          <a:xfrm>
+            <a:off x="5486401" y="1087820"/>
+            <a:ext cx="3417410" cy="461665"/>
+          </a:xfrm>
+          <a:prstGeom prst="rect">
+            <a:avLst/>
+          </a:prstGeom>
+          <a:noFill/>
+        </p:spPr>
+        <p:txBody>
+          <a:bodyPr wrap="none" rtlCol="0">
+            <a:spAutoFit/>
+          </a:bodyPr>
+          <a:lstStyle/>
+          <a:p>
+            <a:r>
+              <a:rPr lang="en-US" sz="2400" dirty="0" smtClean="0"/>
+              <a:t>After the first call of foo</a:t>
+            </a:r>
+            <a:endParaRPr lang="en-US" sz="2400" dirty="0"/>
+          </a:p>
+        </p:txBody>
+      </p:sp>
+    </p:spTree>
+    <p:extLst>
+      <p:ext uri="{BB962C8B-B14F-4D97-AF65-F5344CB8AC3E}">
+        <p14:creationId xmlns:p14="http://schemas.microsoft.com/office/powerpoint/2010/main" val="112526313"/>
+      </p:ext>
+    </p:extLst>
+  </p:cSld>
+  <p:clrMapOvr>
+    <a:masterClrMapping/>
+  </p:clrMapOvr>
+</p:sld>
+</file>
+
+<file path=ppt/slides/slide31.xml><?xml version="1.0" encoding="utf-8"?>
+<p:sld xmlns:a="http://schemas.openxmlformats.org/drawingml/2006/main" xmlns:r="http://schemas.openxmlformats.org/officeDocument/2006/relationships" xmlns:p="http://schemas.openxmlformats.org/presentationml/2006/main">
+  <p:cSld>
+    <p:spTree>
+      <p:nvGrpSpPr>
+        <p:cNvPr id="1" name=""/>
+        <p:cNvGrpSpPr/>
+        <p:nvPr/>
+      </p:nvGrpSpPr>
+      <p:grpSpPr>
+        <a:xfrm>
+          <a:off x="0" y="0"/>
+          <a:ext cx="0" cy="0"/>
+          <a:chOff x="0" y="0"/>
+          <a:chExt cx="0" cy="0"/>
+        </a:xfrm>
+      </p:grpSpPr>
+      <p:pic>
+        <p:nvPicPr>
+          <p:cNvPr id="3074" name="Picture 2"/>
+          <p:cNvPicPr>
+            <a:picLocks noChangeAspect="1" noChangeArrowheads="1"/>
+          </p:cNvPicPr>
+          <p:nvPr/>
+        </p:nvPicPr>
+        <p:blipFill rotWithShape="1">
+          <a:blip r:embed="rId2">
+            <a:extLst>
+              <a:ext uri="{28A0092B-C50C-407E-A947-70E740481C1C}">
+                <a14:useLocalDpi xmlns:a14="http://schemas.microsoft.com/office/drawing/2010/main" val="0"/>
+              </a:ext>
+            </a:extLst>
+          </a:blip>
+          <a:srcRect l="2069" t="17380" r="61078" b="5655"/>
+          <a:stretch/>
+        </p:blipFill>
+        <p:spPr bwMode="auto">
+          <a:xfrm>
+            <a:off x="614854" y="772509"/>
+            <a:ext cx="4650829" cy="6070557"/>
+          </a:xfrm>
+          <a:prstGeom prst="rect">
+            <a:avLst/>
+          </a:prstGeom>
+          <a:noFill/>
+          <a:ln>
+            <a:noFill/>
+          </a:ln>
+          <a:extLst>
+            <a:ext uri="{909E8E84-426E-40DD-AFC4-6F175D3DCCD1}">
+              <a14:hiddenFill xmlns:a14="http://schemas.microsoft.com/office/drawing/2010/main">
+                <a:solidFill>
+                  <a:schemeClr val="accent1"/>
+                </a:solidFill>
+              </a14:hiddenFill>
+            </a:ext>
+            <a:ext uri="{91240B29-F687-4F45-9708-019B960494DF}">
+              <a14:hiddenLine xmlns:a14="http://schemas.microsoft.com/office/drawing/2010/main" w="9525">
+                <a:solidFill>
+                  <a:schemeClr val="tx1"/>
+                </a:solidFill>
+                <a:miter lim="800000"/>
+                <a:headEnd/>
+                <a:tailEnd/>
+              </a14:hiddenLine>
+            </a:ext>
+          </a:extLst>
+        </p:spPr>
+      </p:pic>
+      <p:sp>
+        <p:nvSpPr>
+          <p:cNvPr id="5" name="TextBox 4"/>
+          <p:cNvSpPr txBox="1"/>
+          <p:nvPr/>
+        </p:nvSpPr>
+        <p:spPr>
+          <a:xfrm>
+            <a:off x="5044967" y="1087820"/>
+            <a:ext cx="3848618" cy="461665"/>
+          </a:xfrm>
+          <a:prstGeom prst="rect">
+            <a:avLst/>
+          </a:prstGeom>
+          <a:noFill/>
+        </p:spPr>
+        <p:txBody>
+          <a:bodyPr wrap="none" rtlCol="0">
+            <a:spAutoFit/>
+          </a:bodyPr>
+          <a:lstStyle/>
+          <a:p>
+            <a:r>
+              <a:rPr lang="en-US" sz="2400" dirty="0" smtClean="0"/>
+              <a:t>After the second call of foo</a:t>
+            </a:r>
+            <a:endParaRPr lang="en-US" sz="2400" dirty="0"/>
+          </a:p>
+        </p:txBody>
+      </p:sp>
+    </p:spTree>
+    <p:extLst>
+      <p:ext uri="{BB962C8B-B14F-4D97-AF65-F5344CB8AC3E}">
+        <p14:creationId xmlns:p14="http://schemas.microsoft.com/office/powerpoint/2010/main" val="1279405410"/>
+      </p:ext>
+    </p:extLst>
+  </p:cSld>
+  <p:clrMapOvr>
+    <a:masterClrMapping/>
+  </p:clrMapOvr>
+</p:sld>
+</file>
+
+<file path=ppt/slides/slide32.xml><?xml version="1.0" encoding="utf-8"?>
+<p:sld xmlns:a="http://schemas.openxmlformats.org/drawingml/2006/main" xmlns:r="http://schemas.openxmlformats.org/officeDocument/2006/relationships" xmlns:p="http://schemas.openxmlformats.org/presentationml/2006/main">
+  <p:cSld>
+    <p:spTree>
+      <p:nvGrpSpPr>
+        <p:cNvPr id="1" name=""/>
+        <p:cNvGrpSpPr/>
+        <p:nvPr/>
+      </p:nvGrpSpPr>
+      <p:grpSpPr>
+        <a:xfrm>
+          <a:off x="0" y="0"/>
+          <a:ext cx="0" cy="0"/>
+          <a:chOff x="0" y="0"/>
+          <a:chExt cx="0" cy="0"/>
+        </a:xfrm>
+      </p:grpSpPr>
+      <p:sp>
+        <p:nvSpPr>
+          <p:cNvPr id="2" name="Місце для тексту 1"/>
+          <p:cNvSpPr>
+            <a:spLocks noGrp="1"/>
+          </p:cNvSpPr>
+          <p:nvPr>
+            <p:ph type="body" sz="quarter" idx="10"/>
+          </p:nvPr>
+        </p:nvSpPr>
+        <p:spPr/>
+        <p:txBody>
+          <a:bodyPr/>
+          <a:lstStyle/>
+          <a:p>
+            <a:r>
+              <a:rPr lang="en-US" dirty="0"/>
+              <a:t>internal class Employee </a:t>
+            </a:r>
+            <a:endParaRPr lang="en-US" dirty="0" smtClean="0"/>
+          </a:p>
+          <a:p>
+            <a:r>
+              <a:rPr lang="en-US" dirty="0" smtClean="0"/>
+              <a:t>{  </a:t>
+            </a:r>
+          </a:p>
+          <a:p>
+            <a:r>
+              <a:rPr lang="en-US" dirty="0" smtClean="0"/>
+              <a:t>public </a:t>
+            </a:r>
+            <a:r>
+              <a:rPr lang="en-US" dirty="0"/>
+              <a:t>Int32 </a:t>
+            </a:r>
+            <a:r>
+              <a:rPr lang="en-US" dirty="0" err="1"/>
+              <a:t>GetYearsEmployed</a:t>
+            </a:r>
+            <a:r>
+              <a:rPr lang="en-US" dirty="0"/>
+              <a:t> () { ... }  </a:t>
+            </a:r>
+          </a:p>
+          <a:p>
+            <a:r>
+              <a:rPr lang="en-US" dirty="0" smtClean="0"/>
+              <a:t>public </a:t>
+            </a:r>
+            <a:r>
+              <a:rPr lang="en-US" dirty="0"/>
+              <a:t>virtual String </a:t>
+            </a:r>
+            <a:r>
+              <a:rPr lang="en-US" dirty="0" err="1"/>
+              <a:t>GetProgressReport</a:t>
+            </a:r>
+            <a:r>
+              <a:rPr lang="en-US" dirty="0"/>
+              <a:t> () </a:t>
+            </a:r>
+            <a:r>
+              <a:rPr lang="en-US" dirty="0" smtClean="0"/>
+              <a:t>{ </a:t>
+            </a:r>
+            <a:r>
+              <a:rPr lang="en-US" dirty="0"/>
+              <a:t>... }  </a:t>
+            </a:r>
+            <a:endParaRPr lang="en-US" dirty="0" smtClean="0"/>
+          </a:p>
+          <a:p>
+            <a:r>
+              <a:rPr lang="en-US" dirty="0" smtClean="0"/>
+              <a:t>public </a:t>
+            </a:r>
+            <a:r>
+              <a:rPr lang="en-US" dirty="0"/>
+              <a:t>static Employee Lookup(String name) { ... } </a:t>
+            </a:r>
+            <a:endParaRPr lang="en-US" dirty="0" smtClean="0"/>
+          </a:p>
+          <a:p>
+            <a:r>
+              <a:rPr lang="en-US" dirty="0" smtClean="0"/>
+              <a:t>} </a:t>
+            </a:r>
+            <a:endParaRPr lang="en-US" dirty="0"/>
+          </a:p>
+          <a:p>
+            <a:r>
+              <a:rPr lang="en-US" dirty="0"/>
+              <a:t>internal sealed class Manager : Employee </a:t>
+            </a:r>
+            <a:endParaRPr lang="en-US" dirty="0" smtClean="0"/>
+          </a:p>
+          <a:p>
+            <a:r>
+              <a:rPr lang="en-US" dirty="0" smtClean="0"/>
+              <a:t>{   </a:t>
+            </a:r>
+          </a:p>
+          <a:p>
+            <a:r>
+              <a:rPr lang="en-US" dirty="0" smtClean="0"/>
+              <a:t>public </a:t>
+            </a:r>
+            <a:r>
+              <a:rPr lang="en-US" dirty="0"/>
+              <a:t>override String </a:t>
+            </a:r>
+            <a:r>
+              <a:rPr lang="en-US" dirty="0" err="1"/>
+              <a:t>GenProgressReport</a:t>
+            </a:r>
+            <a:r>
+              <a:rPr lang="en-US" dirty="0"/>
+              <a:t>() { ... } </a:t>
+            </a:r>
+            <a:endParaRPr lang="en-US" dirty="0" smtClean="0"/>
+          </a:p>
+          <a:p>
+            <a:r>
+              <a:rPr lang="en-US" dirty="0" smtClean="0"/>
+              <a:t>}</a:t>
+            </a:r>
+            <a:endParaRPr lang="en-US" dirty="0"/>
+          </a:p>
+        </p:txBody>
+      </p:sp>
+      <p:sp>
+        <p:nvSpPr>
+          <p:cNvPr id="3" name="Підзаголовок 2"/>
+          <p:cNvSpPr>
+            <a:spLocks noGrp="1"/>
+          </p:cNvSpPr>
+          <p:nvPr>
+            <p:ph type="subTitle" idx="1"/>
+          </p:nvPr>
+        </p:nvSpPr>
+        <p:spPr/>
+        <p:txBody>
+          <a:bodyPr/>
+          <a:lstStyle/>
+          <a:p>
+            <a:r>
+              <a:rPr lang="en-US" dirty="0" smtClean="0"/>
+              <a:t>Example</a:t>
+            </a:r>
+            <a:endParaRPr lang="en-US" dirty="0"/>
+          </a:p>
+        </p:txBody>
+      </p:sp>
+    </p:spTree>
+    <p:extLst>
+      <p:ext uri="{BB962C8B-B14F-4D97-AF65-F5344CB8AC3E}">
+        <p14:creationId xmlns:p14="http://schemas.microsoft.com/office/powerpoint/2010/main" val="2754902913"/>
+      </p:ext>
+    </p:extLst>
+  </p:cSld>
+  <p:clrMapOvr>
+    <a:masterClrMapping/>
+  </p:clrMapOvr>
+</p:sld>
+</file>
+
+<file path=ppt/slides/slide33.xml><?xml version="1.0" encoding="utf-8"?>
+<p:sld xmlns:a="http://schemas.openxmlformats.org/drawingml/2006/main" xmlns:r="http://schemas.openxmlformats.org/officeDocument/2006/relationships" xmlns:p="http://schemas.openxmlformats.org/presentationml/2006/main">
+  <p:cSld>
+    <p:spTree>
+      <p:nvGrpSpPr>
+        <p:cNvPr id="1" name=""/>
+        <p:cNvGrpSpPr/>
+        <p:nvPr/>
+      </p:nvGrpSpPr>
+      <p:grpSpPr>
+        <a:xfrm>
+          <a:off x="0" y="0"/>
+          <a:ext cx="0" cy="0"/>
+          <a:chOff x="0" y="0"/>
+          <a:chExt cx="0" cy="0"/>
+        </a:xfrm>
+      </p:grpSpPr>
+      <p:pic>
+        <p:nvPicPr>
+          <p:cNvPr id="4098" name="Picture 2" descr="Результат пошуку зображень за запитом &quot;а.Manager.и.Employee.как.экземпляры.типа.System Type&quot;">
+            <a:hlinkClick r:id="rId3"/>
+          </p:cNvPr>
+          <p:cNvPicPr>
+            <a:picLocks noChangeAspect="1" noChangeArrowheads="1"/>
+          </p:cNvPicPr>
+          <p:nvPr/>
+        </p:nvPicPr>
+        <p:blipFill rotWithShape="1">
+          <a:blip r:embed="rId4">
+            <a:extLst>
+              <a:ext uri="{28A0092B-C50C-407E-A947-70E740481C1C}">
+                <a14:useLocalDpi xmlns:a14="http://schemas.microsoft.com/office/drawing/2010/main" val="0"/>
+              </a:ext>
+            </a:extLst>
+          </a:blip>
+          <a:srcRect l="2797"/>
+          <a:stretch/>
+        </p:blipFill>
+        <p:spPr bwMode="auto">
+          <a:xfrm>
+            <a:off x="0" y="1115573"/>
+            <a:ext cx="9144000" cy="4733433"/>
+          </a:xfrm>
+          <a:prstGeom prst="rect">
+            <a:avLst/>
+          </a:prstGeom>
+          <a:noFill/>
+          <a:extLst>
+            <a:ext uri="{909E8E84-426E-40DD-AFC4-6F175D3DCCD1}">
+              <a14:hiddenFill xmlns:a14="http://schemas.microsoft.com/office/drawing/2010/main">
+                <a:solidFill>
+                  <a:srgbClr val="FFFFFF"/>
+                </a:solidFill>
+              </a14:hiddenFill>
+            </a:ext>
+          </a:extLst>
+        </p:spPr>
+      </p:pic>
+    </p:spTree>
+    <p:extLst>
+      <p:ext uri="{BB962C8B-B14F-4D97-AF65-F5344CB8AC3E}">
+        <p14:creationId xmlns:p14="http://schemas.microsoft.com/office/powerpoint/2010/main" val="92956258"/>
+      </p:ext>
+    </p:extLst>
+  </p:cSld>
+  <p:clrMapOvr>
+    <a:masterClrMapping/>
+  </p:clrMapOvr>
+</p:sld>
+</file>
+
+<file path=ppt/slides/slide34.xml><?xml version="1.0" encoding="utf-8"?>
+<p:sld xmlns:a="http://schemas.openxmlformats.org/drawingml/2006/main" xmlns:r="http://schemas.openxmlformats.org/officeDocument/2006/relationships" xmlns:p="http://schemas.openxmlformats.org/presentationml/2006/main">
+  <p:cSld>
+    <p:spTree>
+      <p:nvGrpSpPr>
+        <p:cNvPr id="1" name=""/>
+        <p:cNvGrpSpPr/>
+        <p:nvPr/>
+      </p:nvGrpSpPr>
+      <p:grpSpPr>
+        <a:xfrm>
+          <a:off x="0" y="0"/>
+          <a:ext cx="0" cy="0"/>
+          <a:chOff x="0" y="0"/>
+          <a:chExt cx="0" cy="0"/>
+        </a:xfrm>
+      </p:grpSpPr>
+      <p:sp>
+        <p:nvSpPr>
+          <p:cNvPr id="2" name="Місце для тексту 1"/>
+          <p:cNvSpPr>
+            <a:spLocks noGrp="1"/>
+          </p:cNvSpPr>
+          <p:nvPr>
+            <p:ph type="body" sz="quarter" idx="10"/>
+          </p:nvPr>
+        </p:nvSpPr>
+        <p:spPr>
+          <a:xfrm>
+            <a:off x="272144" y="1056290"/>
+            <a:ext cx="8675404" cy="5541365"/>
+          </a:xfrm>
+        </p:spPr>
+        <p:txBody>
+          <a:bodyPr>
+            <a:normAutofit/>
+          </a:bodyPr>
+          <a:lstStyle/>
+          <a:p>
+            <a:r>
+              <a:rPr lang="en-US" sz="2400" dirty="0"/>
+              <a:t>Loader heaps are designed to load various special objects (artifacts) that exist during the entire lifetime of the domain - objects, commercial CLRs and objects that provide optimization. </a:t>
+            </a:r>
+            <a:endParaRPr lang="en-US" sz="2400" dirty="0" smtClean="0"/>
+          </a:p>
+          <a:p>
+            <a:r>
+              <a:rPr lang="en-US" sz="2400" dirty="0" smtClean="0"/>
+              <a:t>The </a:t>
+            </a:r>
+            <a:r>
+              <a:rPr lang="en-US" sz="2400" dirty="0"/>
+              <a:t>size of these heaps increases in predictable portions to reduce fragmentation. </a:t>
+            </a:r>
+            <a:endParaRPr lang="en-US" sz="2400" dirty="0" smtClean="0"/>
+          </a:p>
+          <a:p>
+            <a:r>
+              <a:rPr lang="en-US" sz="2400" dirty="0" smtClean="0"/>
+              <a:t>Loader </a:t>
+            </a:r>
+            <a:r>
+              <a:rPr lang="en-US" sz="2400" dirty="0"/>
+              <a:t>heaps are different from the heap of the garbage collector (GC Heap) in that GC Heap contains object instances, and loader heaps store type </a:t>
+            </a:r>
+            <a:r>
+              <a:rPr lang="en-US" sz="2400" dirty="0" err="1"/>
+              <a:t>type</a:t>
+            </a:r>
+            <a:r>
+              <a:rPr lang="en-US" sz="2400" dirty="0"/>
+              <a:t> data. </a:t>
+            </a:r>
+            <a:endParaRPr lang="en-US" sz="2400" dirty="0" smtClean="0"/>
+          </a:p>
+          <a:p>
+            <a:r>
+              <a:rPr lang="en-US" sz="2400" dirty="0" err="1" smtClean="0"/>
+              <a:t>HighFrequencyHeap</a:t>
+            </a:r>
+            <a:r>
+              <a:rPr lang="en-US" sz="2400" dirty="0" smtClean="0"/>
+              <a:t> </a:t>
+            </a:r>
+            <a:r>
+              <a:rPr lang="en-US" sz="2400" dirty="0"/>
+              <a:t>allocates memory for frequently used objects, and in </a:t>
+            </a:r>
+            <a:r>
+              <a:rPr lang="en-US" sz="2400" dirty="0" err="1"/>
+              <a:t>LowFrequencyHeap</a:t>
+            </a:r>
+            <a:r>
+              <a:rPr lang="en-US" sz="2400" dirty="0"/>
+              <a:t> - for data structures that are accessed less often</a:t>
+            </a:r>
+            <a:r>
+              <a:rPr lang="en-US" sz="2400" dirty="0" smtClean="0"/>
+              <a:t>.</a:t>
+            </a:r>
+            <a:endParaRPr lang="en-US" sz="2400" dirty="0"/>
+          </a:p>
+        </p:txBody>
+      </p:sp>
+    </p:spTree>
+    <p:extLst>
+      <p:ext uri="{BB962C8B-B14F-4D97-AF65-F5344CB8AC3E}">
+        <p14:creationId xmlns:p14="http://schemas.microsoft.com/office/powerpoint/2010/main" val="3417200197"/>
+      </p:ext>
+    </p:extLst>
+  </p:cSld>
+  <p:clrMapOvr>
+    <a:masterClrMapping/>
+  </p:clrMapOvr>
+</p:sld>
+</file>
+
+<file path=ppt/slides/slide35.xml><?xml version="1.0" encoding="utf-8"?>
+<p:sld xmlns:a="http://schemas.openxmlformats.org/drawingml/2006/main" xmlns:r="http://schemas.openxmlformats.org/officeDocument/2006/relationships" xmlns:p="http://schemas.openxmlformats.org/presentationml/2006/main">
+  <p:cSld>
+    <p:spTree>
+      <p:nvGrpSpPr>
+        <p:cNvPr id="1" name=""/>
+        <p:cNvGrpSpPr/>
+        <p:nvPr/>
+      </p:nvGrpSpPr>
+      <p:grpSpPr>
+        <a:xfrm>
+          <a:off x="0" y="0"/>
+          <a:ext cx="0" cy="0"/>
+          <a:chOff x="0" y="0"/>
+          <a:chExt cx="0" cy="0"/>
+        </a:xfrm>
+      </p:grpSpPr>
+      <p:sp>
+        <p:nvSpPr>
+          <p:cNvPr id="2" name="Місце для тексту 1"/>
+          <p:cNvSpPr>
+            <a:spLocks noGrp="1"/>
+          </p:cNvSpPr>
+          <p:nvPr>
+            <p:ph type="body" sz="quarter" idx="10"/>
+          </p:nvPr>
+        </p:nvSpPr>
+        <p:spPr/>
+        <p:txBody>
+          <a:bodyPr/>
+          <a:lstStyle/>
+          <a:p>
+            <a:r>
+              <a:rPr lang="en-US" dirty="0" smtClean="0"/>
+              <a:t>1. CLR via </a:t>
+            </a:r>
+            <a:r>
+              <a:rPr lang="en-US" dirty="0" err="1" smtClean="0"/>
+              <a:t>c#</a:t>
+            </a:r>
+            <a:r>
+              <a:rPr lang="en-US" dirty="0" smtClean="0"/>
+              <a:t> 4-</a:t>
+            </a:r>
+            <a:r>
+              <a:rPr lang="uk-UA" dirty="0" smtClean="0"/>
+              <a:t>е </a:t>
+            </a:r>
+            <a:r>
+              <a:rPr lang="uk-UA" dirty="0" err="1" smtClean="0"/>
+              <a:t>издание</a:t>
+            </a:r>
+            <a:r>
+              <a:rPr lang="uk-UA" dirty="0" smtClean="0"/>
+              <a:t> – </a:t>
+            </a:r>
+            <a:r>
+              <a:rPr lang="uk-UA" dirty="0" err="1" smtClean="0"/>
+              <a:t>Джеффри</a:t>
+            </a:r>
+            <a:r>
+              <a:rPr lang="uk-UA" dirty="0" smtClean="0"/>
+              <a:t> </a:t>
+            </a:r>
+            <a:r>
+              <a:rPr lang="uk-UA" dirty="0" err="1" smtClean="0"/>
+              <a:t>Рихтер</a:t>
+            </a:r>
+            <a:endParaRPr lang="en-US" dirty="0" smtClean="0"/>
+          </a:p>
+          <a:p>
+            <a:r>
+              <a:rPr lang="en-US" dirty="0"/>
+              <a:t>2. </a:t>
+            </a:r>
+            <a:r>
+              <a:rPr lang="en-US" dirty="0" smtClean="0"/>
+              <a:t>https</a:t>
+            </a:r>
+            <a:r>
+              <a:rPr lang="en-US" dirty="0"/>
+              <a:t>://www2.hawaii.edu/~walbritt/ics212</a:t>
+            </a:r>
+            <a:r>
+              <a:rPr lang="en-US" dirty="0" smtClean="0"/>
+              <a:t>/</a:t>
+            </a:r>
+          </a:p>
+          <a:p>
+            <a:r>
+              <a:rPr lang="en-US" dirty="0"/>
+              <a:t>	</a:t>
+            </a:r>
+            <a:r>
+              <a:rPr lang="en-US" dirty="0" smtClean="0"/>
+              <a:t>				examples/HeapStack.htm</a:t>
+            </a:r>
+          </a:p>
+          <a:p>
+            <a:r>
+              <a:rPr lang="en-US" dirty="0"/>
+              <a:t>3. https://msdn.microsoft.com/ru-ru/library/dd335945.aspx</a:t>
+            </a:r>
+          </a:p>
+        </p:txBody>
+      </p:sp>
+      <p:sp>
+        <p:nvSpPr>
+          <p:cNvPr id="3" name="Підзаголовок 2"/>
+          <p:cNvSpPr>
+            <a:spLocks noGrp="1"/>
+          </p:cNvSpPr>
+          <p:nvPr>
+            <p:ph type="subTitle" idx="1"/>
+          </p:nvPr>
+        </p:nvSpPr>
+        <p:spPr/>
+        <p:txBody>
+          <a:bodyPr/>
+          <a:lstStyle/>
+          <a:p>
+            <a:r>
+              <a:rPr lang="en-US" dirty="0" smtClean="0"/>
+              <a:t>Resources</a:t>
+            </a:r>
+            <a:endParaRPr lang="en-US" dirty="0"/>
+          </a:p>
+        </p:txBody>
+      </p:sp>
+    </p:spTree>
+    <p:extLst>
+      <p:ext uri="{BB962C8B-B14F-4D97-AF65-F5344CB8AC3E}">
+        <p14:creationId xmlns:p14="http://schemas.microsoft.com/office/powerpoint/2010/main" val="1387280850"/>
+      </p:ext>
+    </p:extLst>
+  </p:cSld>
+  <p:clrMapOvr>
+    <a:masterClrMapping/>
+  </p:clrMapOvr>
 </p:sld>
 </file>
 
@@ -7978,7 +9376,7 @@
   <a:extraClrSchemeLst/>
   <a:extLst>
     <a:ext uri="{05A4C25C-085E-4340-85A3-A5531E510DB2}">
-      <thm15:themeFamily xmlns="" xmlns:thm15="http://schemas.microsoft.com/office/thememl/2012/main" name="Office Theme" id="{62F939B6-93AF-4DB8-9C6B-D6C7DFDC589F}" vid="{4A3C46E8-61CC-4603-A589-7422A47A8E4A}"/>
+      <thm15:themeFamily xmlns:thm15="http://schemas.microsoft.com/office/thememl/2012/main" xmlns="" name="Office Theme" id="{62F939B6-93AF-4DB8-9C6B-D6C7DFDC589F}" vid="{4A3C46E8-61CC-4603-A589-7422A47A8E4A}"/>
     </a:ext>
   </a:extLst>
 </a:theme>
@@ -8179,7 +9577,7 @@
   <a:extraClrSchemeLst/>
   <a:extLst>
     <a:ext uri="{05A4C25C-085E-4340-85A3-A5531E510DB2}">
-      <thm15:themeFamily xmlns="" xmlns:thm15="http://schemas.microsoft.com/office/thememl/2012/main" name="Office Theme" id="{62F939B6-93AF-4DB8-9C6B-D6C7DFDC589F}" vid="{4A3C46E8-61CC-4603-A589-7422A47A8E4A}"/>
+      <thm15:themeFamily xmlns:thm15="http://schemas.microsoft.com/office/thememl/2012/main" xmlns="" name="Office Theme" id="{62F939B6-93AF-4DB8-9C6B-D6C7DFDC589F}" vid="{4A3C46E8-61CC-4603-A589-7422A47A8E4A}"/>
     </a:ext>
   </a:extLst>
 </a:theme>
@@ -8380,7 +9778,7 @@
   <a:extraClrSchemeLst/>
   <a:extLst>
     <a:ext uri="{05A4C25C-085E-4340-85A3-A5531E510DB2}">
-      <thm15:themeFamily xmlns="" xmlns:thm15="http://schemas.microsoft.com/office/thememl/2012/main" name="Office Theme" id="{62F939B6-93AF-4DB8-9C6B-D6C7DFDC589F}" vid="{4A3C46E8-61CC-4603-A589-7422A47A8E4A}"/>
+      <thm15:themeFamily xmlns:thm15="http://schemas.microsoft.com/office/thememl/2012/main" xmlns="" name="Office Theme" id="{62F939B6-93AF-4DB8-9C6B-D6C7DFDC589F}" vid="{4A3C46E8-61CC-4603-A589-7422A47A8E4A}"/>
     </a:ext>
   </a:extLst>
 </a:theme>
@@ -8926,7 +10324,7 @@
   <a:extraClrSchemeLst/>
   <a:extLst>
     <a:ext uri="{05A4C25C-085E-4340-85A3-A5531E510DB2}">
-      <thm15:themeFamily xmlns="" xmlns:thm15="http://schemas.microsoft.com/office/thememl/2012/main" name="Office Theme" id="{62F939B6-93AF-4DB8-9C6B-D6C7DFDC589F}" vid="{4A3C46E8-61CC-4603-A589-7422A47A8E4A}"/>
+      <thm15:themeFamily xmlns:thm15="http://schemas.microsoft.com/office/thememl/2012/main" xmlns="" name="Office Theme" id="{62F939B6-93AF-4DB8-9C6B-D6C7DFDC589F}" vid="{4A3C46E8-61CC-4603-A589-7422A47A8E4A}"/>
     </a:ext>
   </a:extLst>
 </a:theme>

</xml_diff>